<commit_message>
power point en proceso
</commit_message>
<xml_diff>
--- a/Hitos/Presentacion hito 0.pptx
+++ b/Hitos/Presentacion hito 0.pptx
@@ -2,7 +2,7 @@
 <file path=ppt/presentation.xml><?xml version="1.0" encoding="utf-8"?>
 <p:presentation xmlns:a="http://schemas.openxmlformats.org/drawingml/2006/main" xmlns:r="http://schemas.openxmlformats.org/officeDocument/2006/relationships" xmlns:p="http://schemas.openxmlformats.org/presentationml/2006/main" saveSubsetFonts="1">
   <p:sldMasterIdLst>
-    <p:sldMasterId id="2147483648" r:id="rId1"/>
+    <p:sldMasterId id="2147483660" r:id="rId1"/>
   </p:sldMasterIdLst>
   <p:sldIdLst>
     <p:sldId id="256" r:id="rId2"/>
@@ -18,9 +18,9 @@
   <p:notesSz cx="6858000" cy="9144000"/>
   <p:defaultTextStyle>
     <a:defPPr>
-      <a:defRPr lang="es-ES"/>
+      <a:defRPr lang="en-US"/>
     </a:defPPr>
-    <a:lvl1pPr marL="0" algn="l" defTabSz="914400" rtl="0" eaLnBrk="1" latinLnBrk="0" hangingPunct="1">
+    <a:lvl1pPr marL="0" algn="l" defTabSz="457200" rtl="0" eaLnBrk="1" latinLnBrk="0" hangingPunct="1">
       <a:defRPr sz="1800" kern="1200">
         <a:solidFill>
           <a:schemeClr val="tx1"/>
@@ -30,7 +30,7 @@
         <a:cs typeface="+mn-cs"/>
       </a:defRPr>
     </a:lvl1pPr>
-    <a:lvl2pPr marL="457200" algn="l" defTabSz="914400" rtl="0" eaLnBrk="1" latinLnBrk="0" hangingPunct="1">
+    <a:lvl2pPr marL="457200" algn="l" defTabSz="457200" rtl="0" eaLnBrk="1" latinLnBrk="0" hangingPunct="1">
       <a:defRPr sz="1800" kern="1200">
         <a:solidFill>
           <a:schemeClr val="tx1"/>
@@ -40,7 +40,7 @@
         <a:cs typeface="+mn-cs"/>
       </a:defRPr>
     </a:lvl2pPr>
-    <a:lvl3pPr marL="914400" algn="l" defTabSz="914400" rtl="0" eaLnBrk="1" latinLnBrk="0" hangingPunct="1">
+    <a:lvl3pPr marL="914400" algn="l" defTabSz="457200" rtl="0" eaLnBrk="1" latinLnBrk="0" hangingPunct="1">
       <a:defRPr sz="1800" kern="1200">
         <a:solidFill>
           <a:schemeClr val="tx1"/>
@@ -50,7 +50,7 @@
         <a:cs typeface="+mn-cs"/>
       </a:defRPr>
     </a:lvl3pPr>
-    <a:lvl4pPr marL="1371600" algn="l" defTabSz="914400" rtl="0" eaLnBrk="1" latinLnBrk="0" hangingPunct="1">
+    <a:lvl4pPr marL="1371600" algn="l" defTabSz="457200" rtl="0" eaLnBrk="1" latinLnBrk="0" hangingPunct="1">
       <a:defRPr sz="1800" kern="1200">
         <a:solidFill>
           <a:schemeClr val="tx1"/>
@@ -60,7 +60,7 @@
         <a:cs typeface="+mn-cs"/>
       </a:defRPr>
     </a:lvl4pPr>
-    <a:lvl5pPr marL="1828800" algn="l" defTabSz="914400" rtl="0" eaLnBrk="1" latinLnBrk="0" hangingPunct="1">
+    <a:lvl5pPr marL="1828800" algn="l" defTabSz="457200" rtl="0" eaLnBrk="1" latinLnBrk="0" hangingPunct="1">
       <a:defRPr sz="1800" kern="1200">
         <a:solidFill>
           <a:schemeClr val="tx1"/>
@@ -70,7 +70,7 @@
         <a:cs typeface="+mn-cs"/>
       </a:defRPr>
     </a:lvl5pPr>
-    <a:lvl6pPr marL="2286000" algn="l" defTabSz="914400" rtl="0" eaLnBrk="1" latinLnBrk="0" hangingPunct="1">
+    <a:lvl6pPr marL="2286000" algn="l" defTabSz="457200" rtl="0" eaLnBrk="1" latinLnBrk="0" hangingPunct="1">
       <a:defRPr sz="1800" kern="1200">
         <a:solidFill>
           <a:schemeClr val="tx1"/>
@@ -80,7 +80,7 @@
         <a:cs typeface="+mn-cs"/>
       </a:defRPr>
     </a:lvl6pPr>
-    <a:lvl7pPr marL="2743200" algn="l" defTabSz="914400" rtl="0" eaLnBrk="1" latinLnBrk="0" hangingPunct="1">
+    <a:lvl7pPr marL="2743200" algn="l" defTabSz="457200" rtl="0" eaLnBrk="1" latinLnBrk="0" hangingPunct="1">
       <a:defRPr sz="1800" kern="1200">
         <a:solidFill>
           <a:schemeClr val="tx1"/>
@@ -90,7 +90,7 @@
         <a:cs typeface="+mn-cs"/>
       </a:defRPr>
     </a:lvl7pPr>
-    <a:lvl8pPr marL="3200400" algn="l" defTabSz="914400" rtl="0" eaLnBrk="1" latinLnBrk="0" hangingPunct="1">
+    <a:lvl8pPr marL="3200400" algn="l" defTabSz="457200" rtl="0" eaLnBrk="1" latinLnBrk="0" hangingPunct="1">
       <a:defRPr sz="1800" kern="1200">
         <a:solidFill>
           <a:schemeClr val="tx1"/>
@@ -100,7 +100,7 @@
         <a:cs typeface="+mn-cs"/>
       </a:defRPr>
     </a:lvl8pPr>
-    <a:lvl9pPr marL="3657600" algn="l" defTabSz="914400" rtl="0" eaLnBrk="1" latinLnBrk="0" hangingPunct="1">
+    <a:lvl9pPr marL="3657600" algn="l" defTabSz="457200" rtl="0" eaLnBrk="1" latinLnBrk="0" hangingPunct="1">
       <a:defRPr sz="1800" kern="1200">
         <a:solidFill>
           <a:schemeClr val="tx1"/>
@@ -138,13 +138,7 @@
       </p:grpSpPr>
       <p:sp>
         <p:nvSpPr>
-          <p:cNvPr id="2" name="Título 1">
-            <a:extLst>
-              <a:ext uri="{FF2B5EF4-FFF2-40B4-BE49-F238E27FC236}">
-                <a16:creationId xmlns:a16="http://schemas.microsoft.com/office/drawing/2014/main" id="{AB25E45E-45A6-4242-8976-75A6CAF40D3D}"/>
-              </a:ext>
-            </a:extLst>
-          </p:cNvPr>
+          <p:cNvPr id="2" name="Title 1"/>
           <p:cNvSpPr>
             <a:spLocks noGrp="1"/>
           </p:cNvSpPr>
@@ -170,18 +164,13 @@
               <a:rPr lang="es-ES"/>
               <a:t>Haga clic para modificar el estilo de título del patrón</a:t>
             </a:r>
-          </a:p>
-        </p:txBody>
-      </p:sp>
-      <p:sp>
-        <p:nvSpPr>
-          <p:cNvPr id="3" name="Subtítulo 2">
-            <a:extLst>
-              <a:ext uri="{FF2B5EF4-FFF2-40B4-BE49-F238E27FC236}">
-                <a16:creationId xmlns:a16="http://schemas.microsoft.com/office/drawing/2014/main" id="{8EA1CF46-7681-4518-95B7-968FF0BDD7B9}"/>
-              </a:ext>
-            </a:extLst>
-          </p:cNvPr>
+            <a:endParaRPr lang="en-US" dirty="0"/>
+          </a:p>
+        </p:txBody>
+      </p:sp>
+      <p:sp>
+        <p:nvSpPr>
+          <p:cNvPr id="3" name="Subtitle 2"/>
           <p:cNvSpPr>
             <a:spLocks noGrp="1"/>
           </p:cNvSpPr>
@@ -240,18 +229,13 @@
               <a:rPr lang="es-ES"/>
               <a:t>Haga clic para modificar el estilo de subtítulo del patrón</a:t>
             </a:r>
-          </a:p>
-        </p:txBody>
-      </p:sp>
-      <p:sp>
-        <p:nvSpPr>
-          <p:cNvPr id="4" name="Marcador de fecha 3">
-            <a:extLst>
-              <a:ext uri="{FF2B5EF4-FFF2-40B4-BE49-F238E27FC236}">
-                <a16:creationId xmlns:a16="http://schemas.microsoft.com/office/drawing/2014/main" id="{E86F2894-9901-4EEB-9077-D29AD9CABA8E}"/>
-              </a:ext>
-            </a:extLst>
-          </p:cNvPr>
+            <a:endParaRPr lang="en-US" dirty="0"/>
+          </a:p>
+        </p:txBody>
+      </p:sp>
+      <p:sp>
+        <p:nvSpPr>
+          <p:cNvPr id="4" name="Date Placeholder 3"/>
           <p:cNvSpPr>
             <a:spLocks noGrp="1"/>
           </p:cNvSpPr>
@@ -274,13 +258,7 @@
       </p:sp>
       <p:sp>
         <p:nvSpPr>
-          <p:cNvPr id="5" name="Marcador de pie de página 4">
-            <a:extLst>
-              <a:ext uri="{FF2B5EF4-FFF2-40B4-BE49-F238E27FC236}">
-                <a16:creationId xmlns:a16="http://schemas.microsoft.com/office/drawing/2014/main" id="{D8C95FAB-B070-4D77-9DB2-332D7C50EB59}"/>
-              </a:ext>
-            </a:extLst>
-          </p:cNvPr>
+          <p:cNvPr id="5" name="Footer Placeholder 4"/>
           <p:cNvSpPr>
             <a:spLocks noGrp="1"/>
           </p:cNvSpPr>
@@ -299,13 +277,7 @@
       </p:sp>
       <p:sp>
         <p:nvSpPr>
-          <p:cNvPr id="6" name="Marcador de número de diapositiva 5">
-            <a:extLst>
-              <a:ext uri="{FF2B5EF4-FFF2-40B4-BE49-F238E27FC236}">
-                <a16:creationId xmlns:a16="http://schemas.microsoft.com/office/drawing/2014/main" id="{153D5C71-EBA2-47ED-A7A4-35446ABE7EA4}"/>
-              </a:ext>
-            </a:extLst>
-          </p:cNvPr>
+          <p:cNvPr id="6" name="Slide Number Placeholder 5"/>
           <p:cNvSpPr>
             <a:spLocks noGrp="1"/>
           </p:cNvSpPr>
@@ -329,7 +301,7 @@
     </p:spTree>
     <p:extLst>
       <p:ext uri="{BB962C8B-B14F-4D97-AF65-F5344CB8AC3E}">
-        <p14:creationId xmlns:p14="http://schemas.microsoft.com/office/powerpoint/2010/main" val="2538789675"/>
+        <p14:creationId xmlns:p14="http://schemas.microsoft.com/office/powerpoint/2010/main" val="2329248397"/>
       </p:ext>
     </p:extLst>
   </p:cSld>
@@ -358,13 +330,7 @@
       </p:grpSpPr>
       <p:sp>
         <p:nvSpPr>
-          <p:cNvPr id="2" name="Título 1">
-            <a:extLst>
-              <a:ext uri="{FF2B5EF4-FFF2-40B4-BE49-F238E27FC236}">
-                <a16:creationId xmlns:a16="http://schemas.microsoft.com/office/drawing/2014/main" id="{E72453E0-AAC8-49D3-8359-4A5AA13D96C5}"/>
-              </a:ext>
-            </a:extLst>
-          </p:cNvPr>
+          <p:cNvPr id="2" name="Title 1"/>
           <p:cNvSpPr>
             <a:spLocks noGrp="1"/>
           </p:cNvSpPr>
@@ -381,18 +347,13 @@
               <a:rPr lang="es-ES"/>
               <a:t>Haga clic para modificar el estilo de título del patrón</a:t>
             </a:r>
-          </a:p>
-        </p:txBody>
-      </p:sp>
-      <p:sp>
-        <p:nvSpPr>
-          <p:cNvPr id="3" name="Marcador de texto vertical 2">
-            <a:extLst>
-              <a:ext uri="{FF2B5EF4-FFF2-40B4-BE49-F238E27FC236}">
-                <a16:creationId xmlns:a16="http://schemas.microsoft.com/office/drawing/2014/main" id="{3CE75EDC-207D-4839-A58F-D0E15A29EB7D}"/>
-              </a:ext>
-            </a:extLst>
-          </p:cNvPr>
+            <a:endParaRPr lang="en-US" dirty="0"/>
+          </a:p>
+        </p:txBody>
+      </p:sp>
+      <p:sp>
+        <p:nvSpPr>
+          <p:cNvPr id="3" name="Vertical Text Placeholder 2"/>
           <p:cNvSpPr>
             <a:spLocks noGrp="1"/>
           </p:cNvSpPr>
@@ -438,18 +399,13 @@
               <a:rPr lang="es-ES"/>
               <a:t>Quinto nivel</a:t>
             </a:r>
-          </a:p>
-        </p:txBody>
-      </p:sp>
-      <p:sp>
-        <p:nvSpPr>
-          <p:cNvPr id="4" name="Marcador de fecha 3">
-            <a:extLst>
-              <a:ext uri="{FF2B5EF4-FFF2-40B4-BE49-F238E27FC236}">
-                <a16:creationId xmlns:a16="http://schemas.microsoft.com/office/drawing/2014/main" id="{B7256A67-2B57-47A4-BB3A-4279FDA2FFA7}"/>
-              </a:ext>
-            </a:extLst>
-          </p:cNvPr>
+            <a:endParaRPr lang="en-US" dirty="0"/>
+          </a:p>
+        </p:txBody>
+      </p:sp>
+      <p:sp>
+        <p:nvSpPr>
+          <p:cNvPr id="4" name="Date Placeholder 3"/>
           <p:cNvSpPr>
             <a:spLocks noGrp="1"/>
           </p:cNvSpPr>
@@ -472,13 +428,7 @@
       </p:sp>
       <p:sp>
         <p:nvSpPr>
-          <p:cNvPr id="5" name="Marcador de pie de página 4">
-            <a:extLst>
-              <a:ext uri="{FF2B5EF4-FFF2-40B4-BE49-F238E27FC236}">
-                <a16:creationId xmlns:a16="http://schemas.microsoft.com/office/drawing/2014/main" id="{5925B39C-8A5F-4C6C-AFF5-7A358D6C61A3}"/>
-              </a:ext>
-            </a:extLst>
-          </p:cNvPr>
+          <p:cNvPr id="5" name="Footer Placeholder 4"/>
           <p:cNvSpPr>
             <a:spLocks noGrp="1"/>
           </p:cNvSpPr>
@@ -497,13 +447,7 @@
       </p:sp>
       <p:sp>
         <p:nvSpPr>
-          <p:cNvPr id="6" name="Marcador de número de diapositiva 5">
-            <a:extLst>
-              <a:ext uri="{FF2B5EF4-FFF2-40B4-BE49-F238E27FC236}">
-                <a16:creationId xmlns:a16="http://schemas.microsoft.com/office/drawing/2014/main" id="{7FEACA09-0628-40B4-9B09-CBF0DD0F4DC3}"/>
-              </a:ext>
-            </a:extLst>
-          </p:cNvPr>
+          <p:cNvPr id="6" name="Slide Number Placeholder 5"/>
           <p:cNvSpPr>
             <a:spLocks noGrp="1"/>
           </p:cNvSpPr>
@@ -527,7 +471,7 @@
     </p:spTree>
     <p:extLst>
       <p:ext uri="{BB962C8B-B14F-4D97-AF65-F5344CB8AC3E}">
-        <p14:creationId xmlns:p14="http://schemas.microsoft.com/office/powerpoint/2010/main" val="1068978358"/>
+        <p14:creationId xmlns:p14="http://schemas.microsoft.com/office/powerpoint/2010/main" val="971830774"/>
       </p:ext>
     </p:extLst>
   </p:cSld>
@@ -556,13 +500,7 @@
       </p:grpSpPr>
       <p:sp>
         <p:nvSpPr>
-          <p:cNvPr id="2" name="Título vertical 1">
-            <a:extLst>
-              <a:ext uri="{FF2B5EF4-FFF2-40B4-BE49-F238E27FC236}">
-                <a16:creationId xmlns:a16="http://schemas.microsoft.com/office/drawing/2014/main" id="{EF1F93E7-44A4-470A-B27F-9C520ED27E58}"/>
-              </a:ext>
-            </a:extLst>
-          </p:cNvPr>
+          <p:cNvPr id="2" name="Vertical Title 1"/>
           <p:cNvSpPr>
             <a:spLocks noGrp="1"/>
           </p:cNvSpPr>
@@ -584,18 +522,13 @@
               <a:rPr lang="es-ES"/>
               <a:t>Haga clic para modificar el estilo de título del patrón</a:t>
             </a:r>
-          </a:p>
-        </p:txBody>
-      </p:sp>
-      <p:sp>
-        <p:nvSpPr>
-          <p:cNvPr id="3" name="Marcador de texto vertical 2">
-            <a:extLst>
-              <a:ext uri="{FF2B5EF4-FFF2-40B4-BE49-F238E27FC236}">
-                <a16:creationId xmlns:a16="http://schemas.microsoft.com/office/drawing/2014/main" id="{8315116F-BB51-4DB7-B35F-654F68B58595}"/>
-              </a:ext>
-            </a:extLst>
-          </p:cNvPr>
+            <a:endParaRPr lang="en-US" dirty="0"/>
+          </a:p>
+        </p:txBody>
+      </p:sp>
+      <p:sp>
+        <p:nvSpPr>
+          <p:cNvPr id="3" name="Vertical Text Placeholder 2"/>
           <p:cNvSpPr>
             <a:spLocks noGrp="1"/>
           </p:cNvSpPr>
@@ -646,18 +579,13 @@
               <a:rPr lang="es-ES"/>
               <a:t>Quinto nivel</a:t>
             </a:r>
-          </a:p>
-        </p:txBody>
-      </p:sp>
-      <p:sp>
-        <p:nvSpPr>
-          <p:cNvPr id="4" name="Marcador de fecha 3">
-            <a:extLst>
-              <a:ext uri="{FF2B5EF4-FFF2-40B4-BE49-F238E27FC236}">
-                <a16:creationId xmlns:a16="http://schemas.microsoft.com/office/drawing/2014/main" id="{5F46F4F6-42F5-45DB-AA3D-F163E45A932A}"/>
-              </a:ext>
-            </a:extLst>
-          </p:cNvPr>
+            <a:endParaRPr lang="en-US" dirty="0"/>
+          </a:p>
+        </p:txBody>
+      </p:sp>
+      <p:sp>
+        <p:nvSpPr>
+          <p:cNvPr id="4" name="Date Placeholder 3"/>
           <p:cNvSpPr>
             <a:spLocks noGrp="1"/>
           </p:cNvSpPr>
@@ -680,13 +608,7 @@
       </p:sp>
       <p:sp>
         <p:nvSpPr>
-          <p:cNvPr id="5" name="Marcador de pie de página 4">
-            <a:extLst>
-              <a:ext uri="{FF2B5EF4-FFF2-40B4-BE49-F238E27FC236}">
-                <a16:creationId xmlns:a16="http://schemas.microsoft.com/office/drawing/2014/main" id="{7034CB20-8A93-447C-B792-AF6CABE29B20}"/>
-              </a:ext>
-            </a:extLst>
-          </p:cNvPr>
+          <p:cNvPr id="5" name="Footer Placeholder 4"/>
           <p:cNvSpPr>
             <a:spLocks noGrp="1"/>
           </p:cNvSpPr>
@@ -705,13 +627,7 @@
       </p:sp>
       <p:sp>
         <p:nvSpPr>
-          <p:cNvPr id="6" name="Marcador de número de diapositiva 5">
-            <a:extLst>
-              <a:ext uri="{FF2B5EF4-FFF2-40B4-BE49-F238E27FC236}">
-                <a16:creationId xmlns:a16="http://schemas.microsoft.com/office/drawing/2014/main" id="{54F10B66-13C6-4C44-9DB3-6E0D16D80F14}"/>
-              </a:ext>
-            </a:extLst>
-          </p:cNvPr>
+          <p:cNvPr id="6" name="Slide Number Placeholder 5"/>
           <p:cNvSpPr>
             <a:spLocks noGrp="1"/>
           </p:cNvSpPr>
@@ -735,7 +651,7 @@
     </p:spTree>
     <p:extLst>
       <p:ext uri="{BB962C8B-B14F-4D97-AF65-F5344CB8AC3E}">
-        <p14:creationId xmlns:p14="http://schemas.microsoft.com/office/powerpoint/2010/main" val="443413577"/>
+        <p14:creationId xmlns:p14="http://schemas.microsoft.com/office/powerpoint/2010/main" val="4094879822"/>
       </p:ext>
     </p:extLst>
   </p:cSld>
@@ -764,13 +680,7 @@
       </p:grpSpPr>
       <p:sp>
         <p:nvSpPr>
-          <p:cNvPr id="2" name="Título 1">
-            <a:extLst>
-              <a:ext uri="{FF2B5EF4-FFF2-40B4-BE49-F238E27FC236}">
-                <a16:creationId xmlns:a16="http://schemas.microsoft.com/office/drawing/2014/main" id="{B823CBC8-3A54-4463-806C-5BC0E1CD5843}"/>
-              </a:ext>
-            </a:extLst>
-          </p:cNvPr>
+          <p:cNvPr id="2" name="Title 1"/>
           <p:cNvSpPr>
             <a:spLocks noGrp="1"/>
           </p:cNvSpPr>
@@ -787,18 +697,13 @@
               <a:rPr lang="es-ES"/>
               <a:t>Haga clic para modificar el estilo de título del patrón</a:t>
             </a:r>
-          </a:p>
-        </p:txBody>
-      </p:sp>
-      <p:sp>
-        <p:nvSpPr>
-          <p:cNvPr id="3" name="Marcador de contenido 2">
-            <a:extLst>
-              <a:ext uri="{FF2B5EF4-FFF2-40B4-BE49-F238E27FC236}">
-                <a16:creationId xmlns:a16="http://schemas.microsoft.com/office/drawing/2014/main" id="{F2954C63-8640-4B74-9E44-A4C9EE13E3BD}"/>
-              </a:ext>
-            </a:extLst>
-          </p:cNvPr>
+            <a:endParaRPr lang="en-US" dirty="0"/>
+          </a:p>
+        </p:txBody>
+      </p:sp>
+      <p:sp>
+        <p:nvSpPr>
+          <p:cNvPr id="3" name="Content Placeholder 2"/>
           <p:cNvSpPr>
             <a:spLocks noGrp="1"/>
           </p:cNvSpPr>
@@ -844,18 +749,13 @@
               <a:rPr lang="es-ES"/>
               <a:t>Quinto nivel</a:t>
             </a:r>
-          </a:p>
-        </p:txBody>
-      </p:sp>
-      <p:sp>
-        <p:nvSpPr>
-          <p:cNvPr id="4" name="Marcador de fecha 3">
-            <a:extLst>
-              <a:ext uri="{FF2B5EF4-FFF2-40B4-BE49-F238E27FC236}">
-                <a16:creationId xmlns:a16="http://schemas.microsoft.com/office/drawing/2014/main" id="{757DBC4E-10FE-4F7F-BC19-7BE9F1D87998}"/>
-              </a:ext>
-            </a:extLst>
-          </p:cNvPr>
+            <a:endParaRPr lang="en-US" dirty="0"/>
+          </a:p>
+        </p:txBody>
+      </p:sp>
+      <p:sp>
+        <p:nvSpPr>
+          <p:cNvPr id="4" name="Date Placeholder 3"/>
           <p:cNvSpPr>
             <a:spLocks noGrp="1"/>
           </p:cNvSpPr>
@@ -878,13 +778,7 @@
       </p:sp>
       <p:sp>
         <p:nvSpPr>
-          <p:cNvPr id="5" name="Marcador de pie de página 4">
-            <a:extLst>
-              <a:ext uri="{FF2B5EF4-FFF2-40B4-BE49-F238E27FC236}">
-                <a16:creationId xmlns:a16="http://schemas.microsoft.com/office/drawing/2014/main" id="{9D30F9D3-E9A0-433C-A525-304365E10B9E}"/>
-              </a:ext>
-            </a:extLst>
-          </p:cNvPr>
+          <p:cNvPr id="5" name="Footer Placeholder 4"/>
           <p:cNvSpPr>
             <a:spLocks noGrp="1"/>
           </p:cNvSpPr>
@@ -903,13 +797,7 @@
       </p:sp>
       <p:sp>
         <p:nvSpPr>
-          <p:cNvPr id="6" name="Marcador de número de diapositiva 5">
-            <a:extLst>
-              <a:ext uri="{FF2B5EF4-FFF2-40B4-BE49-F238E27FC236}">
-                <a16:creationId xmlns:a16="http://schemas.microsoft.com/office/drawing/2014/main" id="{34342B55-7BAE-4733-8DB1-B7C15C196775}"/>
-              </a:ext>
-            </a:extLst>
-          </p:cNvPr>
+          <p:cNvPr id="6" name="Slide Number Placeholder 5"/>
           <p:cNvSpPr>
             <a:spLocks noGrp="1"/>
           </p:cNvSpPr>
@@ -933,7 +821,7 @@
     </p:spTree>
     <p:extLst>
       <p:ext uri="{BB962C8B-B14F-4D97-AF65-F5344CB8AC3E}">
-        <p14:creationId xmlns:p14="http://schemas.microsoft.com/office/powerpoint/2010/main" val="3134105619"/>
+        <p14:creationId xmlns:p14="http://schemas.microsoft.com/office/powerpoint/2010/main" val="538868074"/>
       </p:ext>
     </p:extLst>
   </p:cSld>
@@ -962,13 +850,7 @@
       </p:grpSpPr>
       <p:sp>
         <p:nvSpPr>
-          <p:cNvPr id="2" name="Título 1">
-            <a:extLst>
-              <a:ext uri="{FF2B5EF4-FFF2-40B4-BE49-F238E27FC236}">
-                <a16:creationId xmlns:a16="http://schemas.microsoft.com/office/drawing/2014/main" id="{A076E5EE-DAE9-4B4C-A845-77DAFD0EA5C0}"/>
-              </a:ext>
-            </a:extLst>
-          </p:cNvPr>
+          <p:cNvPr id="2" name="Title 1"/>
           <p:cNvSpPr>
             <a:spLocks noGrp="1"/>
           </p:cNvSpPr>
@@ -994,18 +876,13 @@
               <a:rPr lang="es-ES"/>
               <a:t>Haga clic para modificar el estilo de título del patrón</a:t>
             </a:r>
-          </a:p>
-        </p:txBody>
-      </p:sp>
-      <p:sp>
-        <p:nvSpPr>
-          <p:cNvPr id="3" name="Marcador de texto 2">
-            <a:extLst>
-              <a:ext uri="{FF2B5EF4-FFF2-40B4-BE49-F238E27FC236}">
-                <a16:creationId xmlns:a16="http://schemas.microsoft.com/office/drawing/2014/main" id="{79247D6A-B4F4-4EFA-93BE-03A00BEDCD19}"/>
-              </a:ext>
-            </a:extLst>
-          </p:cNvPr>
+            <a:endParaRPr lang="en-US" dirty="0"/>
+          </a:p>
+        </p:txBody>
+      </p:sp>
+      <p:sp>
+        <p:nvSpPr>
+          <p:cNvPr id="3" name="Text Placeholder 2"/>
           <p:cNvSpPr>
             <a:spLocks noGrp="1"/>
           </p:cNvSpPr>
@@ -1124,13 +1001,7 @@
       </p:sp>
       <p:sp>
         <p:nvSpPr>
-          <p:cNvPr id="4" name="Marcador de fecha 3">
-            <a:extLst>
-              <a:ext uri="{FF2B5EF4-FFF2-40B4-BE49-F238E27FC236}">
-                <a16:creationId xmlns:a16="http://schemas.microsoft.com/office/drawing/2014/main" id="{2C531190-14D2-4887-9E31-A0505BC03686}"/>
-              </a:ext>
-            </a:extLst>
-          </p:cNvPr>
+          <p:cNvPr id="4" name="Date Placeholder 3"/>
           <p:cNvSpPr>
             <a:spLocks noGrp="1"/>
           </p:cNvSpPr>
@@ -1153,13 +1024,7 @@
       </p:sp>
       <p:sp>
         <p:nvSpPr>
-          <p:cNvPr id="5" name="Marcador de pie de página 4">
-            <a:extLst>
-              <a:ext uri="{FF2B5EF4-FFF2-40B4-BE49-F238E27FC236}">
-                <a16:creationId xmlns:a16="http://schemas.microsoft.com/office/drawing/2014/main" id="{DE1F26D2-BDAF-49E8-A2E4-EDC519341CE0}"/>
-              </a:ext>
-            </a:extLst>
-          </p:cNvPr>
+          <p:cNvPr id="5" name="Footer Placeholder 4"/>
           <p:cNvSpPr>
             <a:spLocks noGrp="1"/>
           </p:cNvSpPr>
@@ -1178,13 +1043,7 @@
       </p:sp>
       <p:sp>
         <p:nvSpPr>
-          <p:cNvPr id="6" name="Marcador de número de diapositiva 5">
-            <a:extLst>
-              <a:ext uri="{FF2B5EF4-FFF2-40B4-BE49-F238E27FC236}">
-                <a16:creationId xmlns:a16="http://schemas.microsoft.com/office/drawing/2014/main" id="{A3392309-9F50-4026-A80A-0777A96037BB}"/>
-              </a:ext>
-            </a:extLst>
-          </p:cNvPr>
+          <p:cNvPr id="6" name="Slide Number Placeholder 5"/>
           <p:cNvSpPr>
             <a:spLocks noGrp="1"/>
           </p:cNvSpPr>
@@ -1208,7 +1067,7 @@
     </p:spTree>
     <p:extLst>
       <p:ext uri="{BB962C8B-B14F-4D97-AF65-F5344CB8AC3E}">
-        <p14:creationId xmlns:p14="http://schemas.microsoft.com/office/powerpoint/2010/main" val="2229845839"/>
+        <p14:creationId xmlns:p14="http://schemas.microsoft.com/office/powerpoint/2010/main" val="2381388153"/>
       </p:ext>
     </p:extLst>
   </p:cSld>
@@ -1237,13 +1096,7 @@
       </p:grpSpPr>
       <p:sp>
         <p:nvSpPr>
-          <p:cNvPr id="2" name="Título 1">
-            <a:extLst>
-              <a:ext uri="{FF2B5EF4-FFF2-40B4-BE49-F238E27FC236}">
-                <a16:creationId xmlns:a16="http://schemas.microsoft.com/office/drawing/2014/main" id="{6CA0CCB4-C9E9-4D62-82AF-44E62E289774}"/>
-              </a:ext>
-            </a:extLst>
-          </p:cNvPr>
+          <p:cNvPr id="2" name="Title 1"/>
           <p:cNvSpPr>
             <a:spLocks noGrp="1"/>
           </p:cNvSpPr>
@@ -1260,18 +1113,13 @@
               <a:rPr lang="es-ES"/>
               <a:t>Haga clic para modificar el estilo de título del patrón</a:t>
             </a:r>
-          </a:p>
-        </p:txBody>
-      </p:sp>
-      <p:sp>
-        <p:nvSpPr>
-          <p:cNvPr id="3" name="Marcador de contenido 2">
-            <a:extLst>
-              <a:ext uri="{FF2B5EF4-FFF2-40B4-BE49-F238E27FC236}">
-                <a16:creationId xmlns:a16="http://schemas.microsoft.com/office/drawing/2014/main" id="{80443EA6-638F-42BE-8EE3-5016D4C16FE2}"/>
-              </a:ext>
-            </a:extLst>
-          </p:cNvPr>
+            <a:endParaRPr lang="en-US" dirty="0"/>
+          </a:p>
+        </p:txBody>
+      </p:sp>
+      <p:sp>
+        <p:nvSpPr>
+          <p:cNvPr id="3" name="Content Placeholder 2"/>
           <p:cNvSpPr>
             <a:spLocks noGrp="1"/>
           </p:cNvSpPr>
@@ -1322,18 +1170,13 @@
               <a:rPr lang="es-ES"/>
               <a:t>Quinto nivel</a:t>
             </a:r>
-          </a:p>
-        </p:txBody>
-      </p:sp>
-      <p:sp>
-        <p:nvSpPr>
-          <p:cNvPr id="4" name="Marcador de contenido 3">
-            <a:extLst>
-              <a:ext uri="{FF2B5EF4-FFF2-40B4-BE49-F238E27FC236}">
-                <a16:creationId xmlns:a16="http://schemas.microsoft.com/office/drawing/2014/main" id="{2400D42C-BD5F-462C-94F1-7E5C2616BB2E}"/>
-              </a:ext>
-            </a:extLst>
-          </p:cNvPr>
+            <a:endParaRPr lang="en-US" dirty="0"/>
+          </a:p>
+        </p:txBody>
+      </p:sp>
+      <p:sp>
+        <p:nvSpPr>
+          <p:cNvPr id="4" name="Content Placeholder 3"/>
           <p:cNvSpPr>
             <a:spLocks noGrp="1"/>
           </p:cNvSpPr>
@@ -1384,18 +1227,13 @@
               <a:rPr lang="es-ES"/>
               <a:t>Quinto nivel</a:t>
             </a:r>
-          </a:p>
-        </p:txBody>
-      </p:sp>
-      <p:sp>
-        <p:nvSpPr>
-          <p:cNvPr id="5" name="Marcador de fecha 4">
-            <a:extLst>
-              <a:ext uri="{FF2B5EF4-FFF2-40B4-BE49-F238E27FC236}">
-                <a16:creationId xmlns:a16="http://schemas.microsoft.com/office/drawing/2014/main" id="{5B7FA2DF-E761-4992-89CC-25B9E6291CDF}"/>
-              </a:ext>
-            </a:extLst>
-          </p:cNvPr>
+            <a:endParaRPr lang="en-US" dirty="0"/>
+          </a:p>
+        </p:txBody>
+      </p:sp>
+      <p:sp>
+        <p:nvSpPr>
+          <p:cNvPr id="5" name="Date Placeholder 4"/>
           <p:cNvSpPr>
             <a:spLocks noGrp="1"/>
           </p:cNvSpPr>
@@ -1418,13 +1256,7 @@
       </p:sp>
       <p:sp>
         <p:nvSpPr>
-          <p:cNvPr id="6" name="Marcador de pie de página 5">
-            <a:extLst>
-              <a:ext uri="{FF2B5EF4-FFF2-40B4-BE49-F238E27FC236}">
-                <a16:creationId xmlns:a16="http://schemas.microsoft.com/office/drawing/2014/main" id="{A9720C8E-A74E-49E4-9096-245331FC414D}"/>
-              </a:ext>
-            </a:extLst>
-          </p:cNvPr>
+          <p:cNvPr id="6" name="Footer Placeholder 5"/>
           <p:cNvSpPr>
             <a:spLocks noGrp="1"/>
           </p:cNvSpPr>
@@ -1443,13 +1275,7 @@
       </p:sp>
       <p:sp>
         <p:nvSpPr>
-          <p:cNvPr id="7" name="Marcador de número de diapositiva 6">
-            <a:extLst>
-              <a:ext uri="{FF2B5EF4-FFF2-40B4-BE49-F238E27FC236}">
-                <a16:creationId xmlns:a16="http://schemas.microsoft.com/office/drawing/2014/main" id="{D0D401F1-F4BC-47B3-B29B-662CD76CC149}"/>
-              </a:ext>
-            </a:extLst>
-          </p:cNvPr>
+          <p:cNvPr id="7" name="Slide Number Placeholder 6"/>
           <p:cNvSpPr>
             <a:spLocks noGrp="1"/>
           </p:cNvSpPr>
@@ -1473,7 +1299,7 @@
     </p:spTree>
     <p:extLst>
       <p:ext uri="{BB962C8B-B14F-4D97-AF65-F5344CB8AC3E}">
-        <p14:creationId xmlns:p14="http://schemas.microsoft.com/office/powerpoint/2010/main" val="2431250272"/>
+        <p14:creationId xmlns:p14="http://schemas.microsoft.com/office/powerpoint/2010/main" val="1604573146"/>
       </p:ext>
     </p:extLst>
   </p:cSld>
@@ -1502,13 +1328,7 @@
       </p:grpSpPr>
       <p:sp>
         <p:nvSpPr>
-          <p:cNvPr id="2" name="Título 1">
-            <a:extLst>
-              <a:ext uri="{FF2B5EF4-FFF2-40B4-BE49-F238E27FC236}">
-                <a16:creationId xmlns:a16="http://schemas.microsoft.com/office/drawing/2014/main" id="{CE7AE04B-BEDD-4237-8CCE-4EF21E08F5DF}"/>
-              </a:ext>
-            </a:extLst>
-          </p:cNvPr>
+          <p:cNvPr id="2" name="Title 1"/>
           <p:cNvSpPr>
             <a:spLocks noGrp="1"/>
           </p:cNvSpPr>
@@ -1530,18 +1350,13 @@
               <a:rPr lang="es-ES"/>
               <a:t>Haga clic para modificar el estilo de título del patrón</a:t>
             </a:r>
-          </a:p>
-        </p:txBody>
-      </p:sp>
-      <p:sp>
-        <p:nvSpPr>
-          <p:cNvPr id="3" name="Marcador de texto 2">
-            <a:extLst>
-              <a:ext uri="{FF2B5EF4-FFF2-40B4-BE49-F238E27FC236}">
-                <a16:creationId xmlns:a16="http://schemas.microsoft.com/office/drawing/2014/main" id="{FDE5623B-49A2-4C11-8C3D-532ECA3A5DAA}"/>
-              </a:ext>
-            </a:extLst>
-          </p:cNvPr>
+            <a:endParaRPr lang="en-US" dirty="0"/>
+          </a:p>
+        </p:txBody>
+      </p:sp>
+      <p:sp>
+        <p:nvSpPr>
+          <p:cNvPr id="3" name="Text Placeholder 2"/>
           <p:cNvSpPr>
             <a:spLocks noGrp="1"/>
           </p:cNvSpPr>
@@ -1606,13 +1421,7 @@
       </p:sp>
       <p:sp>
         <p:nvSpPr>
-          <p:cNvPr id="4" name="Marcador de contenido 3">
-            <a:extLst>
-              <a:ext uri="{FF2B5EF4-FFF2-40B4-BE49-F238E27FC236}">
-                <a16:creationId xmlns:a16="http://schemas.microsoft.com/office/drawing/2014/main" id="{6164DBAC-1580-4CCE-A3DB-11DD278A447E}"/>
-              </a:ext>
-            </a:extLst>
-          </p:cNvPr>
+          <p:cNvPr id="4" name="Content Placeholder 3"/>
           <p:cNvSpPr>
             <a:spLocks noGrp="1"/>
           </p:cNvSpPr>
@@ -1663,18 +1472,13 @@
               <a:rPr lang="es-ES"/>
               <a:t>Quinto nivel</a:t>
             </a:r>
-          </a:p>
-        </p:txBody>
-      </p:sp>
-      <p:sp>
-        <p:nvSpPr>
-          <p:cNvPr id="5" name="Marcador de texto 4">
-            <a:extLst>
-              <a:ext uri="{FF2B5EF4-FFF2-40B4-BE49-F238E27FC236}">
-                <a16:creationId xmlns:a16="http://schemas.microsoft.com/office/drawing/2014/main" id="{A89BE1D4-BB38-48F6-85FB-8B4B183A12A2}"/>
-              </a:ext>
-            </a:extLst>
-          </p:cNvPr>
+            <a:endParaRPr lang="en-US" dirty="0"/>
+          </a:p>
+        </p:txBody>
+      </p:sp>
+      <p:sp>
+        <p:nvSpPr>
+          <p:cNvPr id="5" name="Text Placeholder 4"/>
           <p:cNvSpPr>
             <a:spLocks noGrp="1"/>
           </p:cNvSpPr>
@@ -1739,13 +1543,7 @@
       </p:sp>
       <p:sp>
         <p:nvSpPr>
-          <p:cNvPr id="6" name="Marcador de contenido 5">
-            <a:extLst>
-              <a:ext uri="{FF2B5EF4-FFF2-40B4-BE49-F238E27FC236}">
-                <a16:creationId xmlns:a16="http://schemas.microsoft.com/office/drawing/2014/main" id="{C2CFF497-7D43-4828-930E-BD6D3964D370}"/>
-              </a:ext>
-            </a:extLst>
-          </p:cNvPr>
+          <p:cNvPr id="6" name="Content Placeholder 5"/>
           <p:cNvSpPr>
             <a:spLocks noGrp="1"/>
           </p:cNvSpPr>
@@ -1796,18 +1594,13 @@
               <a:rPr lang="es-ES"/>
               <a:t>Quinto nivel</a:t>
             </a:r>
-          </a:p>
-        </p:txBody>
-      </p:sp>
-      <p:sp>
-        <p:nvSpPr>
-          <p:cNvPr id="7" name="Marcador de fecha 6">
-            <a:extLst>
-              <a:ext uri="{FF2B5EF4-FFF2-40B4-BE49-F238E27FC236}">
-                <a16:creationId xmlns:a16="http://schemas.microsoft.com/office/drawing/2014/main" id="{CBDC87BE-32C8-4E90-B32E-566EC39F9453}"/>
-              </a:ext>
-            </a:extLst>
-          </p:cNvPr>
+            <a:endParaRPr lang="en-US" dirty="0"/>
+          </a:p>
+        </p:txBody>
+      </p:sp>
+      <p:sp>
+        <p:nvSpPr>
+          <p:cNvPr id="7" name="Date Placeholder 6"/>
           <p:cNvSpPr>
             <a:spLocks noGrp="1"/>
           </p:cNvSpPr>
@@ -1830,13 +1623,7 @@
       </p:sp>
       <p:sp>
         <p:nvSpPr>
-          <p:cNvPr id="8" name="Marcador de pie de página 7">
-            <a:extLst>
-              <a:ext uri="{FF2B5EF4-FFF2-40B4-BE49-F238E27FC236}">
-                <a16:creationId xmlns:a16="http://schemas.microsoft.com/office/drawing/2014/main" id="{4FAD6E8D-48B6-417B-A5DA-2A99641BCD5E}"/>
-              </a:ext>
-            </a:extLst>
-          </p:cNvPr>
+          <p:cNvPr id="8" name="Footer Placeholder 7"/>
           <p:cNvSpPr>
             <a:spLocks noGrp="1"/>
           </p:cNvSpPr>
@@ -1855,13 +1642,7 @@
       </p:sp>
       <p:sp>
         <p:nvSpPr>
-          <p:cNvPr id="9" name="Marcador de número de diapositiva 8">
-            <a:extLst>
-              <a:ext uri="{FF2B5EF4-FFF2-40B4-BE49-F238E27FC236}">
-                <a16:creationId xmlns:a16="http://schemas.microsoft.com/office/drawing/2014/main" id="{5FEB00C4-6607-4B39-8EC9-79C2C4262FE0}"/>
-              </a:ext>
-            </a:extLst>
-          </p:cNvPr>
+          <p:cNvPr id="9" name="Slide Number Placeholder 8"/>
           <p:cNvSpPr>
             <a:spLocks noGrp="1"/>
           </p:cNvSpPr>
@@ -1885,7 +1666,7 @@
     </p:spTree>
     <p:extLst>
       <p:ext uri="{BB962C8B-B14F-4D97-AF65-F5344CB8AC3E}">
-        <p14:creationId xmlns:p14="http://schemas.microsoft.com/office/powerpoint/2010/main" val="4189281421"/>
+        <p14:creationId xmlns:p14="http://schemas.microsoft.com/office/powerpoint/2010/main" val="2515193337"/>
       </p:ext>
     </p:extLst>
   </p:cSld>
@@ -1914,13 +1695,7 @@
       </p:grpSpPr>
       <p:sp>
         <p:nvSpPr>
-          <p:cNvPr id="2" name="Título 1">
-            <a:extLst>
-              <a:ext uri="{FF2B5EF4-FFF2-40B4-BE49-F238E27FC236}">
-                <a16:creationId xmlns:a16="http://schemas.microsoft.com/office/drawing/2014/main" id="{6F945FE4-53A2-4CB4-8598-C4AA0A2FD9AA}"/>
-              </a:ext>
-            </a:extLst>
-          </p:cNvPr>
+          <p:cNvPr id="2" name="Title 1"/>
           <p:cNvSpPr>
             <a:spLocks noGrp="1"/>
           </p:cNvSpPr>
@@ -1937,18 +1712,13 @@
               <a:rPr lang="es-ES"/>
               <a:t>Haga clic para modificar el estilo de título del patrón</a:t>
             </a:r>
-          </a:p>
-        </p:txBody>
-      </p:sp>
-      <p:sp>
-        <p:nvSpPr>
-          <p:cNvPr id="3" name="Marcador de fecha 2">
-            <a:extLst>
-              <a:ext uri="{FF2B5EF4-FFF2-40B4-BE49-F238E27FC236}">
-                <a16:creationId xmlns:a16="http://schemas.microsoft.com/office/drawing/2014/main" id="{0DBD11AE-1206-4938-AA32-35ACBEABBDB0}"/>
-              </a:ext>
-            </a:extLst>
-          </p:cNvPr>
+            <a:endParaRPr lang="en-US" dirty="0"/>
+          </a:p>
+        </p:txBody>
+      </p:sp>
+      <p:sp>
+        <p:nvSpPr>
+          <p:cNvPr id="3" name="Date Placeholder 2"/>
           <p:cNvSpPr>
             <a:spLocks noGrp="1"/>
           </p:cNvSpPr>
@@ -1971,13 +1741,7 @@
       </p:sp>
       <p:sp>
         <p:nvSpPr>
-          <p:cNvPr id="4" name="Marcador de pie de página 3">
-            <a:extLst>
-              <a:ext uri="{FF2B5EF4-FFF2-40B4-BE49-F238E27FC236}">
-                <a16:creationId xmlns:a16="http://schemas.microsoft.com/office/drawing/2014/main" id="{46FB8BB9-DAD3-4FCC-8249-5BCD797C1848}"/>
-              </a:ext>
-            </a:extLst>
-          </p:cNvPr>
+          <p:cNvPr id="4" name="Footer Placeholder 3"/>
           <p:cNvSpPr>
             <a:spLocks noGrp="1"/>
           </p:cNvSpPr>
@@ -1996,13 +1760,7 @@
       </p:sp>
       <p:sp>
         <p:nvSpPr>
-          <p:cNvPr id="5" name="Marcador de número de diapositiva 4">
-            <a:extLst>
-              <a:ext uri="{FF2B5EF4-FFF2-40B4-BE49-F238E27FC236}">
-                <a16:creationId xmlns:a16="http://schemas.microsoft.com/office/drawing/2014/main" id="{6237A376-D0C5-43DE-861E-BF94B79E46D8}"/>
-              </a:ext>
-            </a:extLst>
-          </p:cNvPr>
+          <p:cNvPr id="5" name="Slide Number Placeholder 4"/>
           <p:cNvSpPr>
             <a:spLocks noGrp="1"/>
           </p:cNvSpPr>
@@ -2026,7 +1784,7 @@
     </p:spTree>
     <p:extLst>
       <p:ext uri="{BB962C8B-B14F-4D97-AF65-F5344CB8AC3E}">
-        <p14:creationId xmlns:p14="http://schemas.microsoft.com/office/powerpoint/2010/main" val="3661316893"/>
+        <p14:creationId xmlns:p14="http://schemas.microsoft.com/office/powerpoint/2010/main" val="3056216344"/>
       </p:ext>
     </p:extLst>
   </p:cSld>
@@ -2055,13 +1813,7 @@
       </p:grpSpPr>
       <p:sp>
         <p:nvSpPr>
-          <p:cNvPr id="2" name="Marcador de fecha 1">
-            <a:extLst>
-              <a:ext uri="{FF2B5EF4-FFF2-40B4-BE49-F238E27FC236}">
-                <a16:creationId xmlns:a16="http://schemas.microsoft.com/office/drawing/2014/main" id="{DE7AA436-2394-49EE-A636-83ADD08A757C}"/>
-              </a:ext>
-            </a:extLst>
-          </p:cNvPr>
+          <p:cNvPr id="2" name="Date Placeholder 1"/>
           <p:cNvSpPr>
             <a:spLocks noGrp="1"/>
           </p:cNvSpPr>
@@ -2084,13 +1836,7 @@
       </p:sp>
       <p:sp>
         <p:nvSpPr>
-          <p:cNvPr id="3" name="Marcador de pie de página 2">
-            <a:extLst>
-              <a:ext uri="{FF2B5EF4-FFF2-40B4-BE49-F238E27FC236}">
-                <a16:creationId xmlns:a16="http://schemas.microsoft.com/office/drawing/2014/main" id="{A6A1017B-2B0F-4DD7-954F-7B9F1F98DB82}"/>
-              </a:ext>
-            </a:extLst>
-          </p:cNvPr>
+          <p:cNvPr id="3" name="Footer Placeholder 2"/>
           <p:cNvSpPr>
             <a:spLocks noGrp="1"/>
           </p:cNvSpPr>
@@ -2109,13 +1855,7 @@
       </p:sp>
       <p:sp>
         <p:nvSpPr>
-          <p:cNvPr id="4" name="Marcador de número de diapositiva 3">
-            <a:extLst>
-              <a:ext uri="{FF2B5EF4-FFF2-40B4-BE49-F238E27FC236}">
-                <a16:creationId xmlns:a16="http://schemas.microsoft.com/office/drawing/2014/main" id="{19E33B43-CB8B-4A49-B0B2-E5DDE35D4E04}"/>
-              </a:ext>
-            </a:extLst>
-          </p:cNvPr>
+          <p:cNvPr id="4" name="Slide Number Placeholder 3"/>
           <p:cNvSpPr>
             <a:spLocks noGrp="1"/>
           </p:cNvSpPr>
@@ -2139,7 +1879,7 @@
     </p:spTree>
     <p:extLst>
       <p:ext uri="{BB962C8B-B14F-4D97-AF65-F5344CB8AC3E}">
-        <p14:creationId xmlns:p14="http://schemas.microsoft.com/office/powerpoint/2010/main" val="706667110"/>
+        <p14:creationId xmlns:p14="http://schemas.microsoft.com/office/powerpoint/2010/main" val="2404357810"/>
       </p:ext>
     </p:extLst>
   </p:cSld>
@@ -2168,13 +1908,7 @@
       </p:grpSpPr>
       <p:sp>
         <p:nvSpPr>
-          <p:cNvPr id="2" name="Título 1">
-            <a:extLst>
-              <a:ext uri="{FF2B5EF4-FFF2-40B4-BE49-F238E27FC236}">
-                <a16:creationId xmlns:a16="http://schemas.microsoft.com/office/drawing/2014/main" id="{1D028242-87B8-4BB6-87A1-39250C9A1317}"/>
-              </a:ext>
-            </a:extLst>
-          </p:cNvPr>
+          <p:cNvPr id="2" name="Title 1"/>
           <p:cNvSpPr>
             <a:spLocks noGrp="1"/>
           </p:cNvSpPr>
@@ -2200,18 +1934,13 @@
               <a:rPr lang="es-ES"/>
               <a:t>Haga clic para modificar el estilo de título del patrón</a:t>
             </a:r>
-          </a:p>
-        </p:txBody>
-      </p:sp>
-      <p:sp>
-        <p:nvSpPr>
-          <p:cNvPr id="3" name="Marcador de contenido 2">
-            <a:extLst>
-              <a:ext uri="{FF2B5EF4-FFF2-40B4-BE49-F238E27FC236}">
-                <a16:creationId xmlns:a16="http://schemas.microsoft.com/office/drawing/2014/main" id="{E4D7F9FE-2EB1-4228-8ECB-D60E5B17D8CB}"/>
-              </a:ext>
-            </a:extLst>
-          </p:cNvPr>
+            <a:endParaRPr lang="en-US" dirty="0"/>
+          </a:p>
+        </p:txBody>
+      </p:sp>
+      <p:sp>
+        <p:nvSpPr>
+          <p:cNvPr id="3" name="Content Placeholder 2"/>
           <p:cNvSpPr>
             <a:spLocks noGrp="1"/>
           </p:cNvSpPr>
@@ -2290,18 +2019,13 @@
               <a:rPr lang="es-ES"/>
               <a:t>Quinto nivel</a:t>
             </a:r>
-          </a:p>
-        </p:txBody>
-      </p:sp>
-      <p:sp>
-        <p:nvSpPr>
-          <p:cNvPr id="4" name="Marcador de texto 3">
-            <a:extLst>
-              <a:ext uri="{FF2B5EF4-FFF2-40B4-BE49-F238E27FC236}">
-                <a16:creationId xmlns:a16="http://schemas.microsoft.com/office/drawing/2014/main" id="{5553326E-479A-4A21-BC01-F348F47E9982}"/>
-              </a:ext>
-            </a:extLst>
-          </p:cNvPr>
+            <a:endParaRPr lang="en-US" dirty="0"/>
+          </a:p>
+        </p:txBody>
+      </p:sp>
+      <p:sp>
+        <p:nvSpPr>
+          <p:cNvPr id="4" name="Text Placeholder 3"/>
           <p:cNvSpPr>
             <a:spLocks noGrp="1"/>
           </p:cNvSpPr>
@@ -2366,13 +2090,7 @@
       </p:sp>
       <p:sp>
         <p:nvSpPr>
-          <p:cNvPr id="5" name="Marcador de fecha 4">
-            <a:extLst>
-              <a:ext uri="{FF2B5EF4-FFF2-40B4-BE49-F238E27FC236}">
-                <a16:creationId xmlns:a16="http://schemas.microsoft.com/office/drawing/2014/main" id="{9551AD0F-4B90-4C4C-800D-73D9A1414A5A}"/>
-              </a:ext>
-            </a:extLst>
-          </p:cNvPr>
+          <p:cNvPr id="5" name="Date Placeholder 4"/>
           <p:cNvSpPr>
             <a:spLocks noGrp="1"/>
           </p:cNvSpPr>
@@ -2395,13 +2113,7 @@
       </p:sp>
       <p:sp>
         <p:nvSpPr>
-          <p:cNvPr id="6" name="Marcador de pie de página 5">
-            <a:extLst>
-              <a:ext uri="{FF2B5EF4-FFF2-40B4-BE49-F238E27FC236}">
-                <a16:creationId xmlns:a16="http://schemas.microsoft.com/office/drawing/2014/main" id="{8BE2F3BD-8B63-412C-9BCF-DDA54F4F507F}"/>
-              </a:ext>
-            </a:extLst>
-          </p:cNvPr>
+          <p:cNvPr id="6" name="Footer Placeholder 5"/>
           <p:cNvSpPr>
             <a:spLocks noGrp="1"/>
           </p:cNvSpPr>
@@ -2420,13 +2132,7 @@
       </p:sp>
       <p:sp>
         <p:nvSpPr>
-          <p:cNvPr id="7" name="Marcador de número de diapositiva 6">
-            <a:extLst>
-              <a:ext uri="{FF2B5EF4-FFF2-40B4-BE49-F238E27FC236}">
-                <a16:creationId xmlns:a16="http://schemas.microsoft.com/office/drawing/2014/main" id="{7F1177BD-CB50-41FF-AD03-A4F6ADD56EB2}"/>
-              </a:ext>
-            </a:extLst>
-          </p:cNvPr>
+          <p:cNvPr id="7" name="Slide Number Placeholder 6"/>
           <p:cNvSpPr>
             <a:spLocks noGrp="1"/>
           </p:cNvSpPr>
@@ -2450,7 +2156,7 @@
     </p:spTree>
     <p:extLst>
       <p:ext uri="{BB962C8B-B14F-4D97-AF65-F5344CB8AC3E}">
-        <p14:creationId xmlns:p14="http://schemas.microsoft.com/office/powerpoint/2010/main" val="4019442761"/>
+        <p14:creationId xmlns:p14="http://schemas.microsoft.com/office/powerpoint/2010/main" val="1704773401"/>
       </p:ext>
     </p:extLst>
   </p:cSld>
@@ -2479,13 +2185,7 @@
       </p:grpSpPr>
       <p:sp>
         <p:nvSpPr>
-          <p:cNvPr id="2" name="Título 1">
-            <a:extLst>
-              <a:ext uri="{FF2B5EF4-FFF2-40B4-BE49-F238E27FC236}">
-                <a16:creationId xmlns:a16="http://schemas.microsoft.com/office/drawing/2014/main" id="{67A3DA38-DEDB-40B0-98DD-7E180CE343E1}"/>
-              </a:ext>
-            </a:extLst>
-          </p:cNvPr>
+          <p:cNvPr id="2" name="Title 1"/>
           <p:cNvSpPr>
             <a:spLocks noGrp="1"/>
           </p:cNvSpPr>
@@ -2511,20 +2211,15 @@
               <a:rPr lang="es-ES"/>
               <a:t>Haga clic para modificar el estilo de título del patrón</a:t>
             </a:r>
-          </a:p>
-        </p:txBody>
-      </p:sp>
-      <p:sp>
-        <p:nvSpPr>
-          <p:cNvPr id="3" name="Marcador de posición de imagen 2">
-            <a:extLst>
-              <a:ext uri="{FF2B5EF4-FFF2-40B4-BE49-F238E27FC236}">
-                <a16:creationId xmlns:a16="http://schemas.microsoft.com/office/drawing/2014/main" id="{24F0BDCE-4E53-4BCE-AEDB-DD040A8B1B88}"/>
-              </a:ext>
-            </a:extLst>
-          </p:cNvPr>
-          <p:cNvSpPr>
-            <a:spLocks noGrp="1"/>
+            <a:endParaRPr lang="en-US" dirty="0"/>
+          </a:p>
+        </p:txBody>
+      </p:sp>
+      <p:sp>
+        <p:nvSpPr>
+          <p:cNvPr id="3" name="Picture Placeholder 2"/>
+          <p:cNvSpPr>
+            <a:spLocks noGrp="1" noChangeAspect="1"/>
           </p:cNvSpPr>
           <p:nvPr>
             <p:ph type="pic" idx="1"/>
@@ -2537,7 +2232,7 @@
           </a:xfrm>
         </p:spPr>
         <p:txBody>
-          <a:bodyPr/>
+          <a:bodyPr anchor="t"/>
           <a:lstStyle>
             <a:lvl1pPr marL="0" indent="0">
               <a:buNone/>
@@ -2577,19 +2272,17 @@
             </a:lvl9pPr>
           </a:lstStyle>
           <a:p>
-            <a:endParaRPr lang="es-ES"/>
-          </a:p>
-        </p:txBody>
-      </p:sp>
-      <p:sp>
-        <p:nvSpPr>
-          <p:cNvPr id="4" name="Marcador de texto 3">
-            <a:extLst>
-              <a:ext uri="{FF2B5EF4-FFF2-40B4-BE49-F238E27FC236}">
-                <a16:creationId xmlns:a16="http://schemas.microsoft.com/office/drawing/2014/main" id="{E6C856F3-D84F-4D62-B8D7-1FB406F76D7A}"/>
-              </a:ext>
-            </a:extLst>
-          </p:cNvPr>
+            <a:r>
+              <a:rPr lang="es-ES"/>
+              <a:t>Haga clic en el icono para agregar una imagen</a:t>
+            </a:r>
+            <a:endParaRPr lang="en-US" dirty="0"/>
+          </a:p>
+        </p:txBody>
+      </p:sp>
+      <p:sp>
+        <p:nvSpPr>
+          <p:cNvPr id="4" name="Text Placeholder 3"/>
           <p:cNvSpPr>
             <a:spLocks noGrp="1"/>
           </p:cNvSpPr>
@@ -2654,13 +2347,7 @@
       </p:sp>
       <p:sp>
         <p:nvSpPr>
-          <p:cNvPr id="5" name="Marcador de fecha 4">
-            <a:extLst>
-              <a:ext uri="{FF2B5EF4-FFF2-40B4-BE49-F238E27FC236}">
-                <a16:creationId xmlns:a16="http://schemas.microsoft.com/office/drawing/2014/main" id="{8ED50D2B-E66C-4BB3-A02E-1B136B5BABFF}"/>
-              </a:ext>
-            </a:extLst>
-          </p:cNvPr>
+          <p:cNvPr id="5" name="Date Placeholder 4"/>
           <p:cNvSpPr>
             <a:spLocks noGrp="1"/>
           </p:cNvSpPr>
@@ -2683,13 +2370,7 @@
       </p:sp>
       <p:sp>
         <p:nvSpPr>
-          <p:cNvPr id="6" name="Marcador de pie de página 5">
-            <a:extLst>
-              <a:ext uri="{FF2B5EF4-FFF2-40B4-BE49-F238E27FC236}">
-                <a16:creationId xmlns:a16="http://schemas.microsoft.com/office/drawing/2014/main" id="{ADDB46FC-77BC-49E8-B8C5-75E31A90B37C}"/>
-              </a:ext>
-            </a:extLst>
-          </p:cNvPr>
+          <p:cNvPr id="6" name="Footer Placeholder 5"/>
           <p:cNvSpPr>
             <a:spLocks noGrp="1"/>
           </p:cNvSpPr>
@@ -2708,13 +2389,7 @@
       </p:sp>
       <p:sp>
         <p:nvSpPr>
-          <p:cNvPr id="7" name="Marcador de número de diapositiva 6">
-            <a:extLst>
-              <a:ext uri="{FF2B5EF4-FFF2-40B4-BE49-F238E27FC236}">
-                <a16:creationId xmlns:a16="http://schemas.microsoft.com/office/drawing/2014/main" id="{0237E693-D20C-4229-A8EE-83ED89CDF708}"/>
-              </a:ext>
-            </a:extLst>
-          </p:cNvPr>
+          <p:cNvPr id="7" name="Slide Number Placeholder 6"/>
           <p:cNvSpPr>
             <a:spLocks noGrp="1"/>
           </p:cNvSpPr>
@@ -2738,7 +2413,7 @@
     </p:spTree>
     <p:extLst>
       <p:ext uri="{BB962C8B-B14F-4D97-AF65-F5344CB8AC3E}">
-        <p14:creationId xmlns:p14="http://schemas.microsoft.com/office/powerpoint/2010/main" val="2947777795"/>
+        <p14:creationId xmlns:p14="http://schemas.microsoft.com/office/powerpoint/2010/main" val="652205547"/>
       </p:ext>
     </p:extLst>
   </p:cSld>
@@ -2772,13 +2447,7 @@
       </p:grpSpPr>
       <p:sp>
         <p:nvSpPr>
-          <p:cNvPr id="2" name="Marcador de título 1">
-            <a:extLst>
-              <a:ext uri="{FF2B5EF4-FFF2-40B4-BE49-F238E27FC236}">
-                <a16:creationId xmlns:a16="http://schemas.microsoft.com/office/drawing/2014/main" id="{B0A75037-17D2-45D8-A4B9-90B371119E79}"/>
-              </a:ext>
-            </a:extLst>
-          </p:cNvPr>
+          <p:cNvPr id="2" name="Title Placeholder 1"/>
           <p:cNvSpPr>
             <a:spLocks noGrp="1"/>
           </p:cNvSpPr>
@@ -2805,18 +2474,13 @@
               <a:rPr lang="es-ES"/>
               <a:t>Haga clic para modificar el estilo de título del patrón</a:t>
             </a:r>
-          </a:p>
-        </p:txBody>
-      </p:sp>
-      <p:sp>
-        <p:nvSpPr>
-          <p:cNvPr id="3" name="Marcador de texto 2">
-            <a:extLst>
-              <a:ext uri="{FF2B5EF4-FFF2-40B4-BE49-F238E27FC236}">
-                <a16:creationId xmlns:a16="http://schemas.microsoft.com/office/drawing/2014/main" id="{493E57B8-A170-4C9D-9287-1F48987123EA}"/>
-              </a:ext>
-            </a:extLst>
-          </p:cNvPr>
+            <a:endParaRPr lang="en-US" dirty="0"/>
+          </a:p>
+        </p:txBody>
+      </p:sp>
+      <p:sp>
+        <p:nvSpPr>
+          <p:cNvPr id="3" name="Text Placeholder 2"/>
           <p:cNvSpPr>
             <a:spLocks noGrp="1"/>
           </p:cNvSpPr>
@@ -2872,18 +2536,13 @@
               <a:rPr lang="es-ES"/>
               <a:t>Quinto nivel</a:t>
             </a:r>
-          </a:p>
-        </p:txBody>
-      </p:sp>
-      <p:sp>
-        <p:nvSpPr>
-          <p:cNvPr id="4" name="Marcador de fecha 3">
-            <a:extLst>
-              <a:ext uri="{FF2B5EF4-FFF2-40B4-BE49-F238E27FC236}">
-                <a16:creationId xmlns:a16="http://schemas.microsoft.com/office/drawing/2014/main" id="{5DB1661C-8EEA-43F4-BD18-EB70DAD0867D}"/>
-              </a:ext>
-            </a:extLst>
-          </p:cNvPr>
+            <a:endParaRPr lang="en-US" dirty="0"/>
+          </a:p>
+        </p:txBody>
+      </p:sp>
+      <p:sp>
+        <p:nvSpPr>
+          <p:cNvPr id="4" name="Date Placeholder 3"/>
           <p:cNvSpPr>
             <a:spLocks noGrp="1"/>
           </p:cNvSpPr>
@@ -2924,13 +2583,7 @@
       </p:sp>
       <p:sp>
         <p:nvSpPr>
-          <p:cNvPr id="5" name="Marcador de pie de página 4">
-            <a:extLst>
-              <a:ext uri="{FF2B5EF4-FFF2-40B4-BE49-F238E27FC236}">
-                <a16:creationId xmlns:a16="http://schemas.microsoft.com/office/drawing/2014/main" id="{7264F298-4BDB-4823-9427-1E547A5FAF0A}"/>
-              </a:ext>
-            </a:extLst>
-          </p:cNvPr>
+          <p:cNvPr id="5" name="Footer Placeholder 4"/>
           <p:cNvSpPr>
             <a:spLocks noGrp="1"/>
           </p:cNvSpPr>
@@ -2967,13 +2620,7 @@
       </p:sp>
       <p:sp>
         <p:nvSpPr>
-          <p:cNvPr id="6" name="Marcador de número de diapositiva 5">
-            <a:extLst>
-              <a:ext uri="{FF2B5EF4-FFF2-40B4-BE49-F238E27FC236}">
-                <a16:creationId xmlns:a16="http://schemas.microsoft.com/office/drawing/2014/main" id="{E0246AB4-A8A3-489D-8333-DD163D33185E}"/>
-              </a:ext>
-            </a:extLst>
-          </p:cNvPr>
+          <p:cNvPr id="6" name="Slide Number Placeholder 5"/>
           <p:cNvSpPr>
             <a:spLocks noGrp="1"/>
           </p:cNvSpPr>
@@ -3015,23 +2662,23 @@
     </p:spTree>
     <p:extLst>
       <p:ext uri="{BB962C8B-B14F-4D97-AF65-F5344CB8AC3E}">
-        <p14:creationId xmlns:p14="http://schemas.microsoft.com/office/powerpoint/2010/main" val="1310129325"/>
+        <p14:creationId xmlns:p14="http://schemas.microsoft.com/office/powerpoint/2010/main" val="3840174195"/>
       </p:ext>
     </p:extLst>
   </p:cSld>
-  <p:clrMap bg1="lt1" tx1="dk1" bg2="lt2" tx2="dk2" accent1="accent1" accent2="accent2" accent3="accent3" accent4="accent4" accent5="accent5" accent6="accent6" hlink="hlink" folHlink="folHlink"/>
+  <p:clrMap bg1="dk1" tx1="lt1" bg2="dk2" tx2="lt2" accent1="accent1" accent2="accent2" accent3="accent3" accent4="accent4" accent5="accent5" accent6="accent6" hlink="hlink" folHlink="folHlink"/>
   <p:sldLayoutIdLst>
-    <p:sldLayoutId id="2147483649" r:id="rId1"/>
-    <p:sldLayoutId id="2147483650" r:id="rId2"/>
-    <p:sldLayoutId id="2147483651" r:id="rId3"/>
-    <p:sldLayoutId id="2147483652" r:id="rId4"/>
-    <p:sldLayoutId id="2147483653" r:id="rId5"/>
-    <p:sldLayoutId id="2147483654" r:id="rId6"/>
-    <p:sldLayoutId id="2147483655" r:id="rId7"/>
-    <p:sldLayoutId id="2147483656" r:id="rId8"/>
-    <p:sldLayoutId id="2147483657" r:id="rId9"/>
-    <p:sldLayoutId id="2147483658" r:id="rId10"/>
-    <p:sldLayoutId id="2147483659" r:id="rId11"/>
+    <p:sldLayoutId id="2147483661" r:id="rId1"/>
+    <p:sldLayoutId id="2147483662" r:id="rId2"/>
+    <p:sldLayoutId id="2147483663" r:id="rId3"/>
+    <p:sldLayoutId id="2147483664" r:id="rId4"/>
+    <p:sldLayoutId id="2147483665" r:id="rId5"/>
+    <p:sldLayoutId id="2147483666" r:id="rId6"/>
+    <p:sldLayoutId id="2147483667" r:id="rId7"/>
+    <p:sldLayoutId id="2147483668" r:id="rId8"/>
+    <p:sldLayoutId id="2147483669" r:id="rId9"/>
+    <p:sldLayoutId id="2147483670" r:id="rId10"/>
+    <p:sldLayoutId id="2147483671" r:id="rId11"/>
   </p:sldLayoutIdLst>
   <p:txStyles>
     <p:titleStyle>
@@ -3219,7 +2866,7 @@
     </p:bodyStyle>
     <p:otherStyle>
       <a:defPPr>
-        <a:defRPr lang="es-ES"/>
+        <a:defRPr lang="en-US"/>
       </a:defPPr>
       <a:lvl1pPr marL="0" algn="l" defTabSz="914400" rtl="0" eaLnBrk="1" latinLnBrk="0" hangingPunct="1">
         <a:defRPr sz="1800" kern="1200">
@@ -3319,6 +2966,14 @@
 <file path=ppt/slides/slide1.xml><?xml version="1.0" encoding="utf-8"?>
 <p:sld xmlns:a="http://schemas.openxmlformats.org/drawingml/2006/main" xmlns:r="http://schemas.openxmlformats.org/officeDocument/2006/relationships" xmlns:p="http://schemas.openxmlformats.org/presentationml/2006/main">
   <p:cSld>
+    <p:bg>
+      <p:bgPr>
+        <a:solidFill>
+          <a:schemeClr val="bg1"/>
+        </a:solidFill>
+        <a:effectLst/>
+      </p:bgPr>
+    </p:bg>
     <p:spTree>
       <p:nvGrpSpPr>
         <p:cNvPr id="1" name=""/>
@@ -3333,6 +2988,348 @@
           <a:chExt cx="0" cy="0"/>
         </a:xfrm>
       </p:grpSpPr>
+      <p:sp useBgFill="1">
+        <p:nvSpPr>
+          <p:cNvPr id="37" name="Rectangle 36">
+            <a:extLst>
+              <a:ext uri="{FF2B5EF4-FFF2-40B4-BE49-F238E27FC236}">
+                <a16:creationId xmlns:a16="http://schemas.microsoft.com/office/drawing/2014/main" id="{1483E7BA-B114-4C65-AD2C-DB8FB2C658FA}"/>
+              </a:ext>
+              <a:ext uri="{C183D7F6-B498-43B3-948B-1728B52AA6E4}">
+                <adec:decorative xmlns:adec="http://schemas.microsoft.com/office/drawing/2017/decorative" val="1"/>
+              </a:ext>
+            </a:extLst>
+          </p:cNvPr>
+          <p:cNvSpPr>
+            <a:spLocks noGrp="1" noRot="1" noChangeAspect="1" noMove="1" noResize="1" noEditPoints="1" noAdjustHandles="1" noChangeArrowheads="1" noChangeShapeType="1" noTextEdit="1"/>
+          </p:cNvSpPr>
+          <p:nvPr>
+            <p:extLst>
+              <p:ext uri="{386F3935-93C4-4BCD-93E2-E3B085C9AB24}">
+                <p16:designElem xmlns:p16="http://schemas.microsoft.com/office/powerpoint/2015/main" val="1"/>
+              </p:ext>
+            </p:extLst>
+          </p:nvPr>
+        </p:nvSpPr>
+        <p:spPr>
+          <a:xfrm>
+            <a:off x="0" y="0"/>
+            <a:ext cx="12192000" cy="6858000"/>
+          </a:xfrm>
+          <a:prstGeom prst="rect">
+            <a:avLst/>
+          </a:prstGeom>
+          <a:ln w="12700" cap="flat" cmpd="sng" algn="ctr">
+            <a:noFill/>
+            <a:prstDash val="solid"/>
+            <a:miter lim="800000"/>
+          </a:ln>
+          <a:effectLst/>
+          <a:extLst>
+            <a:ext uri="{91240B29-F687-4F45-9708-019B960494DF}">
+              <a14:hiddenLine xmlns:a14="http://schemas.microsoft.com/office/drawing/2010/main" w="12700" cap="flat" cmpd="sng" algn="ctr">
+                <a:solidFill>
+                  <a:schemeClr val="accent1">
+                    <a:shade val="50000"/>
+                  </a:schemeClr>
+                </a:solidFill>
+                <a:prstDash val="solid"/>
+                <a:miter lim="800000"/>
+              </a14:hiddenLine>
+            </a:ext>
+          </a:extLst>
+        </p:spPr>
+        <p:style>
+          <a:lnRef idx="2">
+            <a:schemeClr val="accent1">
+              <a:shade val="50000"/>
+            </a:schemeClr>
+          </a:lnRef>
+          <a:fillRef idx="1">
+            <a:schemeClr val="accent1"/>
+          </a:fillRef>
+          <a:effectRef idx="0">
+            <a:schemeClr val="accent1"/>
+          </a:effectRef>
+          <a:fontRef idx="minor">
+            <a:schemeClr val="lt1"/>
+          </a:fontRef>
+        </p:style>
+        <p:txBody>
+          <a:bodyPr rtlCol="0" anchor="ctr"/>
+          <a:lstStyle/>
+          <a:p>
+            <a:pPr algn="ctr"/>
+            <a:endParaRPr lang="en-US"/>
+          </a:p>
+        </p:txBody>
+      </p:sp>
+      <p:grpSp>
+        <p:nvGrpSpPr>
+          <p:cNvPr id="39" name="Group 38">
+            <a:extLst>
+              <a:ext uri="{FF2B5EF4-FFF2-40B4-BE49-F238E27FC236}">
+                <a16:creationId xmlns:a16="http://schemas.microsoft.com/office/drawing/2014/main" id="{02E8B24A-E924-4EA4-951E-022F5DCF4279}"/>
+              </a:ext>
+              <a:ext uri="{C183D7F6-B498-43B3-948B-1728B52AA6E4}">
+                <adec:decorative xmlns:adec="http://schemas.microsoft.com/office/drawing/2017/decorative" val="1"/>
+              </a:ext>
+            </a:extLst>
+          </p:cNvPr>
+          <p:cNvGrpSpPr>
+            <a:grpSpLocks noGrp="1" noUngrp="1" noRot="1" noChangeAspect="1" noMove="1" noResize="1"/>
+          </p:cNvGrpSpPr>
+          <p:nvPr>
+            <p:extLst>
+              <p:ext uri="{386F3935-93C4-4BCD-93E2-E3B085C9AB24}">
+                <p16:designElem xmlns:p16="http://schemas.microsoft.com/office/powerpoint/2015/main" val="1"/>
+              </p:ext>
+            </p:extLst>
+          </p:nvPr>
+        </p:nvGrpSpPr>
+        <p:grpSpPr>
+          <a:xfrm>
+            <a:off x="0" y="0"/>
+            <a:ext cx="12192000" cy="6858000"/>
+            <a:chOff x="0" y="0"/>
+            <a:chExt cx="12192000" cy="6858000"/>
+          </a:xfrm>
+        </p:grpSpPr>
+        <p:sp>
+          <p:nvSpPr>
+            <p:cNvPr id="40" name="Rectangle 39">
+              <a:extLst>
+                <a:ext uri="{FF2B5EF4-FFF2-40B4-BE49-F238E27FC236}">
+                  <a16:creationId xmlns:a16="http://schemas.microsoft.com/office/drawing/2014/main" id="{C10EB1CC-8FDC-4472-9750-CD4C1724883B}"/>
+                </a:ext>
+                <a:ext uri="{C183D7F6-B498-43B3-948B-1728B52AA6E4}">
+                  <adec:decorative xmlns:adec="http://schemas.microsoft.com/office/drawing/2017/decorative" val="1"/>
+                </a:ext>
+              </a:extLst>
+            </p:cNvPr>
+            <p:cNvSpPr/>
+            <p:nvPr>
+              <p:extLst>
+                <p:ext uri="{386F3935-93C4-4BCD-93E2-E3B085C9AB24}">
+                  <p16:designElem xmlns:p16="http://schemas.microsoft.com/office/powerpoint/2015/main" val="1"/>
+                </p:ext>
+              </p:extLst>
+            </p:nvPr>
+          </p:nvSpPr>
+          <p:spPr>
+            <a:xfrm>
+              <a:off x="0" y="0"/>
+              <a:ext cx="12192000" cy="6858000"/>
+            </a:xfrm>
+            <a:prstGeom prst="rect">
+              <a:avLst/>
+            </a:prstGeom>
+            <a:solidFill>
+              <a:schemeClr val="bg1">
+                <a:lumMod val="95000"/>
+              </a:schemeClr>
+            </a:solidFill>
+            <a:ln>
+              <a:noFill/>
+            </a:ln>
+          </p:spPr>
+          <p:style>
+            <a:lnRef idx="2">
+              <a:schemeClr val="accent1">
+                <a:shade val="50000"/>
+              </a:schemeClr>
+            </a:lnRef>
+            <a:fillRef idx="1">
+              <a:schemeClr val="accent1"/>
+            </a:fillRef>
+            <a:effectRef idx="0">
+              <a:schemeClr val="accent1"/>
+            </a:effectRef>
+            <a:fontRef idx="minor">
+              <a:schemeClr val="lt1"/>
+            </a:fontRef>
+          </p:style>
+          <p:txBody>
+            <a:bodyPr rtlCol="0" anchor="ctr"/>
+            <a:lstStyle/>
+            <a:p>
+              <a:pPr algn="ctr"/>
+              <a:endParaRPr lang="en-US"/>
+            </a:p>
+          </p:txBody>
+        </p:sp>
+        <p:sp>
+          <p:nvSpPr>
+            <p:cNvPr id="41" name="Rectangle 40">
+              <a:extLst>
+                <a:ext uri="{FF2B5EF4-FFF2-40B4-BE49-F238E27FC236}">
+                  <a16:creationId xmlns:a16="http://schemas.microsoft.com/office/drawing/2014/main" id="{D3A054A7-C0C2-4CBF-ACC4-EAD2ADD14785}"/>
+                </a:ext>
+                <a:ext uri="{C183D7F6-B498-43B3-948B-1728B52AA6E4}">
+                  <adec:decorative xmlns:adec="http://schemas.microsoft.com/office/drawing/2017/decorative" val="1"/>
+                </a:ext>
+              </a:extLst>
+            </p:cNvPr>
+            <p:cNvSpPr/>
+            <p:nvPr>
+              <p:extLst>
+                <p:ext uri="{386F3935-93C4-4BCD-93E2-E3B085C9AB24}">
+                  <p16:designElem xmlns:p16="http://schemas.microsoft.com/office/powerpoint/2015/main" val="1"/>
+                </p:ext>
+              </p:extLst>
+            </p:nvPr>
+          </p:nvSpPr>
+          <p:spPr>
+            <a:xfrm>
+              <a:off x="0" y="0"/>
+              <a:ext cx="12192000" cy="6858000"/>
+            </a:xfrm>
+            <a:prstGeom prst="rect">
+              <a:avLst/>
+            </a:prstGeom>
+            <a:solidFill>
+              <a:schemeClr val="accent4">
+                <a:lumMod val="75000"/>
+                <a:alpha val="7000"/>
+              </a:schemeClr>
+            </a:solidFill>
+            <a:ln>
+              <a:noFill/>
+            </a:ln>
+          </p:spPr>
+          <p:style>
+            <a:lnRef idx="2">
+              <a:schemeClr val="accent1">
+                <a:shade val="50000"/>
+              </a:schemeClr>
+            </a:lnRef>
+            <a:fillRef idx="1">
+              <a:schemeClr val="accent1"/>
+            </a:fillRef>
+            <a:effectRef idx="0">
+              <a:schemeClr val="accent1"/>
+            </a:effectRef>
+            <a:fontRef idx="minor">
+              <a:schemeClr val="lt1"/>
+            </a:fontRef>
+          </p:style>
+          <p:txBody>
+            <a:bodyPr rtlCol="0" anchor="ctr"/>
+            <a:lstStyle/>
+            <a:p>
+              <a:pPr algn="ctr"/>
+              <a:endParaRPr lang="en-US"/>
+            </a:p>
+          </p:txBody>
+        </p:sp>
+      </p:grpSp>
+      <p:sp>
+        <p:nvSpPr>
+          <p:cNvPr id="43" name="Rectangle 42">
+            <a:extLst>
+              <a:ext uri="{FF2B5EF4-FFF2-40B4-BE49-F238E27FC236}">
+                <a16:creationId xmlns:a16="http://schemas.microsoft.com/office/drawing/2014/main" id="{7EA2FCBD-319F-4A4F-9834-E50E3DD2A028}"/>
+              </a:ext>
+              <a:ext uri="{C183D7F6-B498-43B3-948B-1728B52AA6E4}">
+                <adec:decorative xmlns:adec="http://schemas.microsoft.com/office/drawing/2017/decorative" val="1"/>
+              </a:ext>
+            </a:extLst>
+          </p:cNvPr>
+          <p:cNvSpPr>
+            <a:spLocks noGrp="1" noRot="1" noChangeAspect="1" noMove="1" noResize="1" noEditPoints="1" noAdjustHandles="1" noChangeArrowheads="1" noChangeShapeType="1" noTextEdit="1"/>
+          </p:cNvSpPr>
+          <p:nvPr>
+            <p:extLst>
+              <p:ext uri="{386F3935-93C4-4BCD-93E2-E3B085C9AB24}">
+                <p16:designElem xmlns:p16="http://schemas.microsoft.com/office/powerpoint/2015/main" val="1"/>
+              </p:ext>
+            </p:extLst>
+          </p:nvPr>
+        </p:nvSpPr>
+        <p:spPr>
+          <a:xfrm>
+            <a:off x="550864" y="4437063"/>
+            <a:ext cx="11088686" cy="1881188"/>
+          </a:xfrm>
+          <a:prstGeom prst="rect">
+            <a:avLst/>
+          </a:prstGeom>
+          <a:solidFill>
+            <a:schemeClr val="bg1"/>
+          </a:solidFill>
+          <a:ln>
+            <a:noFill/>
+          </a:ln>
+          <a:effectLst>
+            <a:outerShdw blurRad="508000" dist="101600" dir="5400000" algn="tl" rotWithShape="0">
+              <a:prstClr val="black">
+                <a:alpha val="10000"/>
+              </a:prstClr>
+            </a:outerShdw>
+          </a:effectLst>
+        </p:spPr>
+        <p:style>
+          <a:lnRef idx="2">
+            <a:schemeClr val="accent1">
+              <a:shade val="50000"/>
+            </a:schemeClr>
+          </a:lnRef>
+          <a:fillRef idx="1">
+            <a:schemeClr val="accent1"/>
+          </a:fillRef>
+          <a:effectRef idx="0">
+            <a:schemeClr val="accent1"/>
+          </a:effectRef>
+          <a:fontRef idx="minor">
+            <a:schemeClr val="lt1"/>
+          </a:fontRef>
+        </p:style>
+        <p:txBody>
+          <a:bodyPr rtlCol="0" anchor="ctr"/>
+          <a:lstStyle/>
+          <a:p>
+            <a:pPr algn="ctr"/>
+            <a:endParaRPr lang="en-US"/>
+          </a:p>
+        </p:txBody>
+      </p:sp>
+      <p:pic>
+        <p:nvPicPr>
+          <p:cNvPr id="5" name="Imagen 4" descr="Patrón de fondo&#10;&#10;Descripción generada automáticamente">
+            <a:extLst>
+              <a:ext uri="{FF2B5EF4-FFF2-40B4-BE49-F238E27FC236}">
+                <a16:creationId xmlns:a16="http://schemas.microsoft.com/office/drawing/2014/main" id="{6D89A521-3CF8-4928-9CDB-4894680A61E1}"/>
+              </a:ext>
+            </a:extLst>
+          </p:cNvPr>
+          <p:cNvPicPr>
+            <a:picLocks noChangeAspect="1"/>
+          </p:cNvPicPr>
+          <p:nvPr/>
+        </p:nvPicPr>
+        <p:blipFill>
+          <a:blip r:embed="rId2">
+            <a:extLst>
+              <a:ext uri="{28A0092B-C50C-407E-A947-70E740481C1C}">
+                <a14:useLocalDpi xmlns:a14="http://schemas.microsoft.com/office/drawing/2010/main" val="0"/>
+              </a:ext>
+            </a:extLst>
+          </a:blip>
+          <a:stretch>
+            <a:fillRect/>
+          </a:stretch>
+        </p:blipFill>
+        <p:spPr>
+          <a:xfrm>
+            <a:off x="-3329888" y="693518"/>
+            <a:ext cx="16026601" cy="5328844"/>
+          </a:xfrm>
+          <a:prstGeom prst="rect">
+            <a:avLst/>
+          </a:prstGeom>
+          <a:effectLst/>
+        </p:spPr>
+      </p:pic>
       <p:sp>
         <p:nvSpPr>
           <p:cNvPr id="2" name="Título 1">
@@ -3349,46 +3346,23 @@
             <p:ph type="ctrTitle"/>
           </p:nvPr>
         </p:nvSpPr>
-        <p:spPr/>
-        <p:txBody>
-          <a:bodyPr/>
-          <a:lstStyle/>
-          <a:p>
-            <a:r>
-              <a:rPr lang="es-ES" dirty="0"/>
+        <p:spPr>
+          <a:xfrm>
+            <a:off x="1526309" y="2278817"/>
+            <a:ext cx="4033981" cy="2300366"/>
+          </a:xfrm>
+        </p:spPr>
+        <p:txBody>
+          <a:bodyPr vert="horz" wrap="square" lIns="91440" tIns="45720" rIns="91440" bIns="45720" rtlCol="0" anchor="t">
+            <a:normAutofit fontScale="90000"/>
+          </a:bodyPr>
+          <a:lstStyle/>
+          <a:p>
+            <a:r>
+              <a:rPr lang="en-US" sz="7200" kern="1200" dirty="0">
+                <a:latin typeface="Algerian" panose="04020705040A02060702" pitchFamily="82" charset="0"/>
+              </a:rPr>
               <a:t>VERDANT SORROW</a:t>
-            </a:r>
-          </a:p>
-        </p:txBody>
-      </p:sp>
-      <p:sp>
-        <p:nvSpPr>
-          <p:cNvPr id="3" name="Subtítulo 2">
-            <a:extLst>
-              <a:ext uri="{FF2B5EF4-FFF2-40B4-BE49-F238E27FC236}">
-                <a16:creationId xmlns:a16="http://schemas.microsoft.com/office/drawing/2014/main" id="{FB24E10F-CA9A-4919-B69D-FEB98025569E}"/>
-              </a:ext>
-            </a:extLst>
-          </p:cNvPr>
-          <p:cNvSpPr>
-            <a:spLocks noGrp="1"/>
-          </p:cNvSpPr>
-          <p:nvPr>
-            <p:ph type="subTitle" idx="1"/>
-          </p:nvPr>
-        </p:nvSpPr>
-        <p:spPr/>
-        <p:txBody>
-          <a:bodyPr/>
-          <a:lstStyle/>
-          <a:p>
-            <a:r>
-              <a:rPr lang="es-ES" dirty="0" err="1"/>
-              <a:t>Xupap</a:t>
-            </a:r>
-            <a:r>
-              <a:rPr lang="es-ES" dirty="0"/>
-              <a:t> Inc.</a:t>
             </a:r>
           </a:p>
         </p:txBody>
@@ -3445,7 +3419,9 @@
           <a:lstStyle/>
           <a:p>
             <a:r>
-              <a:rPr lang="es-ES" dirty="0"/>
+              <a:rPr lang="es-ES" dirty="0">
+                <a:latin typeface="Algerian" panose="04020705040A02060702" pitchFamily="82" charset="0"/>
+              </a:rPr>
               <a:t>¿Quiénes somos?</a:t>
             </a:r>
           </a:p>
@@ -3478,161 +3454,172 @@
           <a:lstStyle/>
           <a:p>
             <a:r>
-              <a:rPr lang="es-ES" sz="1800" b="0" i="1" u="none" strike="noStrike" dirty="0">
+              <a:rPr lang="es-ES" sz="1800" b="0" strike="noStrike" dirty="0">
                 <a:solidFill>
-                  <a:srgbClr val="000000"/>
+                  <a:schemeClr val="tx1">
+                    <a:lumMod val="95000"/>
+                  </a:schemeClr>
                 </a:solidFill>
                 <a:effectLst/>
-                <a:latin typeface="Arial" panose="020B0604020202020204" pitchFamily="34" charset="0"/>
+                <a:latin typeface="Calibri" panose="020F0502020204030204" pitchFamily="34" charset="0"/>
+                <a:cs typeface="Calibri" panose="020F0502020204030204" pitchFamily="34" charset="0"/>
               </a:rPr>
-              <a:t> </a:t>
-            </a:r>
-            <a:r>
-              <a:rPr lang="es-ES" sz="1800" b="0" i="1" u="sng" strike="noStrike" dirty="0">
+              <a:t>Daniel Martín Gómez</a:t>
+            </a:r>
+          </a:p>
+          <a:p>
+            <a:r>
+              <a:rPr lang="es-ES" sz="1800" b="0" u="none" strike="noStrike" dirty="0">
                 <a:solidFill>
-                  <a:srgbClr val="1155CC"/>
+                  <a:schemeClr val="tx1">
+                    <a:lumMod val="95000"/>
+                  </a:schemeClr>
                 </a:solidFill>
                 <a:effectLst/>
-                <a:latin typeface="Arial" panose="020B0604020202020204" pitchFamily="34" charset="0"/>
-                <a:hlinkClick r:id="rId2"/>
+                <a:latin typeface="Calibri" panose="020F0502020204030204" pitchFamily="34" charset="0"/>
+                <a:cs typeface="Calibri" panose="020F0502020204030204" pitchFamily="34" charset="0"/>
               </a:rPr>
-              <a:t>Daniel Martín Gómez</a:t>
-            </a:r>
-            <a:endParaRPr lang="es-ES" sz="1800" b="0" i="1" u="sng" strike="noStrike" dirty="0">
+              <a:t>Miriam Martín Sánchez</a:t>
+            </a:r>
+          </a:p>
+          <a:p>
+            <a:r>
+              <a:rPr lang="es-ES" sz="1800" b="0" strike="noStrike" dirty="0">
+                <a:solidFill>
+                  <a:schemeClr val="tx1">
+                    <a:lumMod val="95000"/>
+                  </a:schemeClr>
+                </a:solidFill>
+                <a:effectLst/>
+                <a:latin typeface="Calibri" panose="020F0502020204030204" pitchFamily="34" charset="0"/>
+                <a:cs typeface="Calibri" panose="020F0502020204030204" pitchFamily="34" charset="0"/>
+              </a:rPr>
+              <a:t>Javier Callejo Herrero</a:t>
+            </a:r>
+          </a:p>
+          <a:p>
+            <a:r>
+              <a:rPr lang="es-ES" sz="1800" b="0" u="none" strike="noStrike" dirty="0">
+                <a:solidFill>
+                  <a:schemeClr val="tx1">
+                    <a:lumMod val="95000"/>
+                  </a:schemeClr>
+                </a:solidFill>
+                <a:effectLst/>
+                <a:latin typeface="Calibri" panose="020F0502020204030204" pitchFamily="34" charset="0"/>
+                <a:cs typeface="Calibri" panose="020F0502020204030204" pitchFamily="34" charset="0"/>
+              </a:rPr>
+              <a:t>Laura Gómez Bodego </a:t>
+            </a:r>
+          </a:p>
+          <a:p>
+            <a:r>
+              <a:rPr lang="es-ES" sz="1800" b="0" u="none" strike="noStrike" dirty="0">
+                <a:solidFill>
+                  <a:schemeClr val="tx1">
+                    <a:lumMod val="95000"/>
+                  </a:schemeClr>
+                </a:solidFill>
+                <a:effectLst/>
+                <a:latin typeface="Calibri" panose="020F0502020204030204" pitchFamily="34" charset="0"/>
+                <a:cs typeface="Calibri" panose="020F0502020204030204" pitchFamily="34" charset="0"/>
+              </a:rPr>
+              <a:t>Nacho Del Castillo</a:t>
+            </a:r>
+          </a:p>
+          <a:p>
+            <a:r>
+              <a:rPr lang="es-ES" sz="1800" b="0" u="none" strike="noStrike" dirty="0">
+                <a:solidFill>
+                  <a:schemeClr val="tx1">
+                    <a:lumMod val="95000"/>
+                  </a:schemeClr>
+                </a:solidFill>
+                <a:effectLst/>
+                <a:latin typeface="Calibri" panose="020F0502020204030204" pitchFamily="34" charset="0"/>
+                <a:cs typeface="Calibri" panose="020F0502020204030204" pitchFamily="34" charset="0"/>
+              </a:rPr>
+              <a:t>Javier Muñoz García</a:t>
+            </a:r>
+          </a:p>
+          <a:p>
+            <a:r>
+              <a:rPr lang="es-ES" sz="1800" b="0" u="none" strike="noStrike" dirty="0">
+                <a:solidFill>
+                  <a:schemeClr val="tx1">
+                    <a:lumMod val="95000"/>
+                  </a:schemeClr>
+                </a:solidFill>
+                <a:effectLst/>
+                <a:latin typeface="Calibri" panose="020F0502020204030204" pitchFamily="34" charset="0"/>
+                <a:cs typeface="Calibri" panose="020F0502020204030204" pitchFamily="34" charset="0"/>
+              </a:rPr>
+              <a:t>José María Gómez Pulido</a:t>
+            </a:r>
+          </a:p>
+          <a:p>
+            <a:r>
+              <a:rPr lang="es-ES" sz="1800" b="0" strike="noStrike" dirty="0">
+                <a:solidFill>
+                  <a:schemeClr val="tx1">
+                    <a:lumMod val="95000"/>
+                  </a:schemeClr>
+                </a:solidFill>
+                <a:effectLst/>
+                <a:latin typeface="Calibri" panose="020F0502020204030204" pitchFamily="34" charset="0"/>
+                <a:cs typeface="Calibri" panose="020F0502020204030204" pitchFamily="34" charset="0"/>
+              </a:rPr>
+              <a:t>Paula Morillas Alonso</a:t>
+            </a:r>
+            <a:endParaRPr lang="es-ES" sz="1800" b="0" u="none" strike="noStrike" dirty="0">
               <a:solidFill>
-                <a:srgbClr val="1155CC"/>
+                <a:schemeClr val="tx1">
+                  <a:lumMod val="95000"/>
+                </a:schemeClr>
               </a:solidFill>
               <a:effectLst/>
-              <a:latin typeface="Arial" panose="020B0604020202020204" pitchFamily="34" charset="0"/>
+              <a:latin typeface="Calibri" panose="020F0502020204030204" pitchFamily="34" charset="0"/>
+              <a:cs typeface="Calibri" panose="020F0502020204030204" pitchFamily="34" charset="0"/>
             </a:endParaRPr>
           </a:p>
           <a:p>
             <a:r>
-              <a:rPr lang="es-ES" sz="1800" b="0" i="1" u="none" strike="noStrike" dirty="0">
+              <a:rPr lang="es-ES" sz="1800" b="0" u="none" strike="noStrike" dirty="0">
                 <a:solidFill>
-                  <a:srgbClr val="000000"/>
+                  <a:schemeClr val="tx1">
+                    <a:lumMod val="95000"/>
+                  </a:schemeClr>
                 </a:solidFill>
                 <a:effectLst/>
-                <a:latin typeface="Arial" panose="020B0604020202020204" pitchFamily="34" charset="0"/>
+                <a:latin typeface="Calibri" panose="020F0502020204030204" pitchFamily="34" charset="0"/>
+                <a:cs typeface="Calibri" panose="020F0502020204030204" pitchFamily="34" charset="0"/>
               </a:rPr>
-              <a:t>, Miriam Martín Sánchez, </a:t>
-            </a:r>
-          </a:p>
-          <a:p>
-            <a:r>
-              <a:rPr lang="es-ES" sz="1800" b="0" i="1" u="sng" strike="noStrike" dirty="0">
+              <a:t> Rodrigo Sánchez Torres</a:t>
+            </a:r>
+          </a:p>
+          <a:p>
+            <a:r>
+              <a:rPr lang="es-ES" sz="1800" b="0" u="none" strike="noStrike" dirty="0">
                 <a:solidFill>
-                  <a:srgbClr val="1155CC"/>
+                  <a:schemeClr val="tx1">
+                    <a:lumMod val="95000"/>
+                  </a:schemeClr>
                 </a:solidFill>
                 <a:effectLst/>
-                <a:latin typeface="Arial" panose="020B0604020202020204" pitchFamily="34" charset="0"/>
-                <a:hlinkClick r:id="rId3"/>
-              </a:rPr>
-              <a:t>Javier Callejo Herrero</a:t>
-            </a:r>
-            <a:endParaRPr lang="es-ES" sz="1800" b="0" i="1" u="sng" strike="noStrike" dirty="0">
-              <a:solidFill>
-                <a:srgbClr val="1155CC"/>
-              </a:solidFill>
-              <a:effectLst/>
-              <a:latin typeface="Arial" panose="020B0604020202020204" pitchFamily="34" charset="0"/>
-            </a:endParaRPr>
-          </a:p>
-          <a:p>
-            <a:r>
-              <a:rPr lang="es-ES" sz="1800" b="0" i="1" u="none" strike="noStrike" dirty="0">
-                <a:solidFill>
-                  <a:srgbClr val="000000"/>
-                </a:solidFill>
-                <a:effectLst/>
-                <a:latin typeface="Arial" panose="020B0604020202020204" pitchFamily="34" charset="0"/>
-              </a:rPr>
-              <a:t>, Laura Gómez Bodego,  </a:t>
-            </a:r>
-          </a:p>
-          <a:p>
-            <a:r>
-              <a:rPr lang="es-ES" sz="1800" b="0" i="1" u="none" strike="noStrike" dirty="0">
-                <a:solidFill>
-                  <a:srgbClr val="000000"/>
-                </a:solidFill>
-                <a:effectLst/>
-                <a:latin typeface="Arial" panose="020B0604020202020204" pitchFamily="34" charset="0"/>
-              </a:rPr>
-              <a:t>Nacho Del Castillo, </a:t>
-            </a:r>
-          </a:p>
-          <a:p>
-            <a:r>
-              <a:rPr lang="es-ES" sz="1800" b="0" i="1" u="none" strike="noStrike" dirty="0">
-                <a:solidFill>
-                  <a:srgbClr val="000000"/>
-                </a:solidFill>
-                <a:effectLst/>
-                <a:latin typeface="Arial" panose="020B0604020202020204" pitchFamily="34" charset="0"/>
-              </a:rPr>
-              <a:t>Javier Muñoz García, </a:t>
-            </a:r>
-          </a:p>
-          <a:p>
-            <a:r>
-              <a:rPr lang="es-ES" sz="1800" b="0" i="1" u="none" strike="noStrike" dirty="0">
-                <a:solidFill>
-                  <a:srgbClr val="000000"/>
-                </a:solidFill>
-                <a:effectLst/>
-                <a:latin typeface="Arial" panose="020B0604020202020204" pitchFamily="34" charset="0"/>
-              </a:rPr>
-              <a:t>José María Gómez Pulido,</a:t>
-            </a:r>
-          </a:p>
-          <a:p>
-            <a:r>
-              <a:rPr lang="es-ES" sz="1800" b="0" i="1" u="sng" strike="noStrike" dirty="0">
-                <a:solidFill>
-                  <a:srgbClr val="1155CC"/>
-                </a:solidFill>
-                <a:effectLst/>
-                <a:latin typeface="Arial" panose="020B0604020202020204" pitchFamily="34" charset="0"/>
-                <a:hlinkClick r:id="rId4"/>
-              </a:rPr>
-              <a:t>Paula Morillas Alonso</a:t>
-            </a:r>
-            <a:r>
-              <a:rPr lang="es-ES" sz="1800" b="0" i="1" u="none" strike="noStrike" dirty="0">
-                <a:solidFill>
-                  <a:srgbClr val="000000"/>
-                </a:solidFill>
-                <a:effectLst/>
-                <a:latin typeface="Arial" panose="020B0604020202020204" pitchFamily="34" charset="0"/>
-              </a:rPr>
-              <a:t>,</a:t>
-            </a:r>
-          </a:p>
-          <a:p>
-            <a:r>
-              <a:rPr lang="es-ES" sz="1800" b="0" i="1" u="none" strike="noStrike" dirty="0">
-                <a:solidFill>
-                  <a:srgbClr val="000000"/>
-                </a:solidFill>
-                <a:effectLst/>
-                <a:latin typeface="Arial" panose="020B0604020202020204" pitchFamily="34" charset="0"/>
-              </a:rPr>
-              <a:t> Rodrigo Sánchez Torres, </a:t>
-            </a:r>
-          </a:p>
-          <a:p>
-            <a:r>
-              <a:rPr lang="es-ES" sz="1800" b="0" i="1" u="none" strike="noStrike" dirty="0">
-                <a:solidFill>
-                  <a:srgbClr val="000000"/>
-                </a:solidFill>
-                <a:effectLst/>
-                <a:latin typeface="Arial" panose="020B0604020202020204" pitchFamily="34" charset="0"/>
+                <a:latin typeface="Calibri" panose="020F0502020204030204" pitchFamily="34" charset="0"/>
+                <a:cs typeface="Calibri" panose="020F0502020204030204" pitchFamily="34" charset="0"/>
               </a:rPr>
               <a:t>Sergio Baña Marchante</a:t>
             </a:r>
-            <a:endParaRPr lang="es-ES" dirty="0"/>
+            <a:endParaRPr lang="es-ES" dirty="0">
+              <a:solidFill>
+                <a:schemeClr val="tx1">
+                  <a:lumMod val="95000"/>
+                </a:schemeClr>
+              </a:solidFill>
+              <a:latin typeface="Calibri" panose="020F0502020204030204" pitchFamily="34" charset="0"/>
+              <a:cs typeface="Calibri" panose="020F0502020204030204" pitchFamily="34" charset="0"/>
+            </a:endParaRPr>
           </a:p>
         </p:txBody>
       </p:sp>
@@ -3651,7 +3638,7 @@
           <p:nvPr/>
         </p:nvPicPr>
         <p:blipFill rotWithShape="1">
-          <a:blip r:embed="rId5">
+          <a:blip r:embed="rId2">
             <a:extLst>
               <a:ext uri="{28A0092B-C50C-407E-A947-70E740481C1C}">
                 <a14:useLocalDpi xmlns:a14="http://schemas.microsoft.com/office/drawing/2010/main" val="0"/>
@@ -3663,14 +3650,49 @@
         </p:blipFill>
         <p:spPr>
           <a:xfrm>
-            <a:off x="5860137" y="282659"/>
-            <a:ext cx="4445913" cy="6292681"/>
+            <a:off x="6491335" y="433654"/>
+            <a:ext cx="4232550" cy="5990691"/>
           </a:xfrm>
           <a:prstGeom prst="rect">
             <a:avLst/>
           </a:prstGeom>
         </p:spPr>
       </p:pic>
+      <p:sp>
+        <p:nvSpPr>
+          <p:cNvPr id="6" name="CuadroTexto 5">
+            <a:extLst>
+              <a:ext uri="{FF2B5EF4-FFF2-40B4-BE49-F238E27FC236}">
+                <a16:creationId xmlns:a16="http://schemas.microsoft.com/office/drawing/2014/main" id="{E09DE1E8-084B-4D83-B547-74336F18B618}"/>
+              </a:ext>
+            </a:extLst>
+          </p:cNvPr>
+          <p:cNvSpPr txBox="1"/>
+          <p:nvPr/>
+        </p:nvSpPr>
+        <p:spPr>
+          <a:xfrm>
+            <a:off x="525101" y="6123543"/>
+            <a:ext cx="5869663" cy="369332"/>
+          </a:xfrm>
+          <a:prstGeom prst="rect">
+            <a:avLst/>
+          </a:prstGeom>
+          <a:noFill/>
+        </p:spPr>
+        <p:txBody>
+          <a:bodyPr wrap="square" rtlCol="0">
+            <a:spAutoFit/>
+          </a:bodyPr>
+          <a:lstStyle/>
+          <a:p>
+            <a:r>
+              <a:rPr lang="es-ES" dirty="0"/>
+              <a:t>También conocidos como los guapos del fondo de la clase</a:t>
+            </a:r>
+          </a:p>
+        </p:txBody>
+      </p:sp>
     </p:spTree>
     <p:extLst>
       <p:ext uri="{BB962C8B-B14F-4D97-AF65-F5344CB8AC3E}">
@@ -3717,13 +3739,20 @@
             <p:ph type="title"/>
           </p:nvPr>
         </p:nvSpPr>
-        <p:spPr/>
-        <p:txBody>
-          <a:bodyPr/>
-          <a:lstStyle/>
-          <a:p>
-            <a:r>
-              <a:rPr lang="es-ES" dirty="0"/>
+        <p:spPr>
+          <a:xfrm>
+            <a:off x="838200" y="373882"/>
+            <a:ext cx="10515600" cy="1325563"/>
+          </a:xfrm>
+        </p:spPr>
+        <p:txBody>
+          <a:bodyPr/>
+          <a:lstStyle/>
+          <a:p>
+            <a:r>
+              <a:rPr lang="es-ES" dirty="0">
+                <a:latin typeface="Algerian" panose="04020705040A02060702" pitchFamily="82" charset="0"/>
+              </a:rPr>
               <a:t>¿Cómo decidimos que hacer?</a:t>
             </a:r>
           </a:p>
@@ -3753,14 +3782,97 @@
               </a:ext>
             </a:extLst>
           </a:blip>
-          <a:srcRect l="35808" b="48048"/>
+          <a:srcRect l="33941" t="224" r="1" b="50182"/>
           <a:stretch/>
         </p:blipFill>
         <p:spPr>
           <a:xfrm>
-            <a:off x="2581275" y="1502092"/>
-            <a:ext cx="7924800" cy="5133658"/>
+            <a:off x="2076788" y="1699445"/>
+            <a:ext cx="7477108" cy="4493126"/>
           </a:xfrm>
+        </p:spPr>
+      </p:pic>
+      <p:sp>
+        <p:nvSpPr>
+          <p:cNvPr id="6" name="CuadroTexto 5">
+            <a:extLst>
+              <a:ext uri="{FF2B5EF4-FFF2-40B4-BE49-F238E27FC236}">
+                <a16:creationId xmlns:a16="http://schemas.microsoft.com/office/drawing/2014/main" id="{E2747D45-2F30-42A1-A32E-D39828816348}"/>
+              </a:ext>
+            </a:extLst>
+          </p:cNvPr>
+          <p:cNvSpPr txBox="1"/>
+          <p:nvPr/>
+        </p:nvSpPr>
+        <p:spPr>
+          <a:xfrm>
+            <a:off x="9788533" y="2767280"/>
+            <a:ext cx="2193591" cy="1323439"/>
+          </a:xfrm>
+          <a:prstGeom prst="rect">
+            <a:avLst/>
+          </a:prstGeom>
+          <a:noFill/>
+        </p:spPr>
+        <p:txBody>
+          <a:bodyPr wrap="square" rtlCol="0">
+            <a:spAutoFit/>
+          </a:bodyPr>
+          <a:lstStyle/>
+          <a:p>
+            <a:pPr algn="just"/>
+            <a:r>
+              <a:rPr lang="es-ES" sz="1600" dirty="0"/>
+              <a:t>La mejor lluvia de ideas del mundo, gracias Laura por documentarla tan bien te quiero guapa &lt;3</a:t>
+            </a:r>
+          </a:p>
+        </p:txBody>
+      </p:sp>
+      <p:pic>
+        <p:nvPicPr>
+          <p:cNvPr id="1026" name="Picture 2">
+            <a:extLst>
+              <a:ext uri="{FF2B5EF4-FFF2-40B4-BE49-F238E27FC236}">
+                <a16:creationId xmlns:a16="http://schemas.microsoft.com/office/drawing/2014/main" id="{09A9E583-CD53-48F8-906E-DDC52ADC76B1}"/>
+              </a:ext>
+            </a:extLst>
+          </p:cNvPr>
+          <p:cNvPicPr>
+            <a:picLocks noChangeAspect="1" noChangeArrowheads="1"/>
+          </p:cNvPicPr>
+          <p:nvPr/>
+        </p:nvPicPr>
+        <p:blipFill>
+          <a:blip r:embed="rId3">
+            <a:extLst>
+              <a:ext uri="{28A0092B-C50C-407E-A947-70E740481C1C}">
+                <a14:useLocalDpi xmlns:a14="http://schemas.microsoft.com/office/drawing/2010/main" val="0"/>
+              </a:ext>
+            </a:extLst>
+          </a:blip>
+          <a:srcRect/>
+          <a:stretch>
+            <a:fillRect/>
+          </a:stretch>
+        </p:blipFill>
+        <p:spPr bwMode="auto">
+          <a:xfrm>
+            <a:off x="3608765" y="4090719"/>
+            <a:ext cx="349827" cy="427269"/>
+          </a:xfrm>
+          <a:prstGeom prst="rect">
+            <a:avLst/>
+          </a:prstGeom>
+          <a:noFill/>
+          <a:extLst>
+            <a:ext uri="{909E8E84-426E-40DD-AFC4-6F175D3DCCD1}">
+              <a14:hiddenFill xmlns:a14="http://schemas.microsoft.com/office/drawing/2010/main">
+                <a:solidFill>
+                  <a:srgbClr val="FFFFFF"/>
+                </a:solidFill>
+              </a14:hiddenFill>
+            </a:ext>
+          </a:extLst>
         </p:spPr>
       </p:pic>
     </p:spTree>
@@ -3839,7 +3951,9 @@
         </p:nvSpPr>
         <p:spPr/>
         <p:txBody>
-          <a:bodyPr/>
+          <a:bodyPr>
+            <a:normAutofit/>
+          </a:bodyPr>
           <a:lstStyle/>
           <a:p>
             <a:pPr algn="just" rtl="0" fontAlgn="base">
@@ -3853,9 +3967,11 @@
               <a:buChar char="•"/>
             </a:pPr>
             <a:r>
-              <a:rPr lang="es-ES" sz="1800" b="1" i="0" u="none" strike="noStrike" dirty="0" err="1">
+              <a:rPr lang="es-ES" b="1" i="0" u="none" strike="noStrike" dirty="0" err="1">
                 <a:solidFill>
-                  <a:srgbClr val="000000"/>
+                  <a:schemeClr val="tx1">
+                    <a:lumMod val="95000"/>
+                  </a:schemeClr>
                 </a:solidFill>
                 <a:effectLst/>
                 <a:latin typeface="Arial" panose="020B0604020202020204" pitchFamily="34" charset="0"/>
@@ -3863,9 +3979,11 @@
               <a:t>Dark</a:t>
             </a:r>
             <a:r>
-              <a:rPr lang="es-ES" sz="1800" b="1" i="0" u="none" strike="noStrike" dirty="0">
+              <a:rPr lang="es-ES" b="1" i="0" u="none" strike="noStrike" dirty="0">
                 <a:solidFill>
-                  <a:srgbClr val="000000"/>
+                  <a:schemeClr val="tx1">
+                    <a:lumMod val="95000"/>
+                  </a:schemeClr>
                 </a:solidFill>
                 <a:effectLst/>
                 <a:latin typeface="Arial" panose="020B0604020202020204" pitchFamily="34" charset="0"/>
@@ -3873,45 +3991,26 @@
               <a:t> </a:t>
             </a:r>
             <a:r>
-              <a:rPr lang="es-ES" sz="1800" b="1" i="0" u="none" strike="noStrike" dirty="0" err="1">
+              <a:rPr lang="es-ES" b="1" i="0" u="none" strike="noStrike" dirty="0" err="1">
                 <a:solidFill>
-                  <a:srgbClr val="000000"/>
+                  <a:schemeClr val="tx1">
+                    <a:lumMod val="95000"/>
+                  </a:schemeClr>
                 </a:solidFill>
                 <a:effectLst/>
                 <a:latin typeface="Arial" panose="020B0604020202020204" pitchFamily="34" charset="0"/>
               </a:rPr>
               <a:t>Souls</a:t>
             </a:r>
-            <a:r>
-              <a:rPr lang="es-ES" sz="1800" b="0" i="0" u="none" strike="noStrike" dirty="0">
-                <a:solidFill>
-                  <a:srgbClr val="000000"/>
-                </a:solidFill>
-                <a:effectLst/>
-                <a:latin typeface="Arial" panose="020B0604020202020204" pitchFamily="34" charset="0"/>
-              </a:rPr>
-              <a:t>, </a:t>
-            </a:r>
-            <a:r>
-              <a:rPr lang="es-ES" sz="1800" b="0" i="0" u="none" strike="noStrike" dirty="0" err="1">
-                <a:solidFill>
-                  <a:srgbClr val="000000"/>
-                </a:solidFill>
-                <a:effectLst/>
-                <a:latin typeface="Arial" panose="020B0604020202020204" pitchFamily="34" charset="0"/>
-              </a:rPr>
-              <a:t>FromSoftware</a:t>
-            </a:r>
-            <a:r>
-              <a:rPr lang="es-ES" sz="1800" b="0" i="0" u="none" strike="noStrike" dirty="0">
-                <a:solidFill>
-                  <a:srgbClr val="000000"/>
-                </a:solidFill>
-                <a:effectLst/>
-                <a:latin typeface="Arial" panose="020B0604020202020204" pitchFamily="34" charset="0"/>
-              </a:rPr>
-              <a:t>, BANDAI NAMCO.</a:t>
-            </a:r>
+            <a:endParaRPr lang="es-ES" b="0" i="0" u="none" strike="noStrike" dirty="0">
+              <a:solidFill>
+                <a:schemeClr val="tx1">
+                  <a:lumMod val="95000"/>
+                </a:schemeClr>
+              </a:solidFill>
+              <a:effectLst/>
+              <a:latin typeface="Arial" panose="020B0604020202020204" pitchFamily="34" charset="0"/>
+            </a:endParaRPr>
           </a:p>
           <a:p>
             <a:pPr algn="just" rtl="0" fontAlgn="base">
@@ -3925,9 +4024,11 @@
               <a:buChar char="•"/>
             </a:pPr>
             <a:r>
-              <a:rPr lang="es-ES" sz="1800" b="1" i="0" u="none" strike="noStrike" dirty="0">
+              <a:rPr lang="es-ES" b="1" i="0" u="none" strike="noStrike" dirty="0">
                 <a:solidFill>
-                  <a:srgbClr val="000000"/>
+                  <a:schemeClr val="tx1">
+                    <a:lumMod val="95000"/>
+                  </a:schemeClr>
                 </a:solidFill>
                 <a:effectLst/>
                 <a:latin typeface="Arial" panose="020B0604020202020204" pitchFamily="34" charset="0"/>
@@ -3935,85 +4036,26 @@
               <a:t>Ender </a:t>
             </a:r>
             <a:r>
-              <a:rPr lang="es-ES" sz="1800" b="1" i="0" u="none" strike="noStrike" dirty="0" err="1">
+              <a:rPr lang="es-ES" b="1" i="0" u="none" strike="noStrike" dirty="0" err="1">
                 <a:solidFill>
-                  <a:srgbClr val="000000"/>
+                  <a:schemeClr val="tx1">
+                    <a:lumMod val="95000"/>
+                  </a:schemeClr>
                 </a:solidFill>
                 <a:effectLst/>
                 <a:latin typeface="Arial" panose="020B0604020202020204" pitchFamily="34" charset="0"/>
               </a:rPr>
               <a:t>lilies</a:t>
             </a:r>
-            <a:r>
-              <a:rPr lang="es-ES" sz="1800" b="0" i="0" u="none" strike="noStrike" dirty="0">
-                <a:solidFill>
-                  <a:srgbClr val="000000"/>
-                </a:solidFill>
-                <a:effectLst/>
-                <a:latin typeface="Arial" panose="020B0604020202020204" pitchFamily="34" charset="0"/>
-              </a:rPr>
-              <a:t>, </a:t>
-            </a:r>
-            <a:r>
-              <a:rPr lang="es-ES" sz="1800" b="0" i="0" u="none" strike="noStrike" dirty="0" err="1">
-                <a:solidFill>
-                  <a:srgbClr val="000000"/>
-                </a:solidFill>
-                <a:effectLst/>
-                <a:latin typeface="Arial" panose="020B0604020202020204" pitchFamily="34" charset="0"/>
-              </a:rPr>
-              <a:t>Adglobe</a:t>
-            </a:r>
-            <a:r>
-              <a:rPr lang="es-ES" sz="1800" b="0" i="0" u="none" strike="noStrike" dirty="0">
-                <a:solidFill>
-                  <a:srgbClr val="000000"/>
-                </a:solidFill>
-                <a:effectLst/>
-                <a:latin typeface="Arial" panose="020B0604020202020204" pitchFamily="34" charset="0"/>
-              </a:rPr>
-              <a:t>, Live </a:t>
-            </a:r>
-            <a:r>
-              <a:rPr lang="es-ES" sz="1800" b="0" i="0" u="none" strike="noStrike" dirty="0" err="1">
-                <a:solidFill>
-                  <a:srgbClr val="000000"/>
-                </a:solidFill>
-                <a:effectLst/>
-                <a:latin typeface="Arial" panose="020B0604020202020204" pitchFamily="34" charset="0"/>
-              </a:rPr>
-              <a:t>Wire,Binary</a:t>
-            </a:r>
-            <a:r>
-              <a:rPr lang="es-ES" sz="1800" b="0" i="0" u="none" strike="noStrike" dirty="0">
-                <a:solidFill>
-                  <a:srgbClr val="000000"/>
-                </a:solidFill>
-                <a:effectLst/>
-                <a:latin typeface="Arial" panose="020B0604020202020204" pitchFamily="34" charset="0"/>
-              </a:rPr>
-              <a:t> </a:t>
-            </a:r>
-            <a:r>
-              <a:rPr lang="es-ES" sz="1800" b="0" i="0" u="none" strike="noStrike" dirty="0" err="1">
-                <a:solidFill>
-                  <a:srgbClr val="000000"/>
-                </a:solidFill>
-                <a:effectLst/>
-                <a:latin typeface="Arial" panose="020B0604020202020204" pitchFamily="34" charset="0"/>
-              </a:rPr>
-              <a:t>Haze</a:t>
-            </a:r>
-            <a:r>
-              <a:rPr lang="es-ES" sz="1800" b="0" i="0" u="none" strike="noStrike" dirty="0">
-                <a:solidFill>
-                  <a:srgbClr val="000000"/>
-                </a:solidFill>
-                <a:effectLst/>
-                <a:latin typeface="Arial" panose="020B0604020202020204" pitchFamily="34" charset="0"/>
-              </a:rPr>
-              <a:t> Interactive.</a:t>
-            </a:r>
+            <a:endParaRPr lang="es-ES" b="1" i="0" u="none" strike="noStrike" dirty="0">
+              <a:solidFill>
+                <a:schemeClr val="tx1">
+                  <a:lumMod val="95000"/>
+                </a:schemeClr>
+              </a:solidFill>
+              <a:effectLst/>
+              <a:latin typeface="Arial" panose="020B0604020202020204" pitchFamily="34" charset="0"/>
+            </a:endParaRPr>
           </a:p>
           <a:p>
             <a:pPr algn="just" rtl="0" fontAlgn="base">
@@ -4027,9 +4069,11 @@
               <a:buChar char="•"/>
             </a:pPr>
             <a:r>
-              <a:rPr lang="es-ES" sz="1800" b="1" i="0" u="none" strike="noStrike" dirty="0" err="1">
+              <a:rPr lang="es-ES" b="1" i="0" u="none" strike="noStrike" dirty="0" err="1">
                 <a:solidFill>
-                  <a:srgbClr val="000000"/>
+                  <a:schemeClr val="tx1">
+                    <a:lumMod val="95000"/>
+                  </a:schemeClr>
                 </a:solidFill>
                 <a:effectLst/>
                 <a:latin typeface="Arial" panose="020B0604020202020204" pitchFamily="34" charset="0"/>
@@ -4037,9 +4081,11 @@
               <a:t>Hollow</a:t>
             </a:r>
             <a:r>
-              <a:rPr lang="es-ES" sz="1800" b="1" i="0" u="none" strike="noStrike" dirty="0">
+              <a:rPr lang="es-ES" b="1" i="0" u="none" strike="noStrike" dirty="0">
                 <a:solidFill>
-                  <a:srgbClr val="000000"/>
+                  <a:schemeClr val="tx1">
+                    <a:lumMod val="95000"/>
+                  </a:schemeClr>
                 </a:solidFill>
                 <a:effectLst/>
                 <a:latin typeface="Arial" panose="020B0604020202020204" pitchFamily="34" charset="0"/>
@@ -4047,45 +4093,26 @@
               <a:t> </a:t>
             </a:r>
             <a:r>
-              <a:rPr lang="es-ES" sz="1800" b="1" i="0" u="none" strike="noStrike" dirty="0" err="1">
+              <a:rPr lang="es-ES" b="1" i="0" u="none" strike="noStrike" dirty="0" err="1">
                 <a:solidFill>
-                  <a:srgbClr val="000000"/>
+                  <a:schemeClr val="tx1">
+                    <a:lumMod val="95000"/>
+                  </a:schemeClr>
                 </a:solidFill>
                 <a:effectLst/>
                 <a:latin typeface="Arial" panose="020B0604020202020204" pitchFamily="34" charset="0"/>
               </a:rPr>
               <a:t>Knight</a:t>
             </a:r>
-            <a:r>
-              <a:rPr lang="es-ES" sz="1800" b="0" i="0" u="none" strike="noStrike" dirty="0">
-                <a:solidFill>
-                  <a:srgbClr val="000000"/>
-                </a:solidFill>
-                <a:effectLst/>
-                <a:latin typeface="Arial" panose="020B0604020202020204" pitchFamily="34" charset="0"/>
-              </a:rPr>
-              <a:t>, </a:t>
-            </a:r>
-            <a:r>
-              <a:rPr lang="es-ES" sz="1800" b="0" i="0" u="none" strike="noStrike" dirty="0" err="1">
-                <a:solidFill>
-                  <a:srgbClr val="000000"/>
-                </a:solidFill>
-                <a:effectLst/>
-                <a:latin typeface="Arial" panose="020B0604020202020204" pitchFamily="34" charset="0"/>
-              </a:rPr>
-              <a:t>Team</a:t>
-            </a:r>
-            <a:r>
-              <a:rPr lang="es-ES" sz="1800" b="0" i="0" u="none" strike="noStrike" dirty="0">
-                <a:solidFill>
-                  <a:srgbClr val="000000"/>
-                </a:solidFill>
-                <a:effectLst/>
-                <a:latin typeface="Arial" panose="020B0604020202020204" pitchFamily="34" charset="0"/>
-              </a:rPr>
-              <a:t> Cherry Games.</a:t>
-            </a:r>
+            <a:endParaRPr lang="es-ES" b="1" i="0" u="none" strike="noStrike" dirty="0">
+              <a:solidFill>
+                <a:schemeClr val="tx1">
+                  <a:lumMod val="95000"/>
+                </a:schemeClr>
+              </a:solidFill>
+              <a:effectLst/>
+              <a:latin typeface="Arial" panose="020B0604020202020204" pitchFamily="34" charset="0"/>
+            </a:endParaRPr>
           </a:p>
           <a:p>
             <a:pPr algn="just" rtl="0" fontAlgn="base">
@@ -4099,78 +4126,22 @@
               <a:buChar char="•"/>
             </a:pPr>
             <a:r>
-              <a:rPr lang="es-ES" sz="1800" b="1" i="0" u="none" strike="noStrike" dirty="0" err="1">
+              <a:rPr lang="es-ES" b="1" i="0" u="none" strike="noStrike" dirty="0" err="1">
                 <a:solidFill>
-                  <a:srgbClr val="0F1111"/>
+                  <a:schemeClr val="tx1">
+                    <a:lumMod val="95000"/>
+                  </a:schemeClr>
                 </a:solidFill>
                 <a:effectLst/>
                 <a:latin typeface="Arial" panose="020B0604020202020204" pitchFamily="34" charset="0"/>
               </a:rPr>
               <a:t>Morbid</a:t>
             </a:r>
-            <a:r>
-              <a:rPr lang="es-ES" sz="1800" b="1" i="0" u="none" strike="noStrike" dirty="0">
-                <a:solidFill>
-                  <a:srgbClr val="0F1111"/>
-                </a:solidFill>
-                <a:effectLst/>
-                <a:latin typeface="Arial" panose="020B0604020202020204" pitchFamily="34" charset="0"/>
-              </a:rPr>
-              <a:t>, </a:t>
-            </a:r>
-            <a:r>
-              <a:rPr lang="es-ES" sz="1800" b="0" i="0" u="none" strike="noStrike" dirty="0" err="1">
-                <a:solidFill>
-                  <a:srgbClr val="0F1111"/>
-                </a:solidFill>
-                <a:effectLst/>
-                <a:latin typeface="Arial" panose="020B0604020202020204" pitchFamily="34" charset="0"/>
-              </a:rPr>
-              <a:t>Still</a:t>
-            </a:r>
-            <a:r>
-              <a:rPr lang="es-ES" sz="1800" b="0" i="0" u="none" strike="noStrike" dirty="0">
-                <a:solidFill>
-                  <a:srgbClr val="0F1111"/>
-                </a:solidFill>
-                <a:effectLst/>
-                <a:latin typeface="Arial" panose="020B0604020202020204" pitchFamily="34" charset="0"/>
-              </a:rPr>
-              <a:t> Running</a:t>
-            </a:r>
-            <a:r>
-              <a:rPr lang="es-ES" sz="1800" b="0" i="0" u="none" strike="noStrike" dirty="0">
-                <a:solidFill>
-                  <a:srgbClr val="000000"/>
-                </a:solidFill>
-                <a:effectLst/>
-                <a:latin typeface="Arial" panose="020B0604020202020204" pitchFamily="34" charset="0"/>
-              </a:rPr>
-              <a:t>, </a:t>
-            </a:r>
-            <a:r>
-              <a:rPr lang="es-ES" sz="1800" b="0" i="0" u="none" strike="noStrike" dirty="0" err="1">
-                <a:solidFill>
-                  <a:srgbClr val="000000"/>
-                </a:solidFill>
-                <a:effectLst/>
-                <a:latin typeface="Arial" panose="020B0604020202020204" pitchFamily="34" charset="0"/>
-              </a:rPr>
-              <a:t>Merge</a:t>
-            </a:r>
-            <a:r>
-              <a:rPr lang="es-ES" sz="1800" b="0" i="0" u="none" strike="noStrike" dirty="0">
-                <a:solidFill>
-                  <a:srgbClr val="000000"/>
-                </a:solidFill>
-                <a:effectLst/>
-                <a:latin typeface="Arial" panose="020B0604020202020204" pitchFamily="34" charset="0"/>
-              </a:rPr>
-              <a:t> Games</a:t>
-            </a:r>
-            <a:endParaRPr lang="es-ES" sz="1800" b="1" i="0" u="none" strike="noStrike" dirty="0">
+            <a:endParaRPr lang="es-ES" b="1" i="0" u="none" strike="noStrike" dirty="0">
               <a:solidFill>
-                <a:srgbClr val="0F1111"/>
+                <a:schemeClr val="tx1">
+                  <a:lumMod val="95000"/>
+                </a:schemeClr>
               </a:solidFill>
               <a:effectLst/>
               <a:latin typeface="Arial" panose="020B0604020202020204" pitchFamily="34" charset="0"/>
@@ -4188,58 +4159,22 @@
               <a:buChar char="•"/>
             </a:pPr>
             <a:r>
-              <a:rPr lang="es-ES" sz="1800" b="1" i="0" u="none" strike="noStrike" dirty="0" err="1">
+              <a:rPr lang="es-ES" b="1" i="0" u="none" strike="noStrike" dirty="0" err="1">
                 <a:solidFill>
-                  <a:srgbClr val="0F1111"/>
+                  <a:schemeClr val="tx1">
+                    <a:lumMod val="95000"/>
+                  </a:schemeClr>
                 </a:solidFill>
                 <a:effectLst/>
                 <a:latin typeface="Arial" panose="020B0604020202020204" pitchFamily="34" charset="0"/>
               </a:rPr>
               <a:t>Cuphead</a:t>
             </a:r>
-            <a:r>
-              <a:rPr lang="es-ES" sz="1800" b="1" i="0" u="none" strike="noStrike" dirty="0">
-                <a:solidFill>
-                  <a:srgbClr val="0F1111"/>
-                </a:solidFill>
-                <a:effectLst/>
-                <a:latin typeface="Arial" panose="020B0604020202020204" pitchFamily="34" charset="0"/>
-              </a:rPr>
-              <a:t>, </a:t>
-            </a:r>
-            <a:r>
-              <a:rPr lang="es-ES" sz="1800" b="0" i="0" u="none" strike="noStrike" dirty="0">
-                <a:solidFill>
-                  <a:srgbClr val="0F1111"/>
-                </a:solidFill>
-                <a:effectLst/>
-                <a:latin typeface="Arial" panose="020B0604020202020204" pitchFamily="34" charset="0"/>
-              </a:rPr>
-              <a:t>Studio MDHR </a:t>
-            </a:r>
-            <a:r>
-              <a:rPr lang="es-ES" sz="1800" b="0" i="0" u="none" strike="noStrike" dirty="0" err="1">
-                <a:solidFill>
-                  <a:srgbClr val="0F1111"/>
-                </a:solidFill>
-                <a:effectLst/>
-                <a:latin typeface="Arial" panose="020B0604020202020204" pitchFamily="34" charset="0"/>
-              </a:rPr>
-              <a:t>Entertainment</a:t>
-            </a:r>
-            <a:r>
-              <a:rPr lang="es-ES" sz="1800" b="0" i="0" u="none" strike="noStrike" dirty="0">
-                <a:solidFill>
-                  <a:srgbClr val="0F1111"/>
-                </a:solidFill>
-                <a:effectLst/>
-                <a:latin typeface="Arial" panose="020B0604020202020204" pitchFamily="34" charset="0"/>
-              </a:rPr>
-              <a:t> Inc.</a:t>
-            </a:r>
-            <a:endParaRPr lang="es-ES" sz="1800" b="1" i="0" u="none" strike="noStrike" dirty="0">
+            <a:endParaRPr lang="es-ES" b="1" i="0" u="none" strike="noStrike" dirty="0">
               <a:solidFill>
-                <a:srgbClr val="0F1111"/>
+                <a:schemeClr val="tx1">
+                  <a:lumMod val="95000"/>
+                </a:schemeClr>
               </a:solidFill>
               <a:effectLst/>
               <a:latin typeface="Arial" panose="020B0604020202020204" pitchFamily="34" charset="0"/>
@@ -4257,9 +4192,11 @@
               <a:buChar char="•"/>
             </a:pPr>
             <a:r>
-              <a:rPr lang="es-ES" sz="1800" b="1" i="0" u="none" strike="noStrike" dirty="0">
+              <a:rPr lang="es-ES" b="1" i="0" u="none" strike="noStrike" dirty="0">
                 <a:solidFill>
-                  <a:srgbClr val="0F1111"/>
+                  <a:schemeClr val="tx1">
+                    <a:lumMod val="95000"/>
+                  </a:schemeClr>
                 </a:solidFill>
                 <a:effectLst/>
                 <a:latin typeface="Arial" panose="020B0604020202020204" pitchFamily="34" charset="0"/>
@@ -4267,68 +4204,22 @@
               <a:t>Titan </a:t>
             </a:r>
             <a:r>
-              <a:rPr lang="es-ES" sz="1800" b="1" i="0" u="none" strike="noStrike" dirty="0" err="1">
+              <a:rPr lang="es-ES" b="1" i="0" u="none" strike="noStrike" dirty="0" err="1">
                 <a:solidFill>
-                  <a:srgbClr val="0F1111"/>
+                  <a:schemeClr val="tx1">
+                    <a:lumMod val="95000"/>
+                  </a:schemeClr>
                 </a:solidFill>
                 <a:effectLst/>
                 <a:latin typeface="Arial" panose="020B0604020202020204" pitchFamily="34" charset="0"/>
               </a:rPr>
               <a:t>Souls</a:t>
             </a:r>
-            <a:r>
-              <a:rPr lang="es-ES" sz="1800" b="1" i="0" u="none" strike="noStrike" dirty="0">
-                <a:solidFill>
-                  <a:srgbClr val="0F1111"/>
-                </a:solidFill>
-                <a:effectLst/>
-                <a:latin typeface="Arial" panose="020B0604020202020204" pitchFamily="34" charset="0"/>
-              </a:rPr>
-              <a:t>, </a:t>
-            </a:r>
-            <a:r>
-              <a:rPr lang="es-ES" sz="1800" b="0" i="0" u="none" strike="noStrike" dirty="0" err="1">
-                <a:solidFill>
-                  <a:srgbClr val="0F1111"/>
-                </a:solidFill>
-                <a:effectLst/>
-                <a:latin typeface="Arial" panose="020B0604020202020204" pitchFamily="34" charset="0"/>
-              </a:rPr>
-              <a:t>Acid</a:t>
-            </a:r>
-            <a:r>
-              <a:rPr lang="es-ES" sz="1800" b="0" i="0" u="none" strike="noStrike" dirty="0">
-                <a:solidFill>
-                  <a:srgbClr val="0F1111"/>
-                </a:solidFill>
-                <a:effectLst/>
-                <a:latin typeface="Arial" panose="020B0604020202020204" pitchFamily="34" charset="0"/>
-              </a:rPr>
-              <a:t> </a:t>
-            </a:r>
-            <a:r>
-              <a:rPr lang="es-ES" sz="1800" b="0" i="0" u="none" strike="noStrike" dirty="0" err="1">
-                <a:solidFill>
-                  <a:srgbClr val="0F1111"/>
-                </a:solidFill>
-                <a:effectLst/>
-                <a:latin typeface="Arial" panose="020B0604020202020204" pitchFamily="34" charset="0"/>
-              </a:rPr>
-              <a:t>Nerve</a:t>
-            </a:r>
-            <a:r>
-              <a:rPr lang="es-ES" sz="1800" b="0" i="0" u="none" strike="noStrike" dirty="0">
-                <a:solidFill>
-                  <a:srgbClr val="0F1111"/>
-                </a:solidFill>
-                <a:effectLst/>
-                <a:latin typeface="Arial" panose="020B0604020202020204" pitchFamily="34" charset="0"/>
-              </a:rPr>
-              <a:t>, Devolver Digital.</a:t>
-            </a:r>
-            <a:endParaRPr lang="es-ES" sz="1800" b="1" i="0" u="none" strike="noStrike" dirty="0">
+            <a:endParaRPr lang="es-ES" b="1" i="0" u="none" strike="noStrike" dirty="0">
               <a:solidFill>
-                <a:srgbClr val="0F1111"/>
+                <a:schemeClr val="tx1">
+                  <a:lumMod val="95000"/>
+                </a:schemeClr>
               </a:solidFill>
               <a:effectLst/>
               <a:latin typeface="Arial" panose="020B0604020202020204" pitchFamily="34" charset="0"/>
@@ -4346,9 +4237,11 @@
               <a:buChar char="•"/>
             </a:pPr>
             <a:r>
-              <a:rPr lang="es-ES" sz="1800" b="1" i="0" u="none" strike="noStrike" dirty="0" err="1">
+              <a:rPr lang="es-ES" b="1" i="0" u="none" strike="noStrike" dirty="0" err="1">
                 <a:solidFill>
-                  <a:srgbClr val="0F1111"/>
+                  <a:schemeClr val="tx1">
+                    <a:lumMod val="95000"/>
+                  </a:schemeClr>
                 </a:solidFill>
                 <a:effectLst/>
                 <a:latin typeface="Arial" panose="020B0604020202020204" pitchFamily="34" charset="0"/>
@@ -4356,9 +4249,11 @@
               <a:t>Dead</a:t>
             </a:r>
             <a:r>
-              <a:rPr lang="es-ES" sz="1800" b="1" i="0" u="none" strike="noStrike" dirty="0">
+              <a:rPr lang="es-ES" b="1" i="0" u="none" strike="noStrike" dirty="0">
                 <a:solidFill>
-                  <a:srgbClr val="0F1111"/>
+                  <a:schemeClr val="tx1">
+                    <a:lumMod val="95000"/>
+                  </a:schemeClr>
                 </a:solidFill>
                 <a:effectLst/>
                 <a:latin typeface="Arial" panose="020B0604020202020204" pitchFamily="34" charset="0"/>
@@ -4366,48 +4261,22 @@
               <a:t> </a:t>
             </a:r>
             <a:r>
-              <a:rPr lang="es-ES" sz="1800" b="1" i="0" u="none" strike="noStrike" dirty="0" err="1">
+              <a:rPr lang="es-ES" b="1" i="0" u="none" strike="noStrike" dirty="0" err="1">
                 <a:solidFill>
-                  <a:srgbClr val="0F1111"/>
+                  <a:schemeClr val="tx1">
+                    <a:lumMod val="95000"/>
+                  </a:schemeClr>
                 </a:solidFill>
                 <a:effectLst/>
                 <a:latin typeface="Arial" panose="020B0604020202020204" pitchFamily="34" charset="0"/>
               </a:rPr>
               <a:t>cells</a:t>
             </a:r>
-            <a:r>
-              <a:rPr lang="es-ES" sz="1800" b="1" i="0" u="none" strike="noStrike" dirty="0">
-                <a:solidFill>
-                  <a:srgbClr val="0F1111"/>
-                </a:solidFill>
-                <a:effectLst/>
-                <a:latin typeface="Arial" panose="020B0604020202020204" pitchFamily="34" charset="0"/>
-              </a:rPr>
-              <a:t>, </a:t>
-            </a:r>
-            <a:r>
-              <a:rPr lang="es-ES" sz="1800" b="0" i="0" u="none" strike="noStrike" dirty="0" err="1">
-                <a:solidFill>
-                  <a:srgbClr val="0F1111"/>
-                </a:solidFill>
-                <a:effectLst/>
-                <a:latin typeface="Arial" panose="020B0604020202020204" pitchFamily="34" charset="0"/>
-              </a:rPr>
-              <a:t>Motion</a:t>
-            </a:r>
-            <a:r>
-              <a:rPr lang="es-ES" sz="1800" b="0" i="0" u="none" strike="noStrike" dirty="0">
-                <a:solidFill>
-                  <a:srgbClr val="0F1111"/>
-                </a:solidFill>
-                <a:effectLst/>
-                <a:latin typeface="Arial" panose="020B0604020202020204" pitchFamily="34" charset="0"/>
-              </a:rPr>
-              <a:t> Twin.</a:t>
-            </a:r>
-            <a:endParaRPr lang="es-ES" sz="1800" b="1" i="0" u="none" strike="noStrike" dirty="0">
+            <a:endParaRPr lang="es-ES" b="1" i="0" u="none" strike="noStrike" dirty="0">
               <a:solidFill>
-                <a:srgbClr val="0F1111"/>
+                <a:schemeClr val="tx1">
+                  <a:lumMod val="95000"/>
+                </a:schemeClr>
               </a:solidFill>
               <a:effectLst/>
               <a:latin typeface="Arial" panose="020B0604020202020204" pitchFamily="34" charset="0"/>
@@ -4425,109 +4294,22 @@
               <a:buChar char="•"/>
             </a:pPr>
             <a:r>
-              <a:rPr lang="es-ES" sz="1800" b="1" i="0" u="none" strike="noStrike" dirty="0" err="1">
+              <a:rPr lang="es-ES" b="1" i="0" u="none" strike="noStrike" dirty="0" err="1">
                 <a:solidFill>
-                  <a:srgbClr val="0F1111"/>
+                  <a:schemeClr val="tx1">
+                    <a:lumMod val="95000"/>
+                  </a:schemeClr>
                 </a:solidFill>
                 <a:effectLst/>
                 <a:latin typeface="Arial" panose="020B0604020202020204" pitchFamily="34" charset="0"/>
               </a:rPr>
               <a:t>Blasphemous</a:t>
             </a:r>
-            <a:r>
-              <a:rPr lang="es-ES" sz="1800" b="1" i="0" u="none" strike="noStrike" dirty="0">
-                <a:solidFill>
-                  <a:srgbClr val="0F1111"/>
-                </a:solidFill>
-                <a:effectLst/>
-                <a:latin typeface="Arial" panose="020B0604020202020204" pitchFamily="34" charset="0"/>
-              </a:rPr>
-              <a:t>, </a:t>
-            </a:r>
-            <a:r>
-              <a:rPr lang="es-ES" sz="1800" b="0" i="0" u="none" strike="noStrike" dirty="0" err="1">
-                <a:solidFill>
-                  <a:srgbClr val="0F1111"/>
-                </a:solidFill>
-                <a:effectLst/>
-                <a:latin typeface="Arial" panose="020B0604020202020204" pitchFamily="34" charset="0"/>
-              </a:rPr>
-              <a:t>The</a:t>
-            </a:r>
-            <a:r>
-              <a:rPr lang="es-ES" sz="1800" b="0" i="0" u="none" strike="noStrike" dirty="0">
-                <a:solidFill>
-                  <a:srgbClr val="0F1111"/>
-                </a:solidFill>
-                <a:effectLst/>
-                <a:latin typeface="Arial" panose="020B0604020202020204" pitchFamily="34" charset="0"/>
-              </a:rPr>
-              <a:t> </a:t>
-            </a:r>
-            <a:r>
-              <a:rPr lang="es-ES" sz="1800" b="0" i="0" u="none" strike="noStrike" dirty="0" err="1">
-                <a:solidFill>
-                  <a:srgbClr val="0F1111"/>
-                </a:solidFill>
-                <a:effectLst/>
-                <a:latin typeface="Arial" panose="020B0604020202020204" pitchFamily="34" charset="0"/>
-              </a:rPr>
-              <a:t>Game</a:t>
-            </a:r>
-            <a:r>
-              <a:rPr lang="es-ES" sz="1800" b="0" i="0" u="none" strike="noStrike" dirty="0">
-                <a:solidFill>
-                  <a:srgbClr val="0F1111"/>
-                </a:solidFill>
-                <a:effectLst/>
-                <a:latin typeface="Arial" panose="020B0604020202020204" pitchFamily="34" charset="0"/>
-              </a:rPr>
-              <a:t> </a:t>
-            </a:r>
-            <a:r>
-              <a:rPr lang="es-ES" sz="1800" b="0" i="0" u="none" strike="noStrike" dirty="0" err="1">
-                <a:solidFill>
-                  <a:srgbClr val="0F1111"/>
-                </a:solidFill>
-                <a:effectLst/>
-                <a:latin typeface="Arial" panose="020B0604020202020204" pitchFamily="34" charset="0"/>
-              </a:rPr>
-              <a:t>Kitchen</a:t>
-            </a:r>
-            <a:r>
-              <a:rPr lang="es-ES" sz="1800" b="0" i="0" u="none" strike="noStrike" dirty="0">
-                <a:solidFill>
-                  <a:srgbClr val="0F1111"/>
-                </a:solidFill>
-                <a:effectLst/>
-                <a:latin typeface="Arial" panose="020B0604020202020204" pitchFamily="34" charset="0"/>
-              </a:rPr>
-              <a:t>, </a:t>
-            </a:r>
-            <a:r>
-              <a:rPr lang="es-ES" sz="1800" b="0" i="0" u="none" strike="noStrike" dirty="0">
-                <a:solidFill>
-                  <a:srgbClr val="0F1111"/>
-                </a:solidFill>
-                <a:effectLst/>
-                <a:latin typeface="Arial" panose="020B0604020202020204" pitchFamily="34" charset="0"/>
-                <a:hlinkClick r:id="rId2"/>
-              </a:rPr>
-              <a:t>Team17</a:t>
-            </a:r>
-            <a:r>
-              <a:rPr lang="es-ES" sz="1800" b="0" i="0" u="none" strike="noStrike" dirty="0">
-                <a:solidFill>
-                  <a:srgbClr val="0F1111"/>
-                </a:solidFill>
-                <a:effectLst/>
-                <a:latin typeface="Arial" panose="020B0604020202020204" pitchFamily="34" charset="0"/>
-              </a:rPr>
-              <a:t>.</a:t>
-            </a:r>
-            <a:endParaRPr lang="es-ES" sz="1800" b="1" i="0" u="none" strike="noStrike" dirty="0">
+            <a:endParaRPr lang="es-ES" b="1" i="0" u="none" strike="noStrike" dirty="0">
               <a:solidFill>
-                <a:srgbClr val="0F1111"/>
+                <a:schemeClr val="tx1">
+                  <a:lumMod val="95000"/>
+                </a:schemeClr>
               </a:solidFill>
               <a:effectLst/>
               <a:latin typeface="Arial" panose="020B0604020202020204" pitchFamily="34" charset="0"/>
@@ -4545,9 +4327,11 @@
               <a:buChar char="•"/>
             </a:pPr>
             <a:r>
-              <a:rPr lang="es-ES" sz="1800" b="1" i="0" u="none" strike="noStrike" dirty="0" err="1">
+              <a:rPr lang="es-ES" b="1" i="0" u="none" strike="noStrike" dirty="0" err="1">
                 <a:solidFill>
-                  <a:srgbClr val="0F1111"/>
+                  <a:schemeClr val="tx1">
+                    <a:lumMod val="95000"/>
+                  </a:schemeClr>
                 </a:solidFill>
                 <a:effectLst/>
                 <a:latin typeface="Arial" panose="020B0604020202020204" pitchFamily="34" charset="0"/>
@@ -4555,9 +4339,11 @@
               <a:t>Death</a:t>
             </a:r>
             <a:r>
-              <a:rPr lang="es-ES" sz="1800" b="1" i="0" u="none" strike="noStrike" dirty="0">
+              <a:rPr lang="es-ES" b="1" i="0" u="none" strike="noStrike" dirty="0">
                 <a:solidFill>
-                  <a:srgbClr val="0F1111"/>
+                  <a:schemeClr val="tx1">
+                    <a:lumMod val="95000"/>
+                  </a:schemeClr>
                 </a:solidFill>
                 <a:effectLst/>
                 <a:latin typeface="Arial" panose="020B0604020202020204" pitchFamily="34" charset="0"/>
@@ -4565,78 +4351,44 @@
               <a:t> </a:t>
             </a:r>
             <a:r>
-              <a:rPr lang="es-ES" sz="1800" b="1" i="0" u="none" strike="noStrike" dirty="0" err="1">
+              <a:rPr lang="es-ES" b="1" i="0" u="none" strike="noStrike" dirty="0" err="1">
                 <a:solidFill>
-                  <a:srgbClr val="0F1111"/>
+                  <a:schemeClr val="tx1">
+                    <a:lumMod val="95000"/>
+                  </a:schemeClr>
                 </a:solidFill>
                 <a:effectLst/>
                 <a:latin typeface="Arial" panose="020B0604020202020204" pitchFamily="34" charset="0"/>
               </a:rPr>
               <a:t>Door</a:t>
             </a:r>
-            <a:r>
-              <a:rPr lang="es-ES" sz="1800" b="1" i="0" u="none" strike="noStrike" dirty="0">
-                <a:solidFill>
-                  <a:srgbClr val="0F1111"/>
-                </a:solidFill>
-                <a:effectLst/>
-                <a:latin typeface="Arial" panose="020B0604020202020204" pitchFamily="34" charset="0"/>
-              </a:rPr>
-              <a:t>, </a:t>
-            </a:r>
-            <a:r>
-              <a:rPr lang="es-ES" sz="1800" b="0" i="0" u="none" strike="noStrike" dirty="0" err="1">
-                <a:solidFill>
-                  <a:srgbClr val="0F1111"/>
-                </a:solidFill>
-                <a:effectLst/>
-                <a:latin typeface="Arial" panose="020B0604020202020204" pitchFamily="34" charset="0"/>
-              </a:rPr>
-              <a:t>Acid</a:t>
-            </a:r>
-            <a:r>
-              <a:rPr lang="es-ES" sz="1800" b="0" i="0" u="none" strike="noStrike" dirty="0">
-                <a:solidFill>
-                  <a:srgbClr val="0F1111"/>
-                </a:solidFill>
-                <a:effectLst/>
-                <a:latin typeface="Arial" panose="020B0604020202020204" pitchFamily="34" charset="0"/>
-              </a:rPr>
-              <a:t> </a:t>
-            </a:r>
-            <a:r>
-              <a:rPr lang="es-ES" sz="1800" b="0" i="0" u="none" strike="noStrike" dirty="0" err="1">
-                <a:solidFill>
-                  <a:srgbClr val="0F1111"/>
-                </a:solidFill>
-                <a:effectLst/>
-                <a:latin typeface="Arial" panose="020B0604020202020204" pitchFamily="34" charset="0"/>
-              </a:rPr>
-              <a:t>Nerve</a:t>
-            </a:r>
-            <a:r>
-              <a:rPr lang="es-ES" sz="1800" b="0" i="0" u="none" strike="noStrike" dirty="0">
-                <a:solidFill>
-                  <a:srgbClr val="0F1111"/>
-                </a:solidFill>
-                <a:effectLst/>
-                <a:latin typeface="Arial" panose="020B0604020202020204" pitchFamily="34" charset="0"/>
-              </a:rPr>
-              <a:t>, Devolver Digital.</a:t>
-            </a:r>
-            <a:endParaRPr lang="es-ES" sz="1800" b="1" i="0" u="none" strike="noStrike" dirty="0">
+            <a:endParaRPr lang="es-ES" b="1" i="0" u="none" strike="noStrike" dirty="0">
               <a:solidFill>
-                <a:srgbClr val="0F1111"/>
+                <a:schemeClr val="tx1">
+                  <a:lumMod val="95000"/>
+                </a:schemeClr>
               </a:solidFill>
               <a:effectLst/>
               <a:latin typeface="Arial" panose="020B0604020202020204" pitchFamily="34" charset="0"/>
             </a:endParaRPr>
           </a:p>
           <a:p>
-            <a:r>
-              <a:rPr lang="es-ES" sz="1800" b="1" i="0" u="none" strike="noStrike" dirty="0">
+            <a:pPr algn="just" rtl="0" fontAlgn="base">
+              <a:spcBef>
+                <a:spcPts val="0"/>
+              </a:spcBef>
+              <a:spcAft>
+                <a:spcPts val="0"/>
+              </a:spcAft>
+              <a:buFont typeface="Arial" panose="020B0604020202020204" pitchFamily="34" charset="0"/>
+              <a:buChar char="•"/>
+            </a:pPr>
+            <a:r>
+              <a:rPr lang="es-ES" b="1" i="0" u="none" strike="noStrike" dirty="0">
                 <a:solidFill>
-                  <a:srgbClr val="0F1111"/>
+                  <a:schemeClr val="tx1">
+                    <a:lumMod val="95000"/>
+                  </a:schemeClr>
                 </a:solidFill>
                 <a:effectLst/>
                 <a:latin typeface="Arial" panose="020B0604020202020204" pitchFamily="34" charset="0"/>
@@ -4644,66 +4396,24 @@
               <a:t>Salt and </a:t>
             </a:r>
             <a:r>
-              <a:rPr lang="es-ES" sz="1800" b="1" i="0" u="none" strike="noStrike" dirty="0" err="1">
+              <a:rPr lang="es-ES" b="1" i="0" u="none" strike="noStrike" dirty="0" err="1">
                 <a:solidFill>
-                  <a:srgbClr val="0F1111"/>
+                  <a:schemeClr val="tx1">
+                    <a:lumMod val="95000"/>
+                  </a:schemeClr>
                 </a:solidFill>
                 <a:effectLst/>
                 <a:latin typeface="Arial" panose="020B0604020202020204" pitchFamily="34" charset="0"/>
               </a:rPr>
               <a:t>Sanctuary</a:t>
             </a:r>
-            <a:r>
-              <a:rPr lang="es-ES" sz="1800" b="1" i="0" u="none" strike="noStrike" dirty="0">
-                <a:solidFill>
-                  <a:srgbClr val="0F1111"/>
-                </a:solidFill>
-                <a:effectLst/>
-                <a:latin typeface="Arial" panose="020B0604020202020204" pitchFamily="34" charset="0"/>
-              </a:rPr>
-              <a:t>, </a:t>
-            </a:r>
-            <a:r>
-              <a:rPr lang="es-ES" sz="1800" b="0" i="0" u="none" strike="noStrike" dirty="0" err="1">
-                <a:solidFill>
-                  <a:srgbClr val="0F1111"/>
-                </a:solidFill>
-                <a:effectLst/>
-                <a:latin typeface="Arial" panose="020B0604020202020204" pitchFamily="34" charset="0"/>
-              </a:rPr>
-              <a:t>Ska</a:t>
-            </a:r>
-            <a:r>
-              <a:rPr lang="es-ES" sz="1800" b="0" i="0" u="none" strike="noStrike" dirty="0">
-                <a:solidFill>
-                  <a:srgbClr val="0F1111"/>
-                </a:solidFill>
-                <a:effectLst/>
-                <a:latin typeface="Arial" panose="020B0604020202020204" pitchFamily="34" charset="0"/>
-              </a:rPr>
-              <a:t> </a:t>
-            </a:r>
-            <a:r>
-              <a:rPr lang="es-ES" sz="1800" b="0" i="0" u="none" strike="noStrike" dirty="0" err="1">
-                <a:solidFill>
-                  <a:srgbClr val="0F1111"/>
-                </a:solidFill>
-                <a:effectLst/>
-                <a:latin typeface="Arial" panose="020B0604020202020204" pitchFamily="34" charset="0"/>
-              </a:rPr>
-              <a:t>Studios</a:t>
-            </a:r>
-            <a:r>
-              <a:rPr lang="es-ES" sz="1800" b="0" i="0" u="none" strike="noStrike" dirty="0">
-                <a:solidFill>
-                  <a:srgbClr val="0F1111"/>
-                </a:solidFill>
-                <a:effectLst/>
-                <a:latin typeface="Arial" panose="020B0604020202020204" pitchFamily="34" charset="0"/>
-              </a:rPr>
-              <a:t>.</a:t>
-            </a:r>
-            <a:endParaRPr lang="es-ES" dirty="0"/>
+            <a:endParaRPr lang="es-ES" sz="4000" dirty="0">
+              <a:solidFill>
+                <a:schemeClr val="tx1">
+                  <a:lumMod val="95000"/>
+                </a:schemeClr>
+              </a:solidFill>
+            </a:endParaRPr>
           </a:p>
         </p:txBody>
       </p:sp>
@@ -4723,6 +4433,14 @@
 <file path=ppt/slides/slide5.xml><?xml version="1.0" encoding="utf-8"?>
 <p:sld xmlns:a="http://schemas.openxmlformats.org/drawingml/2006/main" xmlns:r="http://schemas.openxmlformats.org/officeDocument/2006/relationships" xmlns:p="http://schemas.openxmlformats.org/presentationml/2006/main">
   <p:cSld>
+    <p:bg>
+      <p:bgPr>
+        <a:solidFill>
+          <a:schemeClr val="bg1"/>
+        </a:solidFill>
+        <a:effectLst/>
+      </p:bgPr>
+    </p:bg>
     <p:spTree>
       <p:nvGrpSpPr>
         <p:cNvPr id="1" name=""/>
@@ -4753,24 +4471,37 @@
             <p:ph type="title"/>
           </p:nvPr>
         </p:nvSpPr>
-        <p:spPr/>
-        <p:txBody>
-          <a:bodyPr/>
-          <a:lstStyle/>
-          <a:p>
-            <a:r>
-              <a:rPr lang="es-ES" dirty="0"/>
-              <a:t>Arte</a:t>
+        <p:spPr>
+          <a:xfrm>
+            <a:off x="4520470" y="4857293"/>
+            <a:ext cx="3151059" cy="1266415"/>
+          </a:xfrm>
+        </p:spPr>
+        <p:txBody>
+          <a:bodyPr vert="horz" lIns="91440" tIns="45720" rIns="91440" bIns="45720" rtlCol="0" anchor="t">
+            <a:normAutofit/>
+          </a:bodyPr>
+          <a:lstStyle/>
+          <a:p>
+            <a:r>
+              <a:rPr lang="en-US" sz="8000" kern="1200" dirty="0">
+                <a:solidFill>
+                  <a:schemeClr val="tx1"/>
+                </a:solidFill>
+                <a:latin typeface="Algerian" panose="04020705040A02060702" pitchFamily="82" charset="0"/>
+                <a:cs typeface="Aldhabi" panose="020B0604020202020204" pitchFamily="2" charset="-78"/>
+              </a:rPr>
+              <a:t>ARTE</a:t>
             </a:r>
           </a:p>
         </p:txBody>
       </p:sp>
       <p:pic>
         <p:nvPicPr>
-          <p:cNvPr id="5" name="Marcador de contenido 4">
+          <p:cNvPr id="9" name="Marcador de contenido 8" descr="Pintura de personas en la noche&#10;&#10;Descripción generada automáticamente con confianza baja">
             <a:extLst>
               <a:ext uri="{FF2B5EF4-FFF2-40B4-BE49-F238E27FC236}">
-                <a16:creationId xmlns:a16="http://schemas.microsoft.com/office/drawing/2014/main" id="{EA290D79-0A66-4C37-8A87-433733C1625E}"/>
+                <a16:creationId xmlns:a16="http://schemas.microsoft.com/office/drawing/2014/main" id="{A27D2F51-A2B9-4C08-A52A-AE7F7E8ED7F5}"/>
               </a:ext>
             </a:extLst>
           </p:cNvPr>
@@ -4781,17 +4512,349 @@
             <p:ph idx="1"/>
           </p:nvPr>
         </p:nvPicPr>
-        <p:blipFill>
-          <a:blip r:embed="rId2"/>
-          <a:stretch>
-            <a:fillRect/>
-          </a:stretch>
+        <p:blipFill rotWithShape="1">
+          <a:blip r:embed="rId2">
+            <a:extLst>
+              <a:ext uri="{28A0092B-C50C-407E-A947-70E740481C1C}">
+                <a14:useLocalDpi xmlns:a14="http://schemas.microsoft.com/office/drawing/2010/main" val="0"/>
+              </a:ext>
+            </a:extLst>
+          </a:blip>
+          <a:srcRect t="30994" r="-3" b="-3"/>
+          <a:stretch/>
         </p:blipFill>
         <p:spPr>
           <a:xfrm>
-            <a:off x="1401627" y="2118822"/>
-            <a:ext cx="8741045" cy="3725255"/>
+            <a:off x="8918761" y="-4331"/>
+            <a:ext cx="3273238" cy="3383891"/>
           </a:xfrm>
+          <a:custGeom>
+            <a:avLst/>
+            <a:gdLst/>
+            <a:ahLst/>
+            <a:cxnLst/>
+            <a:rect l="l" t="t" r="r" b="b"/>
+            <a:pathLst>
+              <a:path w="3273238" h="3383891">
+                <a:moveTo>
+                  <a:pt x="122841" y="0"/>
+                </a:moveTo>
+                <a:lnTo>
+                  <a:pt x="3273238" y="0"/>
+                </a:lnTo>
+                <a:lnTo>
+                  <a:pt x="3273238" y="3291335"/>
+                </a:lnTo>
+                <a:lnTo>
+                  <a:pt x="3118338" y="3331164"/>
+                </a:lnTo>
+                <a:cubicBezTo>
+                  <a:pt x="2949390" y="3365736"/>
+                  <a:pt x="2774463" y="3383891"/>
+                  <a:pt x="2595295" y="3383891"/>
+                </a:cubicBezTo>
+                <a:cubicBezTo>
+                  <a:pt x="1161953" y="3383891"/>
+                  <a:pt x="0" y="2221938"/>
+                  <a:pt x="0" y="788596"/>
+                </a:cubicBezTo>
+                <a:cubicBezTo>
+                  <a:pt x="0" y="519845"/>
+                  <a:pt x="40850" y="260634"/>
+                  <a:pt x="116679" y="16835"/>
+                </a:cubicBezTo>
+                <a:close/>
+              </a:path>
+            </a:pathLst>
+          </a:custGeom>
+        </p:spPr>
+      </p:pic>
+      <p:pic>
+        <p:nvPicPr>
+          <p:cNvPr id="13" name="Imagen 12" descr="Dibujo de una persona&#10;&#10;Descripción generada automáticamente con confianza media">
+            <a:extLst>
+              <a:ext uri="{FF2B5EF4-FFF2-40B4-BE49-F238E27FC236}">
+                <a16:creationId xmlns:a16="http://schemas.microsoft.com/office/drawing/2014/main" id="{7DD73851-C4A2-46E9-BE63-875C6B97FE8A}"/>
+              </a:ext>
+            </a:extLst>
+          </p:cNvPr>
+          <p:cNvPicPr>
+            <a:picLocks noChangeAspect="1"/>
+          </p:cNvPicPr>
+          <p:nvPr/>
+        </p:nvPicPr>
+        <p:blipFill rotWithShape="1">
+          <a:blip r:embed="rId3">
+            <a:extLst>
+              <a:ext uri="{28A0092B-C50C-407E-A947-70E740481C1C}">
+                <a14:useLocalDpi xmlns:a14="http://schemas.microsoft.com/office/drawing/2010/main" val="0"/>
+              </a:ext>
+            </a:extLst>
+          </a:blip>
+          <a:srcRect r="4096" b="1"/>
+          <a:stretch/>
+        </p:blipFill>
+        <p:spPr>
+          <a:xfrm>
+            <a:off x="1246573" y="10"/>
+            <a:ext cx="3913632" cy="2285224"/>
+          </a:xfrm>
+          <a:custGeom>
+            <a:avLst/>
+            <a:gdLst/>
+            <a:ahLst/>
+            <a:cxnLst/>
+            <a:rect l="l" t="t" r="r" b="b"/>
+            <a:pathLst>
+              <a:path w="3913632" h="2285234">
+                <a:moveTo>
+                  <a:pt x="29691" y="0"/>
+                </a:moveTo>
+                <a:lnTo>
+                  <a:pt x="3883942" y="0"/>
+                </a:lnTo>
+                <a:lnTo>
+                  <a:pt x="3903529" y="128345"/>
+                </a:lnTo>
+                <a:cubicBezTo>
+                  <a:pt x="3910210" y="194127"/>
+                  <a:pt x="3913632" y="260873"/>
+                  <a:pt x="3913632" y="328418"/>
+                </a:cubicBezTo>
+                <a:cubicBezTo>
+                  <a:pt x="3913632" y="1409138"/>
+                  <a:pt x="3037536" y="2285234"/>
+                  <a:pt x="1956816" y="2285234"/>
+                </a:cubicBezTo>
+                <a:cubicBezTo>
+                  <a:pt x="876096" y="2285234"/>
+                  <a:pt x="0" y="1409138"/>
+                  <a:pt x="0" y="328418"/>
+                </a:cubicBezTo>
+                <a:cubicBezTo>
+                  <a:pt x="0" y="260873"/>
+                  <a:pt x="3422" y="194127"/>
+                  <a:pt x="10103" y="128345"/>
+                </a:cubicBezTo>
+                <a:close/>
+              </a:path>
+            </a:pathLst>
+          </a:custGeom>
+        </p:spPr>
+      </p:pic>
+      <p:pic>
+        <p:nvPicPr>
+          <p:cNvPr id="15" name="Imagen 14">
+            <a:extLst>
+              <a:ext uri="{FF2B5EF4-FFF2-40B4-BE49-F238E27FC236}">
+                <a16:creationId xmlns:a16="http://schemas.microsoft.com/office/drawing/2014/main" id="{ABF72383-982D-4C16-8324-89A95E973947}"/>
+              </a:ext>
+            </a:extLst>
+          </p:cNvPr>
+          <p:cNvPicPr>
+            <a:picLocks noChangeAspect="1"/>
+          </p:cNvPicPr>
+          <p:nvPr/>
+        </p:nvPicPr>
+        <p:blipFill rotWithShape="1">
+          <a:blip r:embed="rId4">
+            <a:extLst>
+              <a:ext uri="{28A0092B-C50C-407E-A947-70E740481C1C}">
+                <a14:useLocalDpi xmlns:a14="http://schemas.microsoft.com/office/drawing/2010/main" val="0"/>
+              </a:ext>
+            </a:extLst>
+          </a:blip>
+          <a:srcRect l="25366" r="30950" b="-1"/>
+          <a:stretch/>
+        </p:blipFill>
+        <p:spPr>
+          <a:xfrm>
+            <a:off x="20" y="2288331"/>
+            <a:ext cx="3564618" cy="4569668"/>
+          </a:xfrm>
+          <a:custGeom>
+            <a:avLst/>
+            <a:gdLst/>
+            <a:ahLst/>
+            <a:cxnLst/>
+            <a:rect l="l" t="t" r="r" b="b"/>
+            <a:pathLst>
+              <a:path w="3564638" h="4569668">
+                <a:moveTo>
+                  <a:pt x="640080" y="0"/>
+                </a:moveTo>
+                <a:cubicBezTo>
+                  <a:pt x="2255269" y="0"/>
+                  <a:pt x="3564638" y="1309369"/>
+                  <a:pt x="3564638" y="2924558"/>
+                </a:cubicBezTo>
+                <a:cubicBezTo>
+                  <a:pt x="3564638" y="3530254"/>
+                  <a:pt x="3380508" y="4092944"/>
+                  <a:pt x="3065170" y="4559707"/>
+                </a:cubicBezTo>
+                <a:lnTo>
+                  <a:pt x="3057720" y="4569668"/>
+                </a:lnTo>
+                <a:lnTo>
+                  <a:pt x="0" y="4569668"/>
+                </a:lnTo>
+                <a:lnTo>
+                  <a:pt x="0" y="72448"/>
+                </a:lnTo>
+                <a:lnTo>
+                  <a:pt x="50679" y="59417"/>
+                </a:lnTo>
+                <a:cubicBezTo>
+                  <a:pt x="241061" y="20459"/>
+                  <a:pt x="438181" y="0"/>
+                  <a:pt x="640080" y="0"/>
+                </a:cubicBezTo>
+                <a:close/>
+              </a:path>
+            </a:pathLst>
+          </a:custGeom>
+        </p:spPr>
+      </p:pic>
+      <p:pic>
+        <p:nvPicPr>
+          <p:cNvPr id="11" name="Imagen 10" descr="Dibujo de un edificio&#10;&#10;Descripción generada automáticamente con confianza media">
+            <a:extLst>
+              <a:ext uri="{FF2B5EF4-FFF2-40B4-BE49-F238E27FC236}">
+                <a16:creationId xmlns:a16="http://schemas.microsoft.com/office/drawing/2014/main" id="{19B24FF4-3645-4A92-8A93-335112385A54}"/>
+              </a:ext>
+            </a:extLst>
+          </p:cNvPr>
+          <p:cNvPicPr>
+            <a:picLocks noChangeAspect="1"/>
+          </p:cNvPicPr>
+          <p:nvPr/>
+        </p:nvPicPr>
+        <p:blipFill rotWithShape="1">
+          <a:blip r:embed="rId5">
+            <a:extLst>
+              <a:ext uri="{28A0092B-C50C-407E-A947-70E740481C1C}">
+                <a14:useLocalDpi xmlns:a14="http://schemas.microsoft.com/office/drawing/2010/main" val="0"/>
+              </a:ext>
+            </a:extLst>
+          </a:blip>
+          <a:srcRect l="24322" r="19677" b="-2"/>
+          <a:stretch/>
+        </p:blipFill>
+        <p:spPr>
+          <a:xfrm>
+            <a:off x="5060068" y="811633"/>
+            <a:ext cx="3567296" cy="3567296"/>
+          </a:xfrm>
+          <a:custGeom>
+            <a:avLst/>
+            <a:gdLst/>
+            <a:ahLst/>
+            <a:cxnLst/>
+            <a:rect l="l" t="t" r="r" b="b"/>
+            <a:pathLst>
+              <a:path w="2852928" h="2852928">
+                <a:moveTo>
+                  <a:pt x="1426464" y="0"/>
+                </a:moveTo>
+                <a:cubicBezTo>
+                  <a:pt x="2214278" y="0"/>
+                  <a:pt x="2852928" y="638650"/>
+                  <a:pt x="2852928" y="1426464"/>
+                </a:cubicBezTo>
+                <a:cubicBezTo>
+                  <a:pt x="2852928" y="2214278"/>
+                  <a:pt x="2214278" y="2852928"/>
+                  <a:pt x="1426464" y="2852928"/>
+                </a:cubicBezTo>
+                <a:cubicBezTo>
+                  <a:pt x="638650" y="2852928"/>
+                  <a:pt x="0" y="2214278"/>
+                  <a:pt x="0" y="1426464"/>
+                </a:cubicBezTo>
+                <a:cubicBezTo>
+                  <a:pt x="0" y="638650"/>
+                  <a:pt x="638650" y="0"/>
+                  <a:pt x="1426464" y="0"/>
+                </a:cubicBezTo>
+                <a:close/>
+              </a:path>
+            </a:pathLst>
+          </a:custGeom>
+        </p:spPr>
+      </p:pic>
+      <p:pic>
+        <p:nvPicPr>
+          <p:cNvPr id="17" name="Imagen 16" descr="Una caricatura de una persona&#10;&#10;Descripción generada automáticamente con confianza media">
+            <a:extLst>
+              <a:ext uri="{FF2B5EF4-FFF2-40B4-BE49-F238E27FC236}">
+                <a16:creationId xmlns:a16="http://schemas.microsoft.com/office/drawing/2014/main" id="{E1C42FBD-CCA9-48DD-8240-8EFB5377E9C5}"/>
+              </a:ext>
+            </a:extLst>
+          </p:cNvPr>
+          <p:cNvPicPr>
+            <a:picLocks noChangeAspect="1"/>
+          </p:cNvPicPr>
+          <p:nvPr/>
+        </p:nvPicPr>
+        <p:blipFill rotWithShape="1">
+          <a:blip r:embed="rId6">
+            <a:extLst>
+              <a:ext uri="{28A0092B-C50C-407E-A947-70E740481C1C}">
+                <a14:useLocalDpi xmlns:a14="http://schemas.microsoft.com/office/drawing/2010/main" val="0"/>
+              </a:ext>
+            </a:extLst>
+          </a:blip>
+          <a:srcRect t="23893" r="4" b="6412"/>
+          <a:stretch/>
+        </p:blipFill>
+        <p:spPr>
+          <a:xfrm>
+            <a:off x="8624685" y="3343779"/>
+            <a:ext cx="3567295" cy="3514220"/>
+          </a:xfrm>
+          <a:custGeom>
+            <a:avLst/>
+            <a:gdLst/>
+            <a:ahLst/>
+            <a:cxnLst/>
+            <a:rect l="l" t="t" r="r" b="b"/>
+            <a:pathLst>
+              <a:path w="2828765" h="2786678">
+                <a:moveTo>
+                  <a:pt x="1888236" y="0"/>
+                </a:moveTo>
+                <a:cubicBezTo>
+                  <a:pt x="2214125" y="0"/>
+                  <a:pt x="2520731" y="82558"/>
+                  <a:pt x="2788281" y="227900"/>
+                </a:cubicBezTo>
+                <a:lnTo>
+                  <a:pt x="2828765" y="252495"/>
+                </a:lnTo>
+                <a:lnTo>
+                  <a:pt x="2828765" y="2786678"/>
+                </a:lnTo>
+                <a:lnTo>
+                  <a:pt x="227128" y="2786678"/>
+                </a:lnTo>
+                <a:lnTo>
+                  <a:pt x="148387" y="2623223"/>
+                </a:lnTo>
+                <a:cubicBezTo>
+                  <a:pt x="52837" y="2397318"/>
+                  <a:pt x="0" y="2148947"/>
+                  <a:pt x="0" y="1888236"/>
+                </a:cubicBezTo>
+                <a:cubicBezTo>
+                  <a:pt x="0" y="845392"/>
+                  <a:pt x="845392" y="0"/>
+                  <a:pt x="1888236" y="0"/>
+                </a:cubicBezTo>
+                <a:close/>
+              </a:path>
+            </a:pathLst>
+          </a:custGeom>
         </p:spPr>
       </p:pic>
     </p:spTree>
@@ -4873,7 +4936,7 @@
           <a:bodyPr/>
           <a:lstStyle/>
           <a:p>
-            <a:endParaRPr lang="es-ES" u="sng"/>
+            <a:endParaRPr lang="es-ES" u="sng" dirty="0"/>
           </a:p>
         </p:txBody>
       </p:sp>
@@ -5131,9 +5194,9 @@
 </file>
 
 <file path=ppt/theme/theme1.xml><?xml version="1.0" encoding="utf-8"?>
-<a:theme xmlns:a="http://schemas.openxmlformats.org/drawingml/2006/main" name="Tema de Office">
+<a:theme xmlns:a="http://schemas.openxmlformats.org/drawingml/2006/main" name="Office Theme">
   <a:themeElements>
-    <a:clrScheme name="Office">
+    <a:clrScheme name="Tema de Office">
       <a:dk1>
         <a:sysClr val="windowText" lastClr="000000"/>
       </a:dk1>
@@ -5147,22 +5210,22 @@
         <a:srgbClr val="E7E6E6"/>
       </a:lt2>
       <a:accent1>
-        <a:srgbClr val="4472C4"/>
+        <a:srgbClr val="29AF8C"/>
       </a:accent1>
       <a:accent2>
-        <a:srgbClr val="ED7D31"/>
+        <a:srgbClr val="97BE49"/>
       </a:accent2>
       <a:accent3>
-        <a:srgbClr val="A5A5A5"/>
+        <a:srgbClr val="3D9CCC"/>
       </a:accent3>
       <a:accent4>
-        <a:srgbClr val="FFC000"/>
+        <a:srgbClr val="7C60C6"/>
       </a:accent4>
       <a:accent5>
-        <a:srgbClr val="5B9BD5"/>
+        <a:srgbClr val="C9492C"/>
       </a:accent5>
       <a:accent6>
-        <a:srgbClr val="70AD47"/>
+        <a:srgbClr val="D58C2E"/>
       </a:accent6>
       <a:hlink>
         <a:srgbClr val="0563C1"/>
@@ -5171,7 +5234,7 @@
         <a:srgbClr val="954F72"/>
       </a:folHlink>
     </a:clrScheme>
-    <a:fontScheme name="Office">
+    <a:fontScheme name="Tema de Office">
       <a:majorFont>
         <a:latin typeface="Calibri Light" panose="020F0302020204030204"/>
         <a:ea typeface=""/>
@@ -5206,23 +5269,6 @@
         <a:font script="Viet" typeface="Times New Roman"/>
         <a:font script="Uigh" typeface="Microsoft Uighur"/>
         <a:font script="Geor" typeface="Sylfaen"/>
-        <a:font script="Armn" typeface="Arial"/>
-        <a:font script="Bugi" typeface="Leelawadee UI"/>
-        <a:font script="Bopo" typeface="Microsoft JhengHei"/>
-        <a:font script="Java" typeface="Javanese Text"/>
-        <a:font script="Lisu" typeface="Segoe UI"/>
-        <a:font script="Mymr" typeface="Myanmar Text"/>
-        <a:font script="Nkoo" typeface="Ebrima"/>
-        <a:font script="Olck" typeface="Nirmala UI"/>
-        <a:font script="Osma" typeface="Ebrima"/>
-        <a:font script="Phag" typeface="Phagspa"/>
-        <a:font script="Syrn" typeface="Estrangelo Edessa"/>
-        <a:font script="Syrj" typeface="Estrangelo Edessa"/>
-        <a:font script="Syre" typeface="Estrangelo Edessa"/>
-        <a:font script="Sora" typeface="Nirmala UI"/>
-        <a:font script="Tale" typeface="Microsoft Tai Le"/>
-        <a:font script="Talu" typeface="Microsoft New Tai Lue"/>
-        <a:font script="Tfng" typeface="Ebrima"/>
       </a:majorFont>
       <a:minorFont>
         <a:latin typeface="Calibri" panose="020F0502020204030204"/>
@@ -5258,26 +5304,9 @@
         <a:font script="Viet" typeface="Arial"/>
         <a:font script="Uigh" typeface="Microsoft Uighur"/>
         <a:font script="Geor" typeface="Sylfaen"/>
-        <a:font script="Armn" typeface="Arial"/>
-        <a:font script="Bugi" typeface="Leelawadee UI"/>
-        <a:font script="Bopo" typeface="Microsoft JhengHei"/>
-        <a:font script="Java" typeface="Javanese Text"/>
-        <a:font script="Lisu" typeface="Segoe UI"/>
-        <a:font script="Mymr" typeface="Myanmar Text"/>
-        <a:font script="Nkoo" typeface="Ebrima"/>
-        <a:font script="Olck" typeface="Nirmala UI"/>
-        <a:font script="Osma" typeface="Ebrima"/>
-        <a:font script="Phag" typeface="Phagspa"/>
-        <a:font script="Syrn" typeface="Estrangelo Edessa"/>
-        <a:font script="Syrj" typeface="Estrangelo Edessa"/>
-        <a:font script="Syre" typeface="Estrangelo Edessa"/>
-        <a:font script="Sora" typeface="Nirmala UI"/>
-        <a:font script="Tale" typeface="Microsoft Tai Le"/>
-        <a:font script="Talu" typeface="Microsoft New Tai Lue"/>
-        <a:font script="Tfng" typeface="Ebrima"/>
       </a:minorFont>
     </a:fontScheme>
-    <a:fmtScheme name="Office">
+    <a:fmtScheme name="Tema de Office">
       <a:fillStyleLst>
         <a:solidFill>
           <a:schemeClr val="phClr"/>
@@ -5419,7 +5448,7 @@
   <a:extraClrSchemeLst/>
   <a:extLst>
     <a:ext uri="{05A4C25C-085E-4340-85A3-A5531E510DB2}">
-      <thm15:themeFamily xmlns:thm15="http://schemas.microsoft.com/office/thememl/2012/main" name="Office Theme" id="{62F939B6-93AF-4DB8-9C6B-D6C7DFDC589F}" vid="{4A3C46E8-61CC-4603-A589-7422A47A8E4A}"/>
+      <thm15:themeFamily xmlns:thm15="http://schemas.microsoft.com/office/thememl/2012/main" name="Office Theme" id="{62F939B6-93AF-4DB8-9C6B-D6C7DFDC589F}" vid="{3E4F19A7-A959-40BB-972C-4880BAF8EB09}"/>
     </a:ext>
   </a:extLst>
 </a:theme>

</xml_diff>

<commit_message>
con esto ya estaría
</commit_message>
<xml_diff>
--- a/Hitos/Presentacion hito 0.pptx
+++ b/Hitos/Presentacion hito 0.pptx
@@ -8,11 +8,13 @@
     <p:sldId id="256" r:id="rId2"/>
     <p:sldId id="257" r:id="rId3"/>
     <p:sldId id="258" r:id="rId4"/>
-    <p:sldId id="259" r:id="rId5"/>
-    <p:sldId id="260" r:id="rId6"/>
-    <p:sldId id="263" r:id="rId7"/>
-    <p:sldId id="261" r:id="rId8"/>
-    <p:sldId id="262" r:id="rId9"/>
+    <p:sldId id="264" r:id="rId5"/>
+    <p:sldId id="263" r:id="rId6"/>
+    <p:sldId id="261" r:id="rId7"/>
+    <p:sldId id="262" r:id="rId8"/>
+    <p:sldId id="260" r:id="rId9"/>
+    <p:sldId id="259" r:id="rId10"/>
+    <p:sldId id="265" r:id="rId11"/>
   </p:sldIdLst>
   <p:sldSz cx="12192000" cy="6858000"/>
   <p:notesSz cx="6858000" cy="9144000"/>
@@ -3060,7 +3062,7 @@
           <a:lstStyle/>
           <a:p>
             <a:pPr algn="ctr"/>
-            <a:endParaRPr lang="en-US"/>
+            <a:endParaRPr lang="en-US" dirty="0"/>
           </a:p>
         </p:txBody>
       </p:sp>
@@ -3154,7 +3156,7 @@
             <a:lstStyle/>
             <a:p>
               <a:pPr algn="ctr"/>
-              <a:endParaRPr lang="en-US"/>
+              <a:endParaRPr lang="en-US" dirty="0"/>
             </a:p>
           </p:txBody>
         </p:sp>
@@ -3218,7 +3220,7 @@
             <a:lstStyle/>
             <a:p>
               <a:pPr algn="ctr"/>
-              <a:endParaRPr lang="en-US"/>
+              <a:endParaRPr lang="en-US" dirty="0"/>
             </a:p>
           </p:txBody>
         </p:sp>
@@ -3289,7 +3291,7 @@
           <a:lstStyle/>
           <a:p>
             <a:pPr algn="ctr"/>
-            <a:endParaRPr lang="en-US"/>
+            <a:endParaRPr lang="en-US" dirty="0"/>
           </a:p>
         </p:txBody>
       </p:sp>
@@ -3371,6 +3373,313 @@
     <p:extLst>
       <p:ext uri="{BB962C8B-B14F-4D97-AF65-F5344CB8AC3E}">
         <p14:creationId xmlns:p14="http://schemas.microsoft.com/office/powerpoint/2010/main" val="2977094993"/>
+      </p:ext>
+    </p:extLst>
+  </p:cSld>
+  <p:clrMapOvr>
+    <a:masterClrMapping/>
+  </p:clrMapOvr>
+</p:sld>
+</file>
+
+<file path=ppt/slides/slide10.xml><?xml version="1.0" encoding="utf-8"?>
+<p:sld xmlns:a="http://schemas.openxmlformats.org/drawingml/2006/main" xmlns:r="http://schemas.openxmlformats.org/officeDocument/2006/relationships" xmlns:p="http://schemas.openxmlformats.org/presentationml/2006/main">
+  <p:cSld>
+    <p:spTree>
+      <p:nvGrpSpPr>
+        <p:cNvPr id="1" name=""/>
+        <p:cNvGrpSpPr/>
+        <p:nvPr/>
+      </p:nvGrpSpPr>
+      <p:grpSpPr>
+        <a:xfrm>
+          <a:off x="0" y="0"/>
+          <a:ext cx="0" cy="0"/>
+          <a:chOff x="0" y="0"/>
+          <a:chExt cx="0" cy="0"/>
+        </a:xfrm>
+      </p:grpSpPr>
+      <p:sp>
+        <p:nvSpPr>
+          <p:cNvPr id="2" name="Título 1">
+            <a:extLst>
+              <a:ext uri="{FF2B5EF4-FFF2-40B4-BE49-F238E27FC236}">
+                <a16:creationId xmlns:a16="http://schemas.microsoft.com/office/drawing/2014/main" id="{69D150A0-6A05-4619-BE6B-DDA57F0628F5}"/>
+              </a:ext>
+            </a:extLst>
+          </p:cNvPr>
+          <p:cNvSpPr>
+            <a:spLocks noGrp="1"/>
+          </p:cNvSpPr>
+          <p:nvPr>
+            <p:ph type="title"/>
+          </p:nvPr>
+        </p:nvSpPr>
+        <p:spPr/>
+        <p:txBody>
+          <a:bodyPr>
+            <a:noAutofit/>
+          </a:bodyPr>
+          <a:lstStyle/>
+          <a:p>
+            <a:pPr algn="ctr"/>
+            <a:r>
+              <a:rPr lang="es-ES" sz="4000" dirty="0">
+                <a:solidFill>
+                  <a:srgbClr val="66FF66"/>
+                </a:solidFill>
+                <a:latin typeface="Algerian" panose="04020705040A02060702" pitchFamily="82" charset="0"/>
+              </a:rPr>
+              <a:t>Muchas</a:t>
+            </a:r>
+            <a:r>
+              <a:rPr lang="es-ES" sz="2800" dirty="0"/>
+              <a:t> </a:t>
+            </a:r>
+            <a:r>
+              <a:rPr lang="es-ES" sz="4000" dirty="0">
+                <a:solidFill>
+                  <a:srgbClr val="66FF66"/>
+                </a:solidFill>
+                <a:latin typeface="Algerian" panose="04020705040A02060702" pitchFamily="82" charset="0"/>
+              </a:rPr>
+              <a:t>gracias por vuestra atención</a:t>
+            </a:r>
+            <a:br>
+              <a:rPr lang="es-ES" sz="4000" dirty="0">
+                <a:solidFill>
+                  <a:srgbClr val="66FF66"/>
+                </a:solidFill>
+                <a:latin typeface="Algerian" panose="04020705040A02060702" pitchFamily="82" charset="0"/>
+              </a:rPr>
+            </a:br>
+            <a:r>
+              <a:rPr lang="es-ES" sz="4000" dirty="0">
+                <a:solidFill>
+                  <a:srgbClr val="66FF66"/>
+                </a:solidFill>
+                <a:latin typeface="Algerian" panose="04020705040A02060702" pitchFamily="82" charset="0"/>
+              </a:rPr>
+              <a:t>sois todos </a:t>
+            </a:r>
+            <a:r>
+              <a:rPr lang="es-ES" sz="4000" dirty="0" err="1">
+                <a:solidFill>
+                  <a:srgbClr val="66FF66"/>
+                </a:solidFill>
+                <a:latin typeface="Algerian" panose="04020705040A02060702" pitchFamily="82" charset="0"/>
+              </a:rPr>
+              <a:t>wapisimos</a:t>
+            </a:r>
+            <a:r>
+              <a:rPr lang="es-ES" sz="4000" dirty="0">
+                <a:solidFill>
+                  <a:srgbClr val="66FF66"/>
+                </a:solidFill>
+                <a:latin typeface="Algerian" panose="04020705040A02060702" pitchFamily="82" charset="0"/>
+              </a:rPr>
+              <a:t> &lt;3</a:t>
+            </a:r>
+          </a:p>
+        </p:txBody>
+      </p:sp>
+      <p:sp>
+        <p:nvSpPr>
+          <p:cNvPr id="3" name="Marcador de contenido 2">
+            <a:extLst>
+              <a:ext uri="{FF2B5EF4-FFF2-40B4-BE49-F238E27FC236}">
+                <a16:creationId xmlns:a16="http://schemas.microsoft.com/office/drawing/2014/main" id="{F94110E3-60DF-4446-A740-6868D55CDC29}"/>
+              </a:ext>
+            </a:extLst>
+          </p:cNvPr>
+          <p:cNvSpPr>
+            <a:spLocks noGrp="1"/>
+          </p:cNvSpPr>
+          <p:nvPr>
+            <p:ph idx="1"/>
+          </p:nvPr>
+        </p:nvSpPr>
+        <p:spPr/>
+        <p:txBody>
+          <a:bodyPr/>
+          <a:lstStyle/>
+          <a:p>
+            <a:r>
+              <a:rPr lang="es-ES" dirty="0" err="1"/>
+              <a:t>Siganos</a:t>
+            </a:r>
+            <a:r>
+              <a:rPr lang="es-ES" dirty="0"/>
+              <a:t> en Twitter </a:t>
+            </a:r>
+            <a:r>
+              <a:rPr lang="es-ES" dirty="0" err="1"/>
+              <a:t>uwu</a:t>
+            </a:r>
+            <a:r>
+              <a:rPr lang="es-ES" dirty="0"/>
+              <a:t> </a:t>
+            </a:r>
+            <a:r>
+              <a:rPr lang="es-ES" b="0" i="0" dirty="0">
+                <a:solidFill>
+                  <a:srgbClr val="6E767D"/>
+                </a:solidFill>
+                <a:effectLst/>
+                <a:latin typeface="TwitterChirp"/>
+                <a:hlinkClick r:id="rId2"/>
+              </a:rPr>
+              <a:t>@XuppapInc</a:t>
+            </a:r>
+            <a:endParaRPr lang="es-ES" dirty="0"/>
+          </a:p>
+        </p:txBody>
+      </p:sp>
+      <p:pic>
+        <p:nvPicPr>
+          <p:cNvPr id="5126" name="Picture 6">
+            <a:extLst>
+              <a:ext uri="{FF2B5EF4-FFF2-40B4-BE49-F238E27FC236}">
+                <a16:creationId xmlns:a16="http://schemas.microsoft.com/office/drawing/2014/main" id="{C63D7F12-7B10-4C7F-AE5C-3C4BF7024080}"/>
+              </a:ext>
+            </a:extLst>
+          </p:cNvPr>
+          <p:cNvPicPr>
+            <a:picLocks noChangeAspect="1" noChangeArrowheads="1"/>
+          </p:cNvPicPr>
+          <p:nvPr/>
+        </p:nvPicPr>
+        <p:blipFill>
+          <a:blip r:embed="rId3">
+            <a:extLst>
+              <a:ext uri="{28A0092B-C50C-407E-A947-70E740481C1C}">
+                <a14:useLocalDpi xmlns:a14="http://schemas.microsoft.com/office/drawing/2010/main" val="0"/>
+              </a:ext>
+            </a:extLst>
+          </a:blip>
+          <a:srcRect/>
+          <a:stretch>
+            <a:fillRect/>
+          </a:stretch>
+        </p:blipFill>
+        <p:spPr bwMode="auto">
+          <a:xfrm>
+            <a:off x="5036670" y="2708013"/>
+            <a:ext cx="2754091" cy="3784862"/>
+          </a:xfrm>
+          <a:prstGeom prst="rect">
+            <a:avLst/>
+          </a:prstGeom>
+          <a:noFill/>
+          <a:extLst>
+            <a:ext uri="{909E8E84-426E-40DD-AFC4-6F175D3DCCD1}">
+              <a14:hiddenFill xmlns:a14="http://schemas.microsoft.com/office/drawing/2010/main">
+                <a:solidFill>
+                  <a:srgbClr val="FFFFFF"/>
+                </a:solidFill>
+              </a14:hiddenFill>
+            </a:ext>
+          </a:extLst>
+        </p:spPr>
+      </p:pic>
+      <p:pic>
+        <p:nvPicPr>
+          <p:cNvPr id="5128" name="Picture 8" descr="Shitpost compilation V37 || shitposting en español - YouTube">
+            <a:extLst>
+              <a:ext uri="{FF2B5EF4-FFF2-40B4-BE49-F238E27FC236}">
+                <a16:creationId xmlns:a16="http://schemas.microsoft.com/office/drawing/2014/main" id="{FAC7EED1-6E74-4ED4-85C4-0D0618C7BE7D}"/>
+              </a:ext>
+            </a:extLst>
+          </p:cNvPr>
+          <p:cNvPicPr>
+            <a:picLocks noChangeAspect="1" noChangeArrowheads="1"/>
+          </p:cNvPicPr>
+          <p:nvPr/>
+        </p:nvPicPr>
+        <p:blipFill>
+          <a:blip r:embed="rId4">
+            <a:extLst>
+              <a:ext uri="{28A0092B-C50C-407E-A947-70E740481C1C}">
+                <a14:useLocalDpi xmlns:a14="http://schemas.microsoft.com/office/drawing/2010/main" val="0"/>
+              </a:ext>
+            </a:extLst>
+          </a:blip>
+          <a:srcRect/>
+          <a:stretch>
+            <a:fillRect/>
+          </a:stretch>
+        </p:blipFill>
+        <p:spPr bwMode="auto">
+          <a:xfrm>
+            <a:off x="584460" y="2830987"/>
+            <a:ext cx="3500487" cy="1969024"/>
+          </a:xfrm>
+          <a:prstGeom prst="rect">
+            <a:avLst/>
+          </a:prstGeom>
+          <a:noFill/>
+          <a:extLst>
+            <a:ext uri="{909E8E84-426E-40DD-AFC4-6F175D3DCCD1}">
+              <a14:hiddenFill xmlns:a14="http://schemas.microsoft.com/office/drawing/2010/main">
+                <a:solidFill>
+                  <a:srgbClr val="FFFFFF"/>
+                </a:solidFill>
+              </a14:hiddenFill>
+            </a:ext>
+          </a:extLst>
+        </p:spPr>
+      </p:pic>
+      <p:pic>
+        <p:nvPicPr>
+          <p:cNvPr id="5130" name="Picture 10" descr="900+ ideas de S H I T P O S T | memes divertidos, memes, memes perrones">
+            <a:extLst>
+              <a:ext uri="{FF2B5EF4-FFF2-40B4-BE49-F238E27FC236}">
+                <a16:creationId xmlns:a16="http://schemas.microsoft.com/office/drawing/2014/main" id="{1CE2CCF6-59E7-488E-AAAF-274BE03925BD}"/>
+              </a:ext>
+            </a:extLst>
+          </p:cNvPr>
+          <p:cNvPicPr>
+            <a:picLocks noChangeAspect="1" noChangeArrowheads="1"/>
+          </p:cNvPicPr>
+          <p:nvPr/>
+        </p:nvPicPr>
+        <p:blipFill>
+          <a:blip r:embed="rId5">
+            <a:extLst>
+              <a:ext uri="{28A0092B-C50C-407E-A947-70E740481C1C}">
+                <a14:useLocalDpi xmlns:a14="http://schemas.microsoft.com/office/drawing/2010/main" val="0"/>
+              </a:ext>
+            </a:extLst>
+          </a:blip>
+          <a:srcRect/>
+          <a:stretch>
+            <a:fillRect/>
+          </a:stretch>
+        </p:blipFill>
+        <p:spPr bwMode="auto">
+          <a:xfrm>
+            <a:off x="8283417" y="1825625"/>
+            <a:ext cx="3488076" cy="3248271"/>
+          </a:xfrm>
+          <a:prstGeom prst="rect">
+            <a:avLst/>
+          </a:prstGeom>
+          <a:noFill/>
+          <a:extLst>
+            <a:ext uri="{909E8E84-426E-40DD-AFC4-6F175D3DCCD1}">
+              <a14:hiddenFill xmlns:a14="http://schemas.microsoft.com/office/drawing/2010/main">
+                <a:solidFill>
+                  <a:srgbClr val="FFFFFF"/>
+                </a:solidFill>
+              </a14:hiddenFill>
+            </a:ext>
+          </a:extLst>
+        </p:spPr>
+      </p:pic>
+    </p:spTree>
+    <p:extLst>
+      <p:ext uri="{BB962C8B-B14F-4D97-AF65-F5344CB8AC3E}">
+        <p14:creationId xmlns:p14="http://schemas.microsoft.com/office/powerpoint/2010/main" val="3361525933"/>
       </p:ext>
     </p:extLst>
   </p:cSld>
@@ -3420,6 +3729,9 @@
           <a:p>
             <a:r>
               <a:rPr lang="es-ES" dirty="0">
+                <a:solidFill>
+                  <a:srgbClr val="66FF66"/>
+                </a:solidFill>
                 <a:latin typeface="Algerian" panose="04020705040A02060702" pitchFamily="82" charset="0"/>
               </a:rPr>
               <a:t>¿Quiénes somos?</a:t>
@@ -3461,7 +3773,7 @@
                   </a:schemeClr>
                 </a:solidFill>
                 <a:effectLst/>
-                <a:latin typeface="Calibri" panose="020F0502020204030204" pitchFamily="34" charset="0"/>
+                <a:latin typeface="Arial Rounded MT Bold" panose="020F0704030504030204" pitchFamily="34" charset="0"/>
                 <a:cs typeface="Calibri" panose="020F0502020204030204" pitchFamily="34" charset="0"/>
               </a:rPr>
               <a:t>Daniel Martín Gómez</a:t>
@@ -3476,7 +3788,7 @@
                   </a:schemeClr>
                 </a:solidFill>
                 <a:effectLst/>
-                <a:latin typeface="Calibri" panose="020F0502020204030204" pitchFamily="34" charset="0"/>
+                <a:latin typeface="Arial Rounded MT Bold" panose="020F0704030504030204" pitchFamily="34" charset="0"/>
                 <a:cs typeface="Calibri" panose="020F0502020204030204" pitchFamily="34" charset="0"/>
               </a:rPr>
               <a:t>Miriam Martín Sánchez</a:t>
@@ -3491,7 +3803,7 @@
                   </a:schemeClr>
                 </a:solidFill>
                 <a:effectLst/>
-                <a:latin typeface="Calibri" panose="020F0502020204030204" pitchFamily="34" charset="0"/>
+                <a:latin typeface="Arial Rounded MT Bold" panose="020F0704030504030204" pitchFamily="34" charset="0"/>
                 <a:cs typeface="Calibri" panose="020F0502020204030204" pitchFamily="34" charset="0"/>
               </a:rPr>
               <a:t>Javier Callejo Herrero</a:t>
@@ -3506,7 +3818,7 @@
                   </a:schemeClr>
                 </a:solidFill>
                 <a:effectLst/>
-                <a:latin typeface="Calibri" panose="020F0502020204030204" pitchFamily="34" charset="0"/>
+                <a:latin typeface="Arial Rounded MT Bold" panose="020F0704030504030204" pitchFamily="34" charset="0"/>
                 <a:cs typeface="Calibri" panose="020F0502020204030204" pitchFamily="34" charset="0"/>
               </a:rPr>
               <a:t>Laura Gómez Bodego </a:t>
@@ -3521,7 +3833,7 @@
                   </a:schemeClr>
                 </a:solidFill>
                 <a:effectLst/>
-                <a:latin typeface="Calibri" panose="020F0502020204030204" pitchFamily="34" charset="0"/>
+                <a:latin typeface="Arial Rounded MT Bold" panose="020F0704030504030204" pitchFamily="34" charset="0"/>
                 <a:cs typeface="Calibri" panose="020F0502020204030204" pitchFamily="34" charset="0"/>
               </a:rPr>
               <a:t>Nacho Del Castillo</a:t>
@@ -3536,7 +3848,7 @@
                   </a:schemeClr>
                 </a:solidFill>
                 <a:effectLst/>
-                <a:latin typeface="Calibri" panose="020F0502020204030204" pitchFamily="34" charset="0"/>
+                <a:latin typeface="Arial Rounded MT Bold" panose="020F0704030504030204" pitchFamily="34" charset="0"/>
                 <a:cs typeface="Calibri" panose="020F0502020204030204" pitchFamily="34" charset="0"/>
               </a:rPr>
               <a:t>Javier Muñoz García</a:t>
@@ -3551,7 +3863,7 @@
                   </a:schemeClr>
                 </a:solidFill>
                 <a:effectLst/>
-                <a:latin typeface="Calibri" panose="020F0502020204030204" pitchFamily="34" charset="0"/>
+                <a:latin typeface="Arial Rounded MT Bold" panose="020F0704030504030204" pitchFamily="34" charset="0"/>
                 <a:cs typeface="Calibri" panose="020F0502020204030204" pitchFamily="34" charset="0"/>
               </a:rPr>
               <a:t>José María Gómez Pulido</a:t>
@@ -3566,7 +3878,7 @@
                   </a:schemeClr>
                 </a:solidFill>
                 <a:effectLst/>
-                <a:latin typeface="Calibri" panose="020F0502020204030204" pitchFamily="34" charset="0"/>
+                <a:latin typeface="Arial Rounded MT Bold" panose="020F0704030504030204" pitchFamily="34" charset="0"/>
                 <a:cs typeface="Calibri" panose="020F0502020204030204" pitchFamily="34" charset="0"/>
               </a:rPr>
               <a:t>Paula Morillas Alonso</a:t>
@@ -3578,7 +3890,7 @@
                 </a:schemeClr>
               </a:solidFill>
               <a:effectLst/>
-              <a:latin typeface="Calibri" panose="020F0502020204030204" pitchFamily="34" charset="0"/>
+              <a:latin typeface="Arial Rounded MT Bold" panose="020F0704030504030204" pitchFamily="34" charset="0"/>
               <a:cs typeface="Calibri" panose="020F0502020204030204" pitchFamily="34" charset="0"/>
             </a:endParaRPr>
           </a:p>
@@ -3591,7 +3903,7 @@
                   </a:schemeClr>
                 </a:solidFill>
                 <a:effectLst/>
-                <a:latin typeface="Calibri" panose="020F0502020204030204" pitchFamily="34" charset="0"/>
+                <a:latin typeface="Arial Rounded MT Bold" panose="020F0704030504030204" pitchFamily="34" charset="0"/>
                 <a:cs typeface="Calibri" panose="020F0502020204030204" pitchFamily="34" charset="0"/>
               </a:rPr>
               <a:t> Rodrigo Sánchez Torres</a:t>
@@ -3606,7 +3918,7 @@
                   </a:schemeClr>
                 </a:solidFill>
                 <a:effectLst/>
-                <a:latin typeface="Calibri" panose="020F0502020204030204" pitchFamily="34" charset="0"/>
+                <a:latin typeface="Arial Rounded MT Bold" panose="020F0704030504030204" pitchFamily="34" charset="0"/>
                 <a:cs typeface="Calibri" panose="020F0502020204030204" pitchFamily="34" charset="0"/>
               </a:rPr>
               <a:t>Sergio Baña Marchante</a:t>
@@ -3617,7 +3929,7 @@
                   <a:lumMod val="95000"/>
                 </a:schemeClr>
               </a:solidFill>
-              <a:latin typeface="Calibri" panose="020F0502020204030204" pitchFamily="34" charset="0"/>
+              <a:latin typeface="Arial Rounded MT Bold" panose="020F0704030504030204" pitchFamily="34" charset="0"/>
               <a:cs typeface="Calibri" panose="020F0502020204030204" pitchFamily="34" charset="0"/>
             </a:endParaRPr>
           </a:p>
@@ -3672,8 +3984,8 @@
         </p:nvSpPr>
         <p:spPr>
           <a:xfrm>
-            <a:off x="525101" y="6123543"/>
-            <a:ext cx="5869663" cy="369332"/>
+            <a:off x="279243" y="6424345"/>
+            <a:ext cx="6771049" cy="369332"/>
           </a:xfrm>
           <a:prstGeom prst="rect">
             <a:avLst/>
@@ -3687,7 +3999,9 @@
           <a:lstStyle/>
           <a:p>
             <a:r>
-              <a:rPr lang="es-ES" dirty="0"/>
+              <a:rPr lang="es-ES" dirty="0">
+                <a:latin typeface="Arial Rounded MT Bold" panose="020F0704030504030204" pitchFamily="34" charset="0"/>
+              </a:rPr>
               <a:t>También conocidos como los guapos del fondo de la clase</a:t>
             </a:r>
           </a:p>
@@ -3751,6 +4065,9 @@
           <a:p>
             <a:r>
               <a:rPr lang="es-ES" dirty="0">
+                <a:solidFill>
+                  <a:srgbClr val="66FF66"/>
+                </a:solidFill>
                 <a:latin typeface="Algerian" panose="04020705040A02060702" pitchFamily="82" charset="0"/>
               </a:rPr>
               <a:t>¿Cómo decidimos que hacer?</a:t>
@@ -3807,7 +4124,7 @@
         <p:spPr>
           <a:xfrm>
             <a:off x="9788533" y="2767280"/>
-            <a:ext cx="2193591" cy="1323439"/>
+            <a:ext cx="2193591" cy="1569660"/>
           </a:xfrm>
           <a:prstGeom prst="rect">
             <a:avLst/>
@@ -3822,7 +4139,9 @@
           <a:p>
             <a:pPr algn="just"/>
             <a:r>
-              <a:rPr lang="es-ES" sz="1600" dirty="0"/>
+              <a:rPr lang="es-ES" sz="1600" dirty="0">
+                <a:latin typeface="Arial Rounded MT Bold" panose="020F0704030504030204" pitchFamily="34" charset="0"/>
+              </a:rPr>
               <a:t>La mejor lluvia de ideas del mundo, gracias Laura por documentarla tan bien te quiero guapa &lt;3</a:t>
             </a:r>
           </a:p>
@@ -3910,7 +4229,7 @@
           <p:cNvPr id="2" name="Título 1">
             <a:extLst>
               <a:ext uri="{FF2B5EF4-FFF2-40B4-BE49-F238E27FC236}">
-                <a16:creationId xmlns:a16="http://schemas.microsoft.com/office/drawing/2014/main" id="{01E33754-5E5A-4E1B-B36A-87F14C3C633E}"/>
+                <a16:creationId xmlns:a16="http://schemas.microsoft.com/office/drawing/2014/main" id="{76205B3A-4664-4D0B-BB0F-0D4A55EAC5A3}"/>
               </a:ext>
             </a:extLst>
           </p:cNvPr>
@@ -3921,15 +4240,26 @@
             <p:ph type="title"/>
           </p:nvPr>
         </p:nvSpPr>
-        <p:spPr/>
+        <p:spPr>
+          <a:xfrm>
+            <a:off x="3467100" y="431801"/>
+            <a:ext cx="5257800" cy="1016000"/>
+          </a:xfrm>
+        </p:spPr>
         <p:txBody>
           <a:bodyPr/>
           <a:lstStyle/>
           <a:p>
             <a:r>
-              <a:rPr lang="es-ES" dirty="0"/>
-              <a:t>Inspiración</a:t>
-            </a:r>
+              <a:rPr lang="es-ES" sz="4400" dirty="0">
+                <a:solidFill>
+                  <a:srgbClr val="66FF66"/>
+                </a:solidFill>
+                <a:latin typeface="Algerian" panose="04020705040A02060702" pitchFamily="82" charset="0"/>
+              </a:rPr>
+              <a:t>¿a qué se juega?</a:t>
+            </a:r>
+            <a:endParaRPr lang="es-ES" dirty="0"/>
           </a:p>
         </p:txBody>
       </p:sp>
@@ -3938,7 +4268,7 @@
           <p:cNvPr id="3" name="Marcador de contenido 2">
             <a:extLst>
               <a:ext uri="{FF2B5EF4-FFF2-40B4-BE49-F238E27FC236}">
-                <a16:creationId xmlns:a16="http://schemas.microsoft.com/office/drawing/2014/main" id="{66D53499-7837-44EB-9AF4-C7A8A4C3414D}"/>
+                <a16:creationId xmlns:a16="http://schemas.microsoft.com/office/drawing/2014/main" id="{1748176B-F743-4FC0-AAD2-99445A1B25F2}"/>
               </a:ext>
             </a:extLst>
           </p:cNvPr>
@@ -3949,478 +4279,316 @@
             <p:ph idx="1"/>
           </p:nvPr>
         </p:nvSpPr>
-        <p:spPr/>
+        <p:spPr>
+          <a:xfrm>
+            <a:off x="1100972" y="1547731"/>
+            <a:ext cx="8296275" cy="3641725"/>
+          </a:xfrm>
+        </p:spPr>
         <p:txBody>
           <a:bodyPr>
             <a:normAutofit/>
           </a:bodyPr>
           <a:lstStyle/>
           <a:p>
-            <a:pPr algn="just" rtl="0" fontAlgn="base">
-              <a:spcBef>
-                <a:spcPts val="0"/>
-              </a:spcBef>
-              <a:spcAft>
-                <a:spcPts val="0"/>
-              </a:spcAft>
-              <a:buFont typeface="Arial" panose="020B0604020202020204" pitchFamily="34" charset="0"/>
-              <a:buChar char="•"/>
+            <a:pPr marL="0" indent="0">
+              <a:buNone/>
             </a:pPr>
             <a:r>
-              <a:rPr lang="es-ES" b="1" i="0" u="none" strike="noStrike" dirty="0" err="1">
+              <a:rPr lang="es-ES" dirty="0">
                 <a:solidFill>
                   <a:schemeClr val="tx1">
                     <a:lumMod val="95000"/>
                   </a:schemeClr>
                 </a:solidFill>
-                <a:effectLst/>
-                <a:latin typeface="Arial" panose="020B0604020202020204" pitchFamily="34" charset="0"/>
-              </a:rPr>
-              <a:t>Dark</a:t>
-            </a:r>
-            <a:r>
-              <a:rPr lang="es-ES" b="1" i="0" u="none" strike="noStrike" dirty="0">
+                <a:latin typeface="Arial Rounded MT Bold" panose="020F0704030504030204" pitchFamily="34" charset="0"/>
+                <a:cs typeface="Calibri" panose="020F0502020204030204" pitchFamily="34" charset="0"/>
+              </a:rPr>
+              <a:t>2D</a:t>
+            </a:r>
+          </a:p>
+          <a:p>
+            <a:pPr marL="0" indent="0">
+              <a:buNone/>
+            </a:pPr>
+            <a:r>
+              <a:rPr lang="es-ES" dirty="0">
                 <a:solidFill>
                   <a:schemeClr val="tx1">
                     <a:lumMod val="95000"/>
                   </a:schemeClr>
                 </a:solidFill>
-                <a:effectLst/>
-                <a:latin typeface="Arial" panose="020B0604020202020204" pitchFamily="34" charset="0"/>
-              </a:rPr>
-              <a:t> </a:t>
-            </a:r>
-            <a:r>
-              <a:rPr lang="es-ES" b="1" i="0" u="none" strike="noStrike" dirty="0" err="1">
+                <a:latin typeface="Arial Rounded MT Bold" panose="020F0704030504030204" pitchFamily="34" charset="0"/>
+                <a:cs typeface="Calibri" panose="020F0502020204030204" pitchFamily="34" charset="0"/>
+              </a:rPr>
+              <a:t>		</a:t>
+            </a:r>
+            <a:r>
+              <a:rPr lang="es-ES" dirty="0" err="1">
                 <a:solidFill>
                   <a:schemeClr val="tx1">
                     <a:lumMod val="95000"/>
                   </a:schemeClr>
                 </a:solidFill>
-                <a:effectLst/>
-                <a:latin typeface="Arial" panose="020B0604020202020204" pitchFamily="34" charset="0"/>
-              </a:rPr>
-              <a:t>Souls</a:t>
-            </a:r>
-            <a:endParaRPr lang="es-ES" b="0" i="0" u="none" strike="noStrike" dirty="0">
+                <a:latin typeface="Arial Rounded MT Bold" panose="020F0704030504030204" pitchFamily="34" charset="0"/>
+                <a:cs typeface="Calibri" panose="020F0502020204030204" pitchFamily="34" charset="0"/>
+              </a:rPr>
+              <a:t>Scroll</a:t>
+            </a:r>
+            <a:r>
+              <a:rPr lang="es-ES" dirty="0">
+                <a:solidFill>
+                  <a:schemeClr val="tx1">
+                    <a:lumMod val="95000"/>
+                  </a:schemeClr>
+                </a:solidFill>
+                <a:latin typeface="Arial Rounded MT Bold" panose="020F0704030504030204" pitchFamily="34" charset="0"/>
+                <a:cs typeface="Calibri" panose="020F0502020204030204" pitchFamily="34" charset="0"/>
+              </a:rPr>
+              <a:t> lateral</a:t>
+            </a:r>
+          </a:p>
+          <a:p>
+            <a:endParaRPr lang="es-ES" dirty="0">
               <a:solidFill>
                 <a:schemeClr val="tx1">
                   <a:lumMod val="95000"/>
                 </a:schemeClr>
               </a:solidFill>
-              <a:effectLst/>
-              <a:latin typeface="Arial" panose="020B0604020202020204" pitchFamily="34" charset="0"/>
+              <a:latin typeface="Arial Rounded MT Bold" panose="020F0704030504030204" pitchFamily="34" charset="0"/>
+              <a:cs typeface="Calibri" panose="020F0502020204030204" pitchFamily="34" charset="0"/>
             </a:endParaRPr>
           </a:p>
           <a:p>
-            <a:pPr algn="just" rtl="0" fontAlgn="base">
-              <a:spcBef>
-                <a:spcPts val="0"/>
-              </a:spcBef>
-              <a:spcAft>
-                <a:spcPts val="0"/>
-              </a:spcAft>
-              <a:buFont typeface="Arial" panose="020B0604020202020204" pitchFamily="34" charset="0"/>
-              <a:buChar char="•"/>
-            </a:pPr>
-            <a:r>
-              <a:rPr lang="es-ES" b="1" i="0" u="none" strike="noStrike" dirty="0">
-                <a:solidFill>
-                  <a:schemeClr val="tx1">
-                    <a:lumMod val="95000"/>
-                  </a:schemeClr>
-                </a:solidFill>
-                <a:effectLst/>
-                <a:latin typeface="Arial" panose="020B0604020202020204" pitchFamily="34" charset="0"/>
-              </a:rPr>
-              <a:t>Ender </a:t>
-            </a:r>
-            <a:r>
-              <a:rPr lang="es-ES" b="1" i="0" u="none" strike="noStrike" dirty="0" err="1">
-                <a:solidFill>
-                  <a:schemeClr val="tx1">
-                    <a:lumMod val="95000"/>
-                  </a:schemeClr>
-                </a:solidFill>
-                <a:effectLst/>
-                <a:latin typeface="Arial" panose="020B0604020202020204" pitchFamily="34" charset="0"/>
-              </a:rPr>
-              <a:t>lilies</a:t>
-            </a:r>
-            <a:endParaRPr lang="es-ES" b="1" i="0" u="none" strike="noStrike" dirty="0">
+            <a:endParaRPr lang="es-ES" dirty="0">
               <a:solidFill>
                 <a:schemeClr val="tx1">
                   <a:lumMod val="95000"/>
                 </a:schemeClr>
               </a:solidFill>
-              <a:effectLst/>
-              <a:latin typeface="Arial" panose="020B0604020202020204" pitchFamily="34" charset="0"/>
+              <a:latin typeface="Arial Rounded MT Bold" panose="020F0704030504030204" pitchFamily="34" charset="0"/>
+              <a:cs typeface="Calibri" panose="020F0502020204030204" pitchFamily="34" charset="0"/>
             </a:endParaRPr>
           </a:p>
           <a:p>
-            <a:pPr algn="just" rtl="0" fontAlgn="base">
-              <a:spcBef>
-                <a:spcPts val="0"/>
-              </a:spcBef>
-              <a:spcAft>
-                <a:spcPts val="0"/>
-              </a:spcAft>
-              <a:buFont typeface="Arial" panose="020B0604020202020204" pitchFamily="34" charset="0"/>
-              <a:buChar char="•"/>
+            <a:pPr marL="0" indent="0">
+              <a:buNone/>
             </a:pPr>
             <a:r>
-              <a:rPr lang="es-ES" b="1" i="0" u="none" strike="noStrike" dirty="0" err="1">
+              <a:rPr lang="es-ES" dirty="0">
                 <a:solidFill>
                   <a:schemeClr val="tx1">
                     <a:lumMod val="95000"/>
                   </a:schemeClr>
                 </a:solidFill>
-                <a:effectLst/>
-                <a:latin typeface="Arial" panose="020B0604020202020204" pitchFamily="34" charset="0"/>
-              </a:rPr>
-              <a:t>Hollow</a:t>
-            </a:r>
-            <a:r>
-              <a:rPr lang="es-ES" b="1" i="0" u="none" strike="noStrike" dirty="0">
+                <a:latin typeface="Arial Rounded MT Bold" panose="020F0704030504030204" pitchFamily="34" charset="0"/>
+                <a:cs typeface="Calibri" panose="020F0502020204030204" pitchFamily="34" charset="0"/>
+              </a:rPr>
+              <a:t>Acción</a:t>
+            </a:r>
+          </a:p>
+          <a:p>
+            <a:pPr marL="0" indent="0">
+              <a:buNone/>
+            </a:pPr>
+            <a:r>
+              <a:rPr lang="es-ES" dirty="0">
                 <a:solidFill>
                   <a:schemeClr val="tx1">
                     <a:lumMod val="95000"/>
                   </a:schemeClr>
                 </a:solidFill>
-                <a:effectLst/>
-                <a:latin typeface="Arial" panose="020B0604020202020204" pitchFamily="34" charset="0"/>
-              </a:rPr>
-              <a:t> </a:t>
-            </a:r>
-            <a:r>
-              <a:rPr lang="es-ES" b="1" i="0" u="none" strike="noStrike" dirty="0" err="1">
+                <a:latin typeface="Arial Rounded MT Bold" panose="020F0704030504030204" pitchFamily="34" charset="0"/>
+                <a:cs typeface="Calibri" panose="020F0502020204030204" pitchFamily="34" charset="0"/>
+              </a:rPr>
+              <a:t>			Aventuras</a:t>
+            </a:r>
+          </a:p>
+          <a:p>
+            <a:pPr marL="0" indent="0">
+              <a:buNone/>
+            </a:pPr>
+            <a:r>
+              <a:rPr lang="es-ES" dirty="0">
                 <a:solidFill>
                   <a:schemeClr val="tx1">
                     <a:lumMod val="95000"/>
                   </a:schemeClr>
                 </a:solidFill>
-                <a:effectLst/>
-                <a:latin typeface="Arial" panose="020B0604020202020204" pitchFamily="34" charset="0"/>
-              </a:rPr>
-              <a:t>Knight</a:t>
-            </a:r>
-            <a:endParaRPr lang="es-ES" b="1" i="0" u="none" strike="noStrike" dirty="0">
+                <a:latin typeface="Arial Rounded MT Bold" panose="020F0704030504030204" pitchFamily="34" charset="0"/>
+                <a:cs typeface="Calibri" panose="020F0502020204030204" pitchFamily="34" charset="0"/>
+              </a:rPr>
+              <a:t>						</a:t>
+            </a:r>
+            <a:r>
+              <a:rPr lang="es-ES" dirty="0" err="1">
+                <a:solidFill>
+                  <a:schemeClr val="tx1">
+                    <a:lumMod val="95000"/>
+                  </a:schemeClr>
+                </a:solidFill>
+                <a:latin typeface="Arial Rounded MT Bold" panose="020F0704030504030204" pitchFamily="34" charset="0"/>
+                <a:cs typeface="Calibri" panose="020F0502020204030204" pitchFamily="34" charset="0"/>
+              </a:rPr>
+              <a:t>Bossrush</a:t>
+            </a:r>
+            <a:endParaRPr lang="es-ES" dirty="0">
               <a:solidFill>
                 <a:schemeClr val="tx1">
                   <a:lumMod val="95000"/>
                 </a:schemeClr>
               </a:solidFill>
-              <a:effectLst/>
-              <a:latin typeface="Arial" panose="020B0604020202020204" pitchFamily="34" charset="0"/>
+              <a:latin typeface="Arial Rounded MT Bold" panose="020F0704030504030204" pitchFamily="34" charset="0"/>
+              <a:cs typeface="Calibri" panose="020F0502020204030204" pitchFamily="34" charset="0"/>
             </a:endParaRPr>
           </a:p>
-          <a:p>
-            <a:pPr algn="just" rtl="0" fontAlgn="base">
-              <a:spcBef>
-                <a:spcPts val="0"/>
-              </a:spcBef>
-              <a:spcAft>
-                <a:spcPts val="0"/>
-              </a:spcAft>
-              <a:buFont typeface="Arial" panose="020B0604020202020204" pitchFamily="34" charset="0"/>
-              <a:buChar char="•"/>
-            </a:pPr>
-            <a:r>
-              <a:rPr lang="es-ES" b="1" i="0" u="none" strike="noStrike" dirty="0" err="1">
-                <a:solidFill>
-                  <a:schemeClr val="tx1">
-                    <a:lumMod val="95000"/>
-                  </a:schemeClr>
-                </a:solidFill>
-                <a:effectLst/>
-                <a:latin typeface="Arial" panose="020B0604020202020204" pitchFamily="34" charset="0"/>
-              </a:rPr>
-              <a:t>Morbid</a:t>
-            </a:r>
-            <a:endParaRPr lang="es-ES" b="1" i="0" u="none" strike="noStrike" dirty="0">
-              <a:solidFill>
-                <a:schemeClr val="tx1">
-                  <a:lumMod val="95000"/>
-                </a:schemeClr>
-              </a:solidFill>
-              <a:effectLst/>
-              <a:latin typeface="Arial" panose="020B0604020202020204" pitchFamily="34" charset="0"/>
-            </a:endParaRPr>
-          </a:p>
-          <a:p>
-            <a:pPr algn="just" rtl="0" fontAlgn="base">
-              <a:spcBef>
-                <a:spcPts val="0"/>
-              </a:spcBef>
-              <a:spcAft>
-                <a:spcPts val="0"/>
-              </a:spcAft>
-              <a:buFont typeface="Arial" panose="020B0604020202020204" pitchFamily="34" charset="0"/>
-              <a:buChar char="•"/>
-            </a:pPr>
-            <a:r>
-              <a:rPr lang="es-ES" b="1" i="0" u="none" strike="noStrike" dirty="0" err="1">
-                <a:solidFill>
-                  <a:schemeClr val="tx1">
-                    <a:lumMod val="95000"/>
-                  </a:schemeClr>
-                </a:solidFill>
-                <a:effectLst/>
-                <a:latin typeface="Arial" panose="020B0604020202020204" pitchFamily="34" charset="0"/>
-              </a:rPr>
-              <a:t>Cuphead</a:t>
-            </a:r>
-            <a:endParaRPr lang="es-ES" b="1" i="0" u="none" strike="noStrike" dirty="0">
-              <a:solidFill>
-                <a:schemeClr val="tx1">
-                  <a:lumMod val="95000"/>
-                </a:schemeClr>
-              </a:solidFill>
-              <a:effectLst/>
-              <a:latin typeface="Arial" panose="020B0604020202020204" pitchFamily="34" charset="0"/>
-            </a:endParaRPr>
-          </a:p>
-          <a:p>
-            <a:pPr algn="just" rtl="0" fontAlgn="base">
-              <a:spcBef>
-                <a:spcPts val="0"/>
-              </a:spcBef>
-              <a:spcAft>
-                <a:spcPts val="0"/>
-              </a:spcAft>
-              <a:buFont typeface="Arial" panose="020B0604020202020204" pitchFamily="34" charset="0"/>
-              <a:buChar char="•"/>
-            </a:pPr>
-            <a:r>
-              <a:rPr lang="es-ES" b="1" i="0" u="none" strike="noStrike" dirty="0">
-                <a:solidFill>
-                  <a:schemeClr val="tx1">
-                    <a:lumMod val="95000"/>
-                  </a:schemeClr>
-                </a:solidFill>
-                <a:effectLst/>
-                <a:latin typeface="Arial" panose="020B0604020202020204" pitchFamily="34" charset="0"/>
-              </a:rPr>
-              <a:t>Titan </a:t>
-            </a:r>
-            <a:r>
-              <a:rPr lang="es-ES" b="1" i="0" u="none" strike="noStrike" dirty="0" err="1">
-                <a:solidFill>
-                  <a:schemeClr val="tx1">
-                    <a:lumMod val="95000"/>
-                  </a:schemeClr>
-                </a:solidFill>
-                <a:effectLst/>
-                <a:latin typeface="Arial" panose="020B0604020202020204" pitchFamily="34" charset="0"/>
-              </a:rPr>
-              <a:t>Souls</a:t>
-            </a:r>
-            <a:endParaRPr lang="es-ES" b="1" i="0" u="none" strike="noStrike" dirty="0">
-              <a:solidFill>
-                <a:schemeClr val="tx1">
-                  <a:lumMod val="95000"/>
-                </a:schemeClr>
-              </a:solidFill>
-              <a:effectLst/>
-              <a:latin typeface="Arial" panose="020B0604020202020204" pitchFamily="34" charset="0"/>
-            </a:endParaRPr>
-          </a:p>
-          <a:p>
-            <a:pPr algn="just" rtl="0" fontAlgn="base">
-              <a:spcBef>
-                <a:spcPts val="0"/>
-              </a:spcBef>
-              <a:spcAft>
-                <a:spcPts val="0"/>
-              </a:spcAft>
-              <a:buFont typeface="Arial" panose="020B0604020202020204" pitchFamily="34" charset="0"/>
-              <a:buChar char="•"/>
-            </a:pPr>
-            <a:r>
-              <a:rPr lang="es-ES" b="1" i="0" u="none" strike="noStrike" dirty="0" err="1">
-                <a:solidFill>
-                  <a:schemeClr val="tx1">
-                    <a:lumMod val="95000"/>
-                  </a:schemeClr>
-                </a:solidFill>
-                <a:effectLst/>
-                <a:latin typeface="Arial" panose="020B0604020202020204" pitchFamily="34" charset="0"/>
-              </a:rPr>
-              <a:t>Dead</a:t>
-            </a:r>
-            <a:r>
-              <a:rPr lang="es-ES" b="1" i="0" u="none" strike="noStrike" dirty="0">
-                <a:solidFill>
-                  <a:schemeClr val="tx1">
-                    <a:lumMod val="95000"/>
-                  </a:schemeClr>
-                </a:solidFill>
-                <a:effectLst/>
-                <a:latin typeface="Arial" panose="020B0604020202020204" pitchFamily="34" charset="0"/>
-              </a:rPr>
-              <a:t> </a:t>
-            </a:r>
-            <a:r>
-              <a:rPr lang="es-ES" b="1" i="0" u="none" strike="noStrike" dirty="0" err="1">
-                <a:solidFill>
-                  <a:schemeClr val="tx1">
-                    <a:lumMod val="95000"/>
-                  </a:schemeClr>
-                </a:solidFill>
-                <a:effectLst/>
-                <a:latin typeface="Arial" panose="020B0604020202020204" pitchFamily="34" charset="0"/>
-              </a:rPr>
-              <a:t>cells</a:t>
-            </a:r>
-            <a:endParaRPr lang="es-ES" b="1" i="0" u="none" strike="noStrike" dirty="0">
-              <a:solidFill>
-                <a:schemeClr val="tx1">
-                  <a:lumMod val="95000"/>
-                </a:schemeClr>
-              </a:solidFill>
-              <a:effectLst/>
-              <a:latin typeface="Arial" panose="020B0604020202020204" pitchFamily="34" charset="0"/>
-            </a:endParaRPr>
-          </a:p>
-          <a:p>
-            <a:pPr algn="just" rtl="0" fontAlgn="base">
-              <a:spcBef>
-                <a:spcPts val="0"/>
-              </a:spcBef>
-              <a:spcAft>
-                <a:spcPts val="0"/>
-              </a:spcAft>
-              <a:buFont typeface="Arial" panose="020B0604020202020204" pitchFamily="34" charset="0"/>
-              <a:buChar char="•"/>
-            </a:pPr>
-            <a:r>
-              <a:rPr lang="es-ES" b="1" i="0" u="none" strike="noStrike" dirty="0" err="1">
-                <a:solidFill>
-                  <a:schemeClr val="tx1">
-                    <a:lumMod val="95000"/>
-                  </a:schemeClr>
-                </a:solidFill>
-                <a:effectLst/>
-                <a:latin typeface="Arial" panose="020B0604020202020204" pitchFamily="34" charset="0"/>
-              </a:rPr>
-              <a:t>Blasphemous</a:t>
-            </a:r>
-            <a:endParaRPr lang="es-ES" b="1" i="0" u="none" strike="noStrike" dirty="0">
-              <a:solidFill>
-                <a:schemeClr val="tx1">
-                  <a:lumMod val="95000"/>
-                </a:schemeClr>
-              </a:solidFill>
-              <a:effectLst/>
-              <a:latin typeface="Arial" panose="020B0604020202020204" pitchFamily="34" charset="0"/>
-            </a:endParaRPr>
-          </a:p>
-          <a:p>
-            <a:pPr algn="just" rtl="0" fontAlgn="base">
-              <a:spcBef>
-                <a:spcPts val="0"/>
-              </a:spcBef>
-              <a:spcAft>
-                <a:spcPts val="0"/>
-              </a:spcAft>
-              <a:buFont typeface="Arial" panose="020B0604020202020204" pitchFamily="34" charset="0"/>
-              <a:buChar char="•"/>
-            </a:pPr>
-            <a:r>
-              <a:rPr lang="es-ES" b="1" i="0" u="none" strike="noStrike" dirty="0" err="1">
-                <a:solidFill>
-                  <a:schemeClr val="tx1">
-                    <a:lumMod val="95000"/>
-                  </a:schemeClr>
-                </a:solidFill>
-                <a:effectLst/>
-                <a:latin typeface="Arial" panose="020B0604020202020204" pitchFamily="34" charset="0"/>
-              </a:rPr>
-              <a:t>Death</a:t>
-            </a:r>
-            <a:r>
-              <a:rPr lang="es-ES" b="1" i="0" u="none" strike="noStrike" dirty="0">
-                <a:solidFill>
-                  <a:schemeClr val="tx1">
-                    <a:lumMod val="95000"/>
-                  </a:schemeClr>
-                </a:solidFill>
-                <a:effectLst/>
-                <a:latin typeface="Arial" panose="020B0604020202020204" pitchFamily="34" charset="0"/>
-              </a:rPr>
-              <a:t> </a:t>
-            </a:r>
-            <a:r>
-              <a:rPr lang="es-ES" b="1" i="0" u="none" strike="noStrike" dirty="0" err="1">
-                <a:solidFill>
-                  <a:schemeClr val="tx1">
-                    <a:lumMod val="95000"/>
-                  </a:schemeClr>
-                </a:solidFill>
-                <a:effectLst/>
-                <a:latin typeface="Arial" panose="020B0604020202020204" pitchFamily="34" charset="0"/>
-              </a:rPr>
-              <a:t>Door</a:t>
-            </a:r>
-            <a:endParaRPr lang="es-ES" b="1" i="0" u="none" strike="noStrike" dirty="0">
-              <a:solidFill>
-                <a:schemeClr val="tx1">
-                  <a:lumMod val="95000"/>
-                </a:schemeClr>
-              </a:solidFill>
-              <a:effectLst/>
-              <a:latin typeface="Arial" panose="020B0604020202020204" pitchFamily="34" charset="0"/>
-            </a:endParaRPr>
-          </a:p>
-          <a:p>
-            <a:pPr algn="just" rtl="0" fontAlgn="base">
-              <a:spcBef>
-                <a:spcPts val="0"/>
-              </a:spcBef>
-              <a:spcAft>
-                <a:spcPts val="0"/>
-              </a:spcAft>
-              <a:buFont typeface="Arial" panose="020B0604020202020204" pitchFamily="34" charset="0"/>
-              <a:buChar char="•"/>
-            </a:pPr>
-            <a:r>
-              <a:rPr lang="es-ES" b="1" i="0" u="none" strike="noStrike" dirty="0">
-                <a:solidFill>
-                  <a:schemeClr val="tx1">
-                    <a:lumMod val="95000"/>
-                  </a:schemeClr>
-                </a:solidFill>
-                <a:effectLst/>
-                <a:latin typeface="Arial" panose="020B0604020202020204" pitchFamily="34" charset="0"/>
-              </a:rPr>
-              <a:t>Salt and </a:t>
-            </a:r>
-            <a:r>
-              <a:rPr lang="es-ES" b="1" i="0" u="none" strike="noStrike" dirty="0" err="1">
-                <a:solidFill>
-                  <a:schemeClr val="tx1">
-                    <a:lumMod val="95000"/>
-                  </a:schemeClr>
-                </a:solidFill>
-                <a:effectLst/>
-                <a:latin typeface="Arial" panose="020B0604020202020204" pitchFamily="34" charset="0"/>
-              </a:rPr>
-              <a:t>Sanctuary</a:t>
-            </a:r>
-            <a:endParaRPr lang="es-ES" sz="4000" dirty="0">
-              <a:solidFill>
-                <a:schemeClr val="tx1">
-                  <a:lumMod val="95000"/>
-                </a:schemeClr>
-              </a:solidFill>
-            </a:endParaRPr>
-          </a:p>
-        </p:txBody>
-      </p:sp>
+        </p:txBody>
+      </p:sp>
+      <p:pic>
+        <p:nvPicPr>
+          <p:cNvPr id="3074" name="Picture 2" descr="Underhero - Demo Gameplay (2D Side-scroller RPG Adventure ) - YouTube">
+            <a:extLst>
+              <a:ext uri="{FF2B5EF4-FFF2-40B4-BE49-F238E27FC236}">
+                <a16:creationId xmlns:a16="http://schemas.microsoft.com/office/drawing/2014/main" id="{F5EC8662-01D9-4ED5-9293-6B71549FD814}"/>
+              </a:ext>
+            </a:extLst>
+          </p:cNvPr>
+          <p:cNvPicPr>
+            <a:picLocks noChangeAspect="1" noChangeArrowheads="1"/>
+          </p:cNvPicPr>
+          <p:nvPr/>
+        </p:nvPicPr>
+        <p:blipFill>
+          <a:blip r:embed="rId2">
+            <a:extLst>
+              <a:ext uri="{28A0092B-C50C-407E-A947-70E740481C1C}">
+                <a14:useLocalDpi xmlns:a14="http://schemas.microsoft.com/office/drawing/2010/main" val="0"/>
+              </a:ext>
+            </a:extLst>
+          </a:blip>
+          <a:srcRect/>
+          <a:stretch>
+            <a:fillRect/>
+          </a:stretch>
+        </p:blipFill>
+        <p:spPr bwMode="auto">
+          <a:xfrm>
+            <a:off x="7026015" y="1701800"/>
+            <a:ext cx="3886984" cy="2186429"/>
+          </a:xfrm>
+          <a:prstGeom prst="rect">
+            <a:avLst/>
+          </a:prstGeom>
+          <a:noFill/>
+          <a:extLst>
+            <a:ext uri="{909E8E84-426E-40DD-AFC4-6F175D3DCCD1}">
+              <a14:hiddenFill xmlns:a14="http://schemas.microsoft.com/office/drawing/2010/main">
+                <a:solidFill>
+                  <a:srgbClr val="FFFFFF"/>
+                </a:solidFill>
+              </a14:hiddenFill>
+            </a:ext>
+          </a:extLst>
+        </p:spPr>
+      </p:pic>
+      <p:pic>
+        <p:nvPicPr>
+          <p:cNvPr id="3076" name="Picture 4" descr="FINAL FANTASY VIII RE-IMAGINED (FINAL FANTASY VII EN 2D) &amp;gt;&amp;gt; byLion Tops">
+            <a:extLst>
+              <a:ext uri="{FF2B5EF4-FFF2-40B4-BE49-F238E27FC236}">
+                <a16:creationId xmlns:a16="http://schemas.microsoft.com/office/drawing/2014/main" id="{71643EB5-7567-4373-AC62-32FDBEA4C186}"/>
+              </a:ext>
+            </a:extLst>
+          </p:cNvPr>
+          <p:cNvPicPr>
+            <a:picLocks noChangeAspect="1" noChangeArrowheads="1"/>
+          </p:cNvPicPr>
+          <p:nvPr/>
+        </p:nvPicPr>
+        <p:blipFill>
+          <a:blip r:embed="rId3">
+            <a:extLst>
+              <a:ext uri="{28A0092B-C50C-407E-A947-70E740481C1C}">
+                <a14:useLocalDpi xmlns:a14="http://schemas.microsoft.com/office/drawing/2010/main" val="0"/>
+              </a:ext>
+            </a:extLst>
+          </a:blip>
+          <a:srcRect/>
+          <a:stretch>
+            <a:fillRect/>
+          </a:stretch>
+        </p:blipFill>
+        <p:spPr bwMode="auto">
+          <a:xfrm>
+            <a:off x="818266" y="4890155"/>
+            <a:ext cx="2878318" cy="1619054"/>
+          </a:xfrm>
+          <a:prstGeom prst="rect">
+            <a:avLst/>
+          </a:prstGeom>
+          <a:noFill/>
+          <a:extLst>
+            <a:ext uri="{909E8E84-426E-40DD-AFC4-6F175D3DCCD1}">
+              <a14:hiddenFill xmlns:a14="http://schemas.microsoft.com/office/drawing/2010/main">
+                <a:solidFill>
+                  <a:srgbClr val="FFFFFF"/>
+                </a:solidFill>
+              </a14:hiddenFill>
+            </a:ext>
+          </a:extLst>
+        </p:spPr>
+      </p:pic>
+      <p:pic>
+        <p:nvPicPr>
+          <p:cNvPr id="3078" name="Picture 6" descr="Gamescom 2018] Dark Devotion. El nuevo gran Dark Souls de scroll lateral">
+            <a:extLst>
+              <a:ext uri="{FF2B5EF4-FFF2-40B4-BE49-F238E27FC236}">
+                <a16:creationId xmlns:a16="http://schemas.microsoft.com/office/drawing/2014/main" id="{501E090D-BD8F-4F82-AAAA-D6695B3E601D}"/>
+              </a:ext>
+            </a:extLst>
+          </p:cNvPr>
+          <p:cNvPicPr>
+            <a:picLocks noChangeAspect="1" noChangeArrowheads="1"/>
+          </p:cNvPicPr>
+          <p:nvPr/>
+        </p:nvPicPr>
+        <p:blipFill>
+          <a:blip r:embed="rId4">
+            <a:extLst>
+              <a:ext uri="{28A0092B-C50C-407E-A947-70E740481C1C}">
+                <a14:useLocalDpi xmlns:a14="http://schemas.microsoft.com/office/drawing/2010/main" val="0"/>
+              </a:ext>
+            </a:extLst>
+          </a:blip>
+          <a:srcRect/>
+          <a:stretch>
+            <a:fillRect/>
+          </a:stretch>
+        </p:blipFill>
+        <p:spPr bwMode="auto">
+          <a:xfrm>
+            <a:off x="9203997" y="5156200"/>
+            <a:ext cx="2699405" cy="1517462"/>
+          </a:xfrm>
+          <a:prstGeom prst="rect">
+            <a:avLst/>
+          </a:prstGeom>
+          <a:noFill/>
+          <a:extLst>
+            <a:ext uri="{909E8E84-426E-40DD-AFC4-6F175D3DCCD1}">
+              <a14:hiddenFill xmlns:a14="http://schemas.microsoft.com/office/drawing/2010/main">
+                <a:solidFill>
+                  <a:srgbClr val="FFFFFF"/>
+                </a:solidFill>
+              </a14:hiddenFill>
+            </a:ext>
+          </a:extLst>
+        </p:spPr>
+      </p:pic>
     </p:spTree>
     <p:extLst>
       <p:ext uri="{BB962C8B-B14F-4D97-AF65-F5344CB8AC3E}">
-        <p14:creationId xmlns:p14="http://schemas.microsoft.com/office/powerpoint/2010/main" val="2828232204"/>
+        <p14:creationId xmlns:p14="http://schemas.microsoft.com/office/powerpoint/2010/main" val="4033998305"/>
       </p:ext>
     </p:extLst>
   </p:cSld>
@@ -4431,6 +4599,775 @@
 </file>
 
 <file path=ppt/slides/slide5.xml><?xml version="1.0" encoding="utf-8"?>
+<p:sld xmlns:a="http://schemas.openxmlformats.org/drawingml/2006/main" xmlns:r="http://schemas.openxmlformats.org/officeDocument/2006/relationships" xmlns:p="http://schemas.openxmlformats.org/presentationml/2006/main">
+  <p:cSld>
+    <p:spTree>
+      <p:nvGrpSpPr>
+        <p:cNvPr id="1" name=""/>
+        <p:cNvGrpSpPr/>
+        <p:nvPr/>
+      </p:nvGrpSpPr>
+      <p:grpSpPr>
+        <a:xfrm>
+          <a:off x="0" y="0"/>
+          <a:ext cx="0" cy="0"/>
+          <a:chOff x="0" y="0"/>
+          <a:chExt cx="0" cy="0"/>
+        </a:xfrm>
+      </p:grpSpPr>
+      <p:sp>
+        <p:nvSpPr>
+          <p:cNvPr id="2" name="Título 1">
+            <a:extLst>
+              <a:ext uri="{FF2B5EF4-FFF2-40B4-BE49-F238E27FC236}">
+                <a16:creationId xmlns:a16="http://schemas.microsoft.com/office/drawing/2014/main" id="{FB5439F4-EFAC-4FF6-B250-86803B7349DC}"/>
+              </a:ext>
+            </a:extLst>
+          </p:cNvPr>
+          <p:cNvSpPr>
+            <a:spLocks noGrp="1"/>
+          </p:cNvSpPr>
+          <p:nvPr>
+            <p:ph type="title"/>
+          </p:nvPr>
+        </p:nvSpPr>
+        <p:spPr>
+          <a:xfrm>
+            <a:off x="4450630" y="214656"/>
+            <a:ext cx="3290740" cy="1325563"/>
+          </a:xfrm>
+        </p:spPr>
+        <p:txBody>
+          <a:bodyPr/>
+          <a:lstStyle/>
+          <a:p>
+            <a:r>
+              <a:rPr lang="es-ES" sz="5400" dirty="0">
+                <a:solidFill>
+                  <a:srgbClr val="66FF66"/>
+                </a:solidFill>
+                <a:latin typeface="Algerian" panose="04020705040A02060702" pitchFamily="82" charset="0"/>
+              </a:rPr>
+              <a:t>Historia</a:t>
+            </a:r>
+          </a:p>
+        </p:txBody>
+      </p:sp>
+      <p:sp>
+        <p:nvSpPr>
+          <p:cNvPr id="3" name="Marcador de contenido 2">
+            <a:extLst>
+              <a:ext uri="{FF2B5EF4-FFF2-40B4-BE49-F238E27FC236}">
+                <a16:creationId xmlns:a16="http://schemas.microsoft.com/office/drawing/2014/main" id="{2991D54A-6908-42FD-986C-1C5668346480}"/>
+              </a:ext>
+            </a:extLst>
+          </p:cNvPr>
+          <p:cNvSpPr>
+            <a:spLocks noGrp="1"/>
+          </p:cNvSpPr>
+          <p:nvPr>
+            <p:ph idx="1"/>
+          </p:nvPr>
+        </p:nvSpPr>
+        <p:spPr>
+          <a:xfrm>
+            <a:off x="1181100" y="1624700"/>
+            <a:ext cx="10515600" cy="4351338"/>
+          </a:xfrm>
+        </p:spPr>
+        <p:txBody>
+          <a:bodyPr>
+            <a:normAutofit/>
+          </a:bodyPr>
+          <a:lstStyle/>
+          <a:p>
+            <a:pPr marL="0" indent="0">
+              <a:buNone/>
+            </a:pPr>
+            <a:r>
+              <a:rPr lang="es-ES" dirty="0">
+                <a:latin typeface="Arial Rounded MT Bold" panose="020F0704030504030204" pitchFamily="34" charset="0"/>
+              </a:rPr>
+              <a:t>La magia se ha perturbado y el caos asola el mundo</a:t>
+            </a:r>
+          </a:p>
+          <a:p>
+            <a:pPr marL="0" indent="0">
+              <a:buNone/>
+            </a:pPr>
+            <a:r>
+              <a:rPr lang="es-ES" dirty="0">
+                <a:latin typeface="Arial Rounded MT Bold" panose="020F0704030504030204" pitchFamily="34" charset="0"/>
+              </a:rPr>
+              <a:t>Las tres esencias primordiales se refugiaron en un bosque ancestral, </a:t>
+            </a:r>
+          </a:p>
+          <a:p>
+            <a:pPr marL="0" indent="0">
+              <a:buNone/>
+            </a:pPr>
+            <a:r>
+              <a:rPr lang="es-ES" dirty="0" err="1">
+                <a:latin typeface="Arial Rounded MT Bold" panose="020F0704030504030204" pitchFamily="34" charset="0"/>
+              </a:rPr>
+              <a:t>Terria</a:t>
+            </a:r>
+            <a:r>
+              <a:rPr lang="es-ES" dirty="0">
+                <a:latin typeface="Arial Rounded MT Bold" panose="020F0704030504030204" pitchFamily="34" charset="0"/>
+              </a:rPr>
+              <a:t>, -&gt;materia.</a:t>
+            </a:r>
+          </a:p>
+          <a:p>
+            <a:pPr marL="0" indent="0">
+              <a:buNone/>
+            </a:pPr>
+            <a:r>
+              <a:rPr lang="es-ES" dirty="0" err="1">
+                <a:latin typeface="Arial Rounded MT Bold" panose="020F0704030504030204" pitchFamily="34" charset="0"/>
+              </a:rPr>
+              <a:t>Lumine</a:t>
+            </a:r>
+            <a:r>
+              <a:rPr lang="es-ES" dirty="0">
+                <a:latin typeface="Arial Rounded MT Bold" panose="020F0704030504030204" pitchFamily="34" charset="0"/>
+              </a:rPr>
+              <a:t>, -&gt;luz y la vida.</a:t>
+            </a:r>
+          </a:p>
+          <a:p>
+            <a:pPr marL="0" indent="0">
+              <a:buNone/>
+            </a:pPr>
+            <a:r>
+              <a:rPr lang="es-ES" dirty="0" err="1">
+                <a:latin typeface="Arial Rounded MT Bold" panose="020F0704030504030204" pitchFamily="34" charset="0"/>
+              </a:rPr>
+              <a:t>Etheria</a:t>
+            </a:r>
+            <a:r>
+              <a:rPr lang="es-ES" dirty="0">
+                <a:latin typeface="Arial Rounded MT Bold" panose="020F0704030504030204" pitchFamily="34" charset="0"/>
+              </a:rPr>
+              <a:t>, -&gt;voluntad y la mente.</a:t>
+            </a:r>
+          </a:p>
+          <a:p>
+            <a:pPr marL="0" indent="0">
+              <a:buNone/>
+            </a:pPr>
+            <a:r>
+              <a:rPr lang="es-ES" dirty="0">
+                <a:latin typeface="Arial Rounded MT Bold" panose="020F0704030504030204" pitchFamily="34" charset="0"/>
+              </a:rPr>
+              <a:t>Para traer de vuelta el equilibrio se ha dado vida a </a:t>
+            </a:r>
+            <a:r>
+              <a:rPr lang="es-ES" dirty="0" err="1">
+                <a:latin typeface="Arial Rounded MT Bold" panose="020F0704030504030204" pitchFamily="34" charset="0"/>
+              </a:rPr>
+              <a:t>Kyna</a:t>
+            </a:r>
+            <a:r>
+              <a:rPr lang="es-ES" dirty="0">
+                <a:latin typeface="Arial Rounded MT Bold" panose="020F0704030504030204" pitchFamily="34" charset="0"/>
+              </a:rPr>
+              <a:t> con la esperanza de que este reúna las 3 esencias primordiales y devuelva la paz al mundo</a:t>
+            </a:r>
+          </a:p>
+          <a:p>
+            <a:endParaRPr lang="es-ES" u="sng" dirty="0"/>
+          </a:p>
+        </p:txBody>
+      </p:sp>
+      <p:pic>
+        <p:nvPicPr>
+          <p:cNvPr id="4098" name="Picture 2" descr="Blog: Bored to death while working from home? — People Matters">
+            <a:extLst>
+              <a:ext uri="{FF2B5EF4-FFF2-40B4-BE49-F238E27FC236}">
+                <a16:creationId xmlns:a16="http://schemas.microsoft.com/office/drawing/2014/main" id="{6FF87E72-6982-43E7-B642-FC6A689F3B36}"/>
+              </a:ext>
+            </a:extLst>
+          </p:cNvPr>
+          <p:cNvPicPr>
+            <a:picLocks noChangeAspect="1" noChangeArrowheads="1"/>
+          </p:cNvPicPr>
+          <p:nvPr/>
+        </p:nvPicPr>
+        <p:blipFill rotWithShape="1">
+          <a:blip r:embed="rId2">
+            <a:extLst>
+              <a:ext uri="{28A0092B-C50C-407E-A947-70E740481C1C}">
+                <a14:useLocalDpi xmlns:a14="http://schemas.microsoft.com/office/drawing/2010/main" val="0"/>
+              </a:ext>
+            </a:extLst>
+          </a:blip>
+          <a:srcRect l="16912" b="14636"/>
+          <a:stretch/>
+        </p:blipFill>
+        <p:spPr bwMode="auto">
+          <a:xfrm>
+            <a:off x="7352416" y="2781300"/>
+            <a:ext cx="2730436" cy="1577923"/>
+          </a:xfrm>
+          <a:prstGeom prst="rect">
+            <a:avLst/>
+          </a:prstGeom>
+          <a:noFill/>
+          <a:extLst>
+            <a:ext uri="{909E8E84-426E-40DD-AFC4-6F175D3DCCD1}">
+              <a14:hiddenFill xmlns:a14="http://schemas.microsoft.com/office/drawing/2010/main">
+                <a:solidFill>
+                  <a:srgbClr val="FFFFFF"/>
+                </a:solidFill>
+              </a14:hiddenFill>
+            </a:ext>
+          </a:extLst>
+        </p:spPr>
+      </p:pic>
+    </p:spTree>
+    <p:extLst>
+      <p:ext uri="{BB962C8B-B14F-4D97-AF65-F5344CB8AC3E}">
+        <p14:creationId xmlns:p14="http://schemas.microsoft.com/office/powerpoint/2010/main" val="1534480125"/>
+      </p:ext>
+    </p:extLst>
+  </p:cSld>
+  <p:clrMapOvr>
+    <a:masterClrMapping/>
+  </p:clrMapOvr>
+</p:sld>
+</file>
+
+<file path=ppt/slides/slide6.xml><?xml version="1.0" encoding="utf-8"?>
+<p:sld xmlns:a="http://schemas.openxmlformats.org/drawingml/2006/main" xmlns:r="http://schemas.openxmlformats.org/officeDocument/2006/relationships" xmlns:p="http://schemas.openxmlformats.org/presentationml/2006/main">
+  <p:cSld>
+    <p:spTree>
+      <p:nvGrpSpPr>
+        <p:cNvPr id="1" name=""/>
+        <p:cNvGrpSpPr/>
+        <p:nvPr/>
+      </p:nvGrpSpPr>
+      <p:grpSpPr>
+        <a:xfrm>
+          <a:off x="0" y="0"/>
+          <a:ext cx="0" cy="0"/>
+          <a:chOff x="0" y="0"/>
+          <a:chExt cx="0" cy="0"/>
+        </a:xfrm>
+      </p:grpSpPr>
+      <p:sp>
+        <p:nvSpPr>
+          <p:cNvPr id="2" name="Título 1">
+            <a:extLst>
+              <a:ext uri="{FF2B5EF4-FFF2-40B4-BE49-F238E27FC236}">
+                <a16:creationId xmlns:a16="http://schemas.microsoft.com/office/drawing/2014/main" id="{53E5E615-C2ED-40D1-9118-39F26F19E626}"/>
+              </a:ext>
+            </a:extLst>
+          </p:cNvPr>
+          <p:cNvSpPr>
+            <a:spLocks noGrp="1"/>
+          </p:cNvSpPr>
+          <p:nvPr>
+            <p:ph type="title"/>
+          </p:nvPr>
+        </p:nvSpPr>
+        <p:spPr>
+          <a:xfrm>
+            <a:off x="3772527" y="403585"/>
+            <a:ext cx="4124325" cy="1325563"/>
+          </a:xfrm>
+        </p:spPr>
+        <p:txBody>
+          <a:bodyPr/>
+          <a:lstStyle/>
+          <a:p>
+            <a:r>
+              <a:rPr lang="es-ES" sz="5400" dirty="0">
+                <a:solidFill>
+                  <a:srgbClr val="66FF66"/>
+                </a:solidFill>
+                <a:latin typeface="Algerian" panose="04020705040A02060702" pitchFamily="82" charset="0"/>
+              </a:rPr>
+              <a:t>mecánicas</a:t>
+            </a:r>
+          </a:p>
+        </p:txBody>
+      </p:sp>
+      <p:pic>
+        <p:nvPicPr>
+          <p:cNvPr id="2050" name="Picture 2" descr="MEME QUEENS on Twitter: &amp;quot;@estoydormio por que nos copias memes a las queens  del edit&amp;quot; / Twitter">
+            <a:extLst>
+              <a:ext uri="{FF2B5EF4-FFF2-40B4-BE49-F238E27FC236}">
+                <a16:creationId xmlns:a16="http://schemas.microsoft.com/office/drawing/2014/main" id="{14076B5A-E127-4A3A-B4FB-3820C09143CA}"/>
+              </a:ext>
+            </a:extLst>
+          </p:cNvPr>
+          <p:cNvPicPr>
+            <a:picLocks noChangeAspect="1" noChangeArrowheads="1"/>
+          </p:cNvPicPr>
+          <p:nvPr/>
+        </p:nvPicPr>
+        <p:blipFill>
+          <a:blip r:embed="rId2">
+            <a:extLst>
+              <a:ext uri="{28A0092B-C50C-407E-A947-70E740481C1C}">
+                <a14:useLocalDpi xmlns:a14="http://schemas.microsoft.com/office/drawing/2010/main" val="0"/>
+              </a:ext>
+            </a:extLst>
+          </a:blip>
+          <a:srcRect/>
+          <a:stretch>
+            <a:fillRect/>
+          </a:stretch>
+        </p:blipFill>
+        <p:spPr bwMode="auto">
+          <a:xfrm>
+            <a:off x="7222572" y="2715361"/>
+            <a:ext cx="3927947" cy="2885732"/>
+          </a:xfrm>
+          <a:prstGeom prst="rect">
+            <a:avLst/>
+          </a:prstGeom>
+          <a:noFill/>
+          <a:extLst>
+            <a:ext uri="{909E8E84-426E-40DD-AFC4-6F175D3DCCD1}">
+              <a14:hiddenFill xmlns:a14="http://schemas.microsoft.com/office/drawing/2010/main">
+                <a:solidFill>
+                  <a:srgbClr val="FFFFFF"/>
+                </a:solidFill>
+              </a14:hiddenFill>
+            </a:ext>
+          </a:extLst>
+        </p:spPr>
+      </p:pic>
+      <p:sp>
+        <p:nvSpPr>
+          <p:cNvPr id="4" name="CuadroTexto 3">
+            <a:extLst>
+              <a:ext uri="{FF2B5EF4-FFF2-40B4-BE49-F238E27FC236}">
+                <a16:creationId xmlns:a16="http://schemas.microsoft.com/office/drawing/2014/main" id="{B300C163-8706-45C3-823C-3F90955BEFC8}"/>
+              </a:ext>
+            </a:extLst>
+          </p:cNvPr>
+          <p:cNvSpPr txBox="1"/>
+          <p:nvPr/>
+        </p:nvSpPr>
+        <p:spPr>
+          <a:xfrm>
+            <a:off x="8204559" y="1746591"/>
+            <a:ext cx="1963974" cy="646331"/>
+          </a:xfrm>
+          <a:prstGeom prst="rect">
+            <a:avLst/>
+          </a:prstGeom>
+          <a:noFill/>
+        </p:spPr>
+        <p:txBody>
+          <a:bodyPr wrap="square" rtlCol="0">
+            <a:spAutoFit/>
+          </a:bodyPr>
+          <a:lstStyle/>
+          <a:p>
+            <a:r>
+              <a:rPr lang="es-ES" sz="3600" b="1" dirty="0">
+                <a:solidFill>
+                  <a:schemeClr val="tx1">
+                    <a:lumMod val="95000"/>
+                  </a:schemeClr>
+                </a:solidFill>
+                <a:latin typeface="Arial Rounded MT Bold" panose="020F0704030504030204" pitchFamily="34" charset="0"/>
+              </a:rPr>
+              <a:t>Esquivo</a:t>
+            </a:r>
+          </a:p>
+        </p:txBody>
+      </p:sp>
+      <p:pic>
+        <p:nvPicPr>
+          <p:cNvPr id="2052" name="Picture 4" descr="Hit and expect to be hit back. - 9GAG">
+            <a:extLst>
+              <a:ext uri="{FF2B5EF4-FFF2-40B4-BE49-F238E27FC236}">
+                <a16:creationId xmlns:a16="http://schemas.microsoft.com/office/drawing/2014/main" id="{065CA8F5-065B-49E3-9D6A-E9B68A041C72}"/>
+              </a:ext>
+            </a:extLst>
+          </p:cNvPr>
+          <p:cNvPicPr>
+            <a:picLocks noChangeAspect="1" noChangeArrowheads="1"/>
+          </p:cNvPicPr>
+          <p:nvPr/>
+        </p:nvPicPr>
+        <p:blipFill rotWithShape="1">
+          <a:blip r:embed="rId3">
+            <a:extLst>
+              <a:ext uri="{28A0092B-C50C-407E-A947-70E740481C1C}">
+                <a14:useLocalDpi xmlns:a14="http://schemas.microsoft.com/office/drawing/2010/main" val="0"/>
+              </a:ext>
+            </a:extLst>
+          </a:blip>
+          <a:srcRect t="27834" r="-6"/>
+          <a:stretch/>
+        </p:blipFill>
+        <p:spPr bwMode="auto">
+          <a:xfrm>
+            <a:off x="600866" y="2715361"/>
+            <a:ext cx="4973116" cy="2563347"/>
+          </a:xfrm>
+          <a:prstGeom prst="rect">
+            <a:avLst/>
+          </a:prstGeom>
+          <a:noFill/>
+          <a:extLst>
+            <a:ext uri="{909E8E84-426E-40DD-AFC4-6F175D3DCCD1}">
+              <a14:hiddenFill xmlns:a14="http://schemas.microsoft.com/office/drawing/2010/main">
+                <a:solidFill>
+                  <a:srgbClr val="FFFFFF"/>
+                </a:solidFill>
+              </a14:hiddenFill>
+            </a:ext>
+          </a:extLst>
+        </p:spPr>
+      </p:pic>
+      <p:sp>
+        <p:nvSpPr>
+          <p:cNvPr id="5" name="CuadroTexto 4">
+            <a:extLst>
+              <a:ext uri="{FF2B5EF4-FFF2-40B4-BE49-F238E27FC236}">
+                <a16:creationId xmlns:a16="http://schemas.microsoft.com/office/drawing/2014/main" id="{6C4C708F-FBAE-4868-8234-C866A2879809}"/>
+              </a:ext>
+            </a:extLst>
+          </p:cNvPr>
+          <p:cNvSpPr txBox="1"/>
+          <p:nvPr/>
+        </p:nvSpPr>
+        <p:spPr>
+          <a:xfrm>
+            <a:off x="2187406" y="1728323"/>
+            <a:ext cx="1800036" cy="646331"/>
+          </a:xfrm>
+          <a:prstGeom prst="rect">
+            <a:avLst/>
+          </a:prstGeom>
+          <a:noFill/>
+        </p:spPr>
+        <p:txBody>
+          <a:bodyPr wrap="square" rtlCol="0">
+            <a:spAutoFit/>
+          </a:bodyPr>
+          <a:lstStyle/>
+          <a:p>
+            <a:r>
+              <a:rPr lang="es-ES" sz="3600" b="1" dirty="0">
+                <a:solidFill>
+                  <a:schemeClr val="tx1">
+                    <a:lumMod val="95000"/>
+                  </a:schemeClr>
+                </a:solidFill>
+                <a:latin typeface="Arial Rounded MT Bold" panose="020F0704030504030204" pitchFamily="34" charset="0"/>
+              </a:rPr>
+              <a:t>Ataque</a:t>
+            </a:r>
+          </a:p>
+        </p:txBody>
+      </p:sp>
+    </p:spTree>
+    <p:extLst>
+      <p:ext uri="{BB962C8B-B14F-4D97-AF65-F5344CB8AC3E}">
+        <p14:creationId xmlns:p14="http://schemas.microsoft.com/office/powerpoint/2010/main" val="2794590581"/>
+      </p:ext>
+    </p:extLst>
+  </p:cSld>
+  <p:clrMapOvr>
+    <a:masterClrMapping/>
+  </p:clrMapOvr>
+</p:sld>
+</file>
+
+<file path=ppt/slides/slide7.xml><?xml version="1.0" encoding="utf-8"?>
+<p:sld xmlns:a="http://schemas.openxmlformats.org/drawingml/2006/main" xmlns:r="http://schemas.openxmlformats.org/officeDocument/2006/relationships" xmlns:p="http://schemas.openxmlformats.org/presentationml/2006/main">
+  <p:cSld>
+    <p:spTree>
+      <p:nvGrpSpPr>
+        <p:cNvPr id="1" name=""/>
+        <p:cNvGrpSpPr/>
+        <p:nvPr/>
+      </p:nvGrpSpPr>
+      <p:grpSpPr>
+        <a:xfrm>
+          <a:off x="0" y="0"/>
+          <a:ext cx="0" cy="0"/>
+          <a:chOff x="0" y="0"/>
+          <a:chExt cx="0" cy="0"/>
+        </a:xfrm>
+      </p:grpSpPr>
+      <p:sp>
+        <p:nvSpPr>
+          <p:cNvPr id="2" name="Título 1">
+            <a:extLst>
+              <a:ext uri="{FF2B5EF4-FFF2-40B4-BE49-F238E27FC236}">
+                <a16:creationId xmlns:a16="http://schemas.microsoft.com/office/drawing/2014/main" id="{0E41D4FB-4E03-4844-B019-A624F496F6CE}"/>
+              </a:ext>
+            </a:extLst>
+          </p:cNvPr>
+          <p:cNvSpPr>
+            <a:spLocks noGrp="1"/>
+          </p:cNvSpPr>
+          <p:nvPr>
+            <p:ph type="title"/>
+          </p:nvPr>
+        </p:nvSpPr>
+        <p:spPr>
+          <a:xfrm>
+            <a:off x="4624387" y="288925"/>
+            <a:ext cx="2943225" cy="1325563"/>
+          </a:xfrm>
+        </p:spPr>
+        <p:txBody>
+          <a:bodyPr/>
+          <a:lstStyle/>
+          <a:p>
+            <a:r>
+              <a:rPr lang="es-ES" sz="5400" dirty="0">
+                <a:solidFill>
+                  <a:srgbClr val="66FF66"/>
+                </a:solidFill>
+                <a:latin typeface="Algerian" panose="04020705040A02060702" pitchFamily="82" charset="0"/>
+              </a:rPr>
+              <a:t>BOSSES</a:t>
+            </a:r>
+          </a:p>
+        </p:txBody>
+      </p:sp>
+      <p:pic>
+        <p:nvPicPr>
+          <p:cNvPr id="5" name="Marcador de contenido 4">
+            <a:extLst>
+              <a:ext uri="{FF2B5EF4-FFF2-40B4-BE49-F238E27FC236}">
+                <a16:creationId xmlns:a16="http://schemas.microsoft.com/office/drawing/2014/main" id="{B5AFEEA3-BE91-48D8-B8C5-DB7A75331BCD}"/>
+              </a:ext>
+            </a:extLst>
+          </p:cNvPr>
+          <p:cNvPicPr>
+            <a:picLocks noGrp="1" noChangeAspect="1"/>
+          </p:cNvPicPr>
+          <p:nvPr>
+            <p:ph idx="1"/>
+          </p:nvPr>
+        </p:nvPicPr>
+        <p:blipFill>
+          <a:blip r:embed="rId2"/>
+          <a:stretch>
+            <a:fillRect/>
+          </a:stretch>
+        </p:blipFill>
+        <p:spPr>
+          <a:xfrm>
+            <a:off x="338637" y="1522936"/>
+            <a:ext cx="3848354" cy="2275985"/>
+          </a:xfrm>
+        </p:spPr>
+      </p:pic>
+      <p:pic>
+        <p:nvPicPr>
+          <p:cNvPr id="8" name="Imagen 7">
+            <a:extLst>
+              <a:ext uri="{FF2B5EF4-FFF2-40B4-BE49-F238E27FC236}">
+                <a16:creationId xmlns:a16="http://schemas.microsoft.com/office/drawing/2014/main" id="{EED28F61-A6C2-48A9-A565-DD293A8B08D0}"/>
+              </a:ext>
+            </a:extLst>
+          </p:cNvPr>
+          <p:cNvPicPr>
+            <a:picLocks noChangeAspect="1"/>
+          </p:cNvPicPr>
+          <p:nvPr/>
+        </p:nvPicPr>
+        <p:blipFill>
+          <a:blip r:embed="rId3"/>
+          <a:stretch>
+            <a:fillRect/>
+          </a:stretch>
+        </p:blipFill>
+        <p:spPr>
+          <a:xfrm>
+            <a:off x="4500561" y="3267356"/>
+            <a:ext cx="3528071" cy="3015828"/>
+          </a:xfrm>
+          <a:prstGeom prst="rect">
+            <a:avLst/>
+          </a:prstGeom>
+        </p:spPr>
+      </p:pic>
+      <p:pic>
+        <p:nvPicPr>
+          <p:cNvPr id="10" name="Imagen 9">
+            <a:extLst>
+              <a:ext uri="{FF2B5EF4-FFF2-40B4-BE49-F238E27FC236}">
+                <a16:creationId xmlns:a16="http://schemas.microsoft.com/office/drawing/2014/main" id="{68AC9F35-CDC3-48A2-9BF5-8999E8E4914E}"/>
+              </a:ext>
+            </a:extLst>
+          </p:cNvPr>
+          <p:cNvPicPr>
+            <a:picLocks noChangeAspect="1"/>
+          </p:cNvPicPr>
+          <p:nvPr/>
+        </p:nvPicPr>
+        <p:blipFill>
+          <a:blip r:embed="rId4"/>
+          <a:stretch>
+            <a:fillRect/>
+          </a:stretch>
+        </p:blipFill>
+        <p:spPr>
+          <a:xfrm>
+            <a:off x="8442404" y="1153015"/>
+            <a:ext cx="3187459" cy="3015828"/>
+          </a:xfrm>
+          <a:prstGeom prst="rect">
+            <a:avLst/>
+          </a:prstGeom>
+        </p:spPr>
+      </p:pic>
+      <p:sp>
+        <p:nvSpPr>
+          <p:cNvPr id="11" name="CuadroTexto 10">
+            <a:extLst>
+              <a:ext uri="{FF2B5EF4-FFF2-40B4-BE49-F238E27FC236}">
+                <a16:creationId xmlns:a16="http://schemas.microsoft.com/office/drawing/2014/main" id="{89A154F3-058F-40AD-AB96-E438E5F9A0FE}"/>
+              </a:ext>
+            </a:extLst>
+          </p:cNvPr>
+          <p:cNvSpPr txBox="1"/>
+          <p:nvPr/>
+        </p:nvSpPr>
+        <p:spPr>
+          <a:xfrm>
+            <a:off x="586414" y="4128939"/>
+            <a:ext cx="3352800" cy="646331"/>
+          </a:xfrm>
+          <a:prstGeom prst="rect">
+            <a:avLst/>
+          </a:prstGeom>
+          <a:noFill/>
+        </p:spPr>
+        <p:txBody>
+          <a:bodyPr wrap="square" rtlCol="0">
+            <a:spAutoFit/>
+          </a:bodyPr>
+          <a:lstStyle/>
+          <a:p>
+            <a:r>
+              <a:rPr lang="es-ES" sz="3600" b="1" dirty="0">
+                <a:solidFill>
+                  <a:schemeClr val="tx1">
+                    <a:lumMod val="95000"/>
+                  </a:schemeClr>
+                </a:solidFill>
+                <a:latin typeface="Arial Rounded MT Bold" panose="020F0704030504030204" pitchFamily="34" charset="0"/>
+              </a:rPr>
+              <a:t>El sapo gordo</a:t>
+            </a:r>
+          </a:p>
+        </p:txBody>
+      </p:sp>
+      <p:sp>
+        <p:nvSpPr>
+          <p:cNvPr id="12" name="CuadroTexto 11">
+            <a:extLst>
+              <a:ext uri="{FF2B5EF4-FFF2-40B4-BE49-F238E27FC236}">
+                <a16:creationId xmlns:a16="http://schemas.microsoft.com/office/drawing/2014/main" id="{1A097743-F667-405B-A8A0-9C62B467251F}"/>
+              </a:ext>
+            </a:extLst>
+          </p:cNvPr>
+          <p:cNvSpPr txBox="1"/>
+          <p:nvPr/>
+        </p:nvSpPr>
+        <p:spPr>
+          <a:xfrm>
+            <a:off x="4419126" y="2528739"/>
+            <a:ext cx="3690939" cy="646331"/>
+          </a:xfrm>
+          <a:prstGeom prst="rect">
+            <a:avLst/>
+          </a:prstGeom>
+          <a:noFill/>
+        </p:spPr>
+        <p:txBody>
+          <a:bodyPr wrap="square" rtlCol="0">
+            <a:spAutoFit/>
+          </a:bodyPr>
+          <a:lstStyle/>
+          <a:p>
+            <a:r>
+              <a:rPr lang="es-ES" sz="3600" b="1" dirty="0">
+                <a:solidFill>
+                  <a:schemeClr val="tx1">
+                    <a:lumMod val="95000"/>
+                  </a:schemeClr>
+                </a:solidFill>
+                <a:latin typeface="Arial Rounded MT Bold" panose="020F0704030504030204" pitchFamily="34" charset="0"/>
+              </a:rPr>
+              <a:t>Árbol con patas</a:t>
+            </a:r>
+          </a:p>
+        </p:txBody>
+      </p:sp>
+      <p:sp>
+        <p:nvSpPr>
+          <p:cNvPr id="13" name="CuadroTexto 12">
+            <a:extLst>
+              <a:ext uri="{FF2B5EF4-FFF2-40B4-BE49-F238E27FC236}">
+                <a16:creationId xmlns:a16="http://schemas.microsoft.com/office/drawing/2014/main" id="{2CD1FA9E-18C7-4595-BC49-07DDDA680A95}"/>
+              </a:ext>
+            </a:extLst>
+          </p:cNvPr>
+          <p:cNvSpPr txBox="1"/>
+          <p:nvPr/>
+        </p:nvSpPr>
+        <p:spPr>
+          <a:xfrm>
+            <a:off x="8359733" y="4331988"/>
+            <a:ext cx="3352800" cy="1200329"/>
+          </a:xfrm>
+          <a:prstGeom prst="rect">
+            <a:avLst/>
+          </a:prstGeom>
+          <a:noFill/>
+        </p:spPr>
+        <p:txBody>
+          <a:bodyPr wrap="square" rtlCol="0">
+            <a:spAutoFit/>
+          </a:bodyPr>
+          <a:lstStyle/>
+          <a:p>
+            <a:pPr algn="just"/>
+            <a:r>
+              <a:rPr lang="es-ES" sz="2400" b="1" dirty="0">
+                <a:solidFill>
+                  <a:schemeClr val="tx1">
+                    <a:lumMod val="95000"/>
+                  </a:schemeClr>
+                </a:solidFill>
+                <a:latin typeface="Arial Rounded MT Bold" panose="020F0704030504030204" pitchFamily="34" charset="0"/>
+              </a:rPr>
+              <a:t>El bicho este raro con manos y ojos y manos y ojos</a:t>
+            </a:r>
+          </a:p>
+        </p:txBody>
+      </p:sp>
+    </p:spTree>
+    <p:extLst>
+      <p:ext uri="{BB962C8B-B14F-4D97-AF65-F5344CB8AC3E}">
+        <p14:creationId xmlns:p14="http://schemas.microsoft.com/office/powerpoint/2010/main" val="2205556734"/>
+      </p:ext>
+    </p:extLst>
+  </p:cSld>
+  <p:clrMapOvr>
+    <a:masterClrMapping/>
+  </p:clrMapOvr>
+</p:sld>
+</file>
+
+<file path=ppt/slides/slide8.xml><?xml version="1.0" encoding="utf-8"?>
 <p:sld xmlns:a="http://schemas.openxmlformats.org/drawingml/2006/main" xmlns:r="http://schemas.openxmlformats.org/officeDocument/2006/relationships" xmlns:p="http://schemas.openxmlformats.org/presentationml/2006/main">
   <p:cSld>
     <p:bg>
@@ -4479,17 +5416,16 @@
         </p:spPr>
         <p:txBody>
           <a:bodyPr vert="horz" lIns="91440" tIns="45720" rIns="91440" bIns="45720" rtlCol="0" anchor="t">
-            <a:normAutofit/>
+            <a:normAutofit fontScale="90000"/>
           </a:bodyPr>
           <a:lstStyle/>
           <a:p>
             <a:r>
-              <a:rPr lang="en-US" sz="8000" kern="1200" dirty="0">
-                <a:solidFill>
-                  <a:schemeClr val="tx1"/>
+              <a:rPr lang="en-US" sz="8800" dirty="0">
+                <a:solidFill>
+                  <a:srgbClr val="66FF66"/>
                 </a:solidFill>
                 <a:latin typeface="Algerian" panose="04020705040A02060702" pitchFamily="82" charset="0"/>
-                <a:cs typeface="Aldhabi" panose="020B0604020202020204" pitchFamily="2" charset="-78"/>
               </a:rPr>
               <a:t>ARTE</a:t>
             </a:r>
@@ -4870,7 +5806,7 @@
 </p:sld>
 </file>
 
-<file path=ppt/slides/slide6.xml><?xml version="1.0" encoding="utf-8"?>
+<file path=ppt/slides/slide9.xml><?xml version="1.0" encoding="utf-8"?>
 <p:sld xmlns:a="http://schemas.openxmlformats.org/drawingml/2006/main" xmlns:r="http://schemas.openxmlformats.org/officeDocument/2006/relationships" xmlns:p="http://schemas.openxmlformats.org/presentationml/2006/main">
   <p:cSld>
     <p:spTree>
@@ -4892,7 +5828,7 @@
           <p:cNvPr id="2" name="Título 1">
             <a:extLst>
               <a:ext uri="{FF2B5EF4-FFF2-40B4-BE49-F238E27FC236}">
-                <a16:creationId xmlns:a16="http://schemas.microsoft.com/office/drawing/2014/main" id="{FB5439F4-EFAC-4FF6-B250-86803B7349DC}"/>
+                <a16:creationId xmlns:a16="http://schemas.microsoft.com/office/drawing/2014/main" id="{01E33754-5E5A-4E1B-B36A-87F14C3C633E}"/>
               </a:ext>
             </a:extLst>
           </p:cNvPr>
@@ -4903,287 +5839,750 @@
             <p:ph type="title"/>
           </p:nvPr>
         </p:nvSpPr>
-        <p:spPr/>
-        <p:txBody>
-          <a:bodyPr/>
-          <a:lstStyle/>
-          <a:p>
-            <a:r>
-              <a:rPr lang="es-ES" dirty="0"/>
-              <a:t>Historia</a:t>
-            </a:r>
-          </a:p>
-        </p:txBody>
-      </p:sp>
-      <p:sp>
-        <p:nvSpPr>
-          <p:cNvPr id="3" name="Marcador de contenido 2">
+        <p:spPr>
+          <a:xfrm>
+            <a:off x="3866961" y="2782556"/>
+            <a:ext cx="4458077" cy="1325563"/>
+          </a:xfrm>
+        </p:spPr>
+        <p:txBody>
+          <a:bodyPr>
+            <a:normAutofit/>
+          </a:bodyPr>
+          <a:lstStyle/>
+          <a:p>
+            <a:r>
+              <a:rPr lang="es-ES" sz="5400" dirty="0">
+                <a:solidFill>
+                  <a:srgbClr val="66FF66"/>
+                </a:solidFill>
+                <a:latin typeface="Algerian" panose="04020705040A02060702" pitchFamily="82" charset="0"/>
+              </a:rPr>
+              <a:t>Inspiración</a:t>
+            </a:r>
+          </a:p>
+        </p:txBody>
+      </p:sp>
+      <p:sp>
+        <p:nvSpPr>
+          <p:cNvPr id="5" name="CuadroTexto 4">
             <a:extLst>
               <a:ext uri="{FF2B5EF4-FFF2-40B4-BE49-F238E27FC236}">
-                <a16:creationId xmlns:a16="http://schemas.microsoft.com/office/drawing/2014/main" id="{2991D54A-6908-42FD-986C-1C5668346480}"/>
+                <a16:creationId xmlns:a16="http://schemas.microsoft.com/office/drawing/2014/main" id="{0A106DBD-BB6E-4A55-B2B0-21FCBBCD5379}"/>
               </a:ext>
             </a:extLst>
           </p:cNvPr>
-          <p:cNvSpPr>
-            <a:spLocks noGrp="1"/>
-          </p:cNvSpPr>
-          <p:nvPr>
-            <p:ph idx="1"/>
-          </p:nvPr>
-        </p:nvSpPr>
-        <p:spPr/>
-        <p:txBody>
-          <a:bodyPr/>
-          <a:lstStyle/>
-          <a:p>
-            <a:endParaRPr lang="es-ES" u="sng" dirty="0"/>
+          <p:cNvSpPr txBox="1"/>
+          <p:nvPr/>
+        </p:nvSpPr>
+        <p:spPr>
+          <a:xfrm>
+            <a:off x="5671994" y="1671457"/>
+            <a:ext cx="2679826" cy="923330"/>
+          </a:xfrm>
+          <a:prstGeom prst="rect">
+            <a:avLst/>
+          </a:prstGeom>
+          <a:noFill/>
+        </p:spPr>
+        <p:txBody>
+          <a:bodyPr wrap="square" rtlCol="0">
+            <a:spAutoFit/>
+          </a:bodyPr>
+          <a:lstStyle/>
+          <a:p>
+            <a:r>
+              <a:rPr lang="es-ES" sz="3600" b="1" dirty="0" err="1">
+                <a:solidFill>
+                  <a:schemeClr val="tx1">
+                    <a:lumMod val="95000"/>
+                  </a:schemeClr>
+                </a:solidFill>
+                <a:latin typeface="Arial Rounded MT Bold" panose="020F0704030504030204" pitchFamily="34" charset="0"/>
+              </a:rPr>
+              <a:t>Dark</a:t>
+            </a:r>
+            <a:r>
+              <a:rPr lang="es-ES" b="1" i="0" u="none" strike="noStrike" dirty="0">
+                <a:solidFill>
+                  <a:schemeClr val="tx1">
+                    <a:lumMod val="95000"/>
+                  </a:schemeClr>
+                </a:solidFill>
+                <a:effectLst/>
+                <a:latin typeface="Arial" panose="020B0604020202020204" pitchFamily="34" charset="0"/>
+              </a:rPr>
+              <a:t> </a:t>
+            </a:r>
+            <a:r>
+              <a:rPr lang="es-ES" sz="3600" b="1" dirty="0" err="1">
+                <a:solidFill>
+                  <a:schemeClr val="tx1">
+                    <a:lumMod val="95000"/>
+                  </a:schemeClr>
+                </a:solidFill>
+                <a:latin typeface="Arial Rounded MT Bold" panose="020F0704030504030204" pitchFamily="34" charset="0"/>
+              </a:rPr>
+              <a:t>Souls</a:t>
+            </a:r>
+            <a:endParaRPr lang="es-ES" sz="3600" b="1" dirty="0">
+              <a:solidFill>
+                <a:schemeClr val="tx1">
+                  <a:lumMod val="95000"/>
+                </a:schemeClr>
+              </a:solidFill>
+              <a:latin typeface="Arial Rounded MT Bold" panose="020F0704030504030204" pitchFamily="34" charset="0"/>
+            </a:endParaRPr>
+          </a:p>
+          <a:p>
+            <a:endParaRPr lang="es-ES" dirty="0"/>
+          </a:p>
+        </p:txBody>
+      </p:sp>
+      <p:sp>
+        <p:nvSpPr>
+          <p:cNvPr id="6" name="CuadroTexto 5">
+            <a:extLst>
+              <a:ext uri="{FF2B5EF4-FFF2-40B4-BE49-F238E27FC236}">
+                <a16:creationId xmlns:a16="http://schemas.microsoft.com/office/drawing/2014/main" id="{DE354E32-5CC3-450D-A2BE-4AAA1D4012DF}"/>
+              </a:ext>
+            </a:extLst>
+          </p:cNvPr>
+          <p:cNvSpPr txBox="1"/>
+          <p:nvPr/>
+        </p:nvSpPr>
+        <p:spPr>
+          <a:xfrm>
+            <a:off x="8627951" y="759411"/>
+            <a:ext cx="2779416" cy="923330"/>
+          </a:xfrm>
+          <a:prstGeom prst="rect">
+            <a:avLst/>
+          </a:prstGeom>
+          <a:noFill/>
+        </p:spPr>
+        <p:txBody>
+          <a:bodyPr wrap="square" rtlCol="0">
+            <a:spAutoFit/>
+          </a:bodyPr>
+          <a:lstStyle/>
+          <a:p>
+            <a:r>
+              <a:rPr lang="es-ES" sz="3600" b="1" dirty="0">
+                <a:solidFill>
+                  <a:schemeClr val="tx1">
+                    <a:lumMod val="95000"/>
+                  </a:schemeClr>
+                </a:solidFill>
+                <a:latin typeface="Arial Rounded MT Bold" panose="020F0704030504030204" pitchFamily="34" charset="0"/>
+              </a:rPr>
+              <a:t>Ender</a:t>
+            </a:r>
+            <a:r>
+              <a:rPr lang="es-ES" b="1" i="0" u="none" strike="noStrike" dirty="0">
+                <a:solidFill>
+                  <a:schemeClr val="tx1">
+                    <a:lumMod val="95000"/>
+                  </a:schemeClr>
+                </a:solidFill>
+                <a:effectLst/>
+                <a:latin typeface="Arial" panose="020B0604020202020204" pitchFamily="34" charset="0"/>
+              </a:rPr>
+              <a:t> </a:t>
+            </a:r>
+            <a:r>
+              <a:rPr lang="es-ES" sz="3600" b="1" dirty="0" err="1">
+                <a:solidFill>
+                  <a:schemeClr val="tx1">
+                    <a:lumMod val="95000"/>
+                  </a:schemeClr>
+                </a:solidFill>
+                <a:latin typeface="Arial Rounded MT Bold" panose="020F0704030504030204" pitchFamily="34" charset="0"/>
+              </a:rPr>
+              <a:t>lilies</a:t>
+            </a:r>
+            <a:endParaRPr lang="es-ES" sz="3600" b="1" dirty="0">
+              <a:solidFill>
+                <a:schemeClr val="tx1">
+                  <a:lumMod val="95000"/>
+                </a:schemeClr>
+              </a:solidFill>
+              <a:latin typeface="Arial Rounded MT Bold" panose="020F0704030504030204" pitchFamily="34" charset="0"/>
+            </a:endParaRPr>
+          </a:p>
+          <a:p>
+            <a:endParaRPr lang="es-ES" dirty="0"/>
+          </a:p>
+        </p:txBody>
+      </p:sp>
+      <p:sp>
+        <p:nvSpPr>
+          <p:cNvPr id="7" name="CuadroTexto 6">
+            <a:extLst>
+              <a:ext uri="{FF2B5EF4-FFF2-40B4-BE49-F238E27FC236}">
+                <a16:creationId xmlns:a16="http://schemas.microsoft.com/office/drawing/2014/main" id="{13A02A3E-D1B6-4295-9F94-D5DF4DD28D68}"/>
+              </a:ext>
+            </a:extLst>
+          </p:cNvPr>
+          <p:cNvSpPr txBox="1"/>
+          <p:nvPr/>
+        </p:nvSpPr>
+        <p:spPr>
+          <a:xfrm>
+            <a:off x="6604501" y="4207609"/>
+            <a:ext cx="3494639" cy="923330"/>
+          </a:xfrm>
+          <a:prstGeom prst="rect">
+            <a:avLst/>
+          </a:prstGeom>
+          <a:noFill/>
+        </p:spPr>
+        <p:txBody>
+          <a:bodyPr wrap="square" rtlCol="0">
+            <a:spAutoFit/>
+          </a:bodyPr>
+          <a:lstStyle/>
+          <a:p>
+            <a:r>
+              <a:rPr lang="es-ES" sz="3600" b="1" dirty="0" err="1">
+                <a:solidFill>
+                  <a:schemeClr val="tx1">
+                    <a:lumMod val="95000"/>
+                  </a:schemeClr>
+                </a:solidFill>
+                <a:latin typeface="Arial Rounded MT Bold" panose="020F0704030504030204" pitchFamily="34" charset="0"/>
+              </a:rPr>
+              <a:t>Hollow</a:t>
+            </a:r>
+            <a:r>
+              <a:rPr lang="es-ES" b="1" i="0" u="none" strike="noStrike" dirty="0">
+                <a:solidFill>
+                  <a:schemeClr val="tx1">
+                    <a:lumMod val="95000"/>
+                  </a:schemeClr>
+                </a:solidFill>
+                <a:effectLst/>
+                <a:latin typeface="Arial" panose="020B0604020202020204" pitchFamily="34" charset="0"/>
+              </a:rPr>
+              <a:t> </a:t>
+            </a:r>
+            <a:r>
+              <a:rPr lang="es-ES" sz="3600" b="1" dirty="0" err="1">
+                <a:solidFill>
+                  <a:schemeClr val="tx1">
+                    <a:lumMod val="95000"/>
+                  </a:schemeClr>
+                </a:solidFill>
+                <a:latin typeface="Arial Rounded MT Bold" panose="020F0704030504030204" pitchFamily="34" charset="0"/>
+              </a:rPr>
+              <a:t>Knight</a:t>
+            </a:r>
+            <a:endParaRPr lang="es-ES" sz="3600" b="1" dirty="0">
+              <a:solidFill>
+                <a:schemeClr val="tx1">
+                  <a:lumMod val="95000"/>
+                </a:schemeClr>
+              </a:solidFill>
+              <a:latin typeface="Arial Rounded MT Bold" panose="020F0704030504030204" pitchFamily="34" charset="0"/>
+            </a:endParaRPr>
+          </a:p>
+          <a:p>
+            <a:endParaRPr lang="es-ES" dirty="0"/>
+          </a:p>
+        </p:txBody>
+      </p:sp>
+      <p:sp>
+        <p:nvSpPr>
+          <p:cNvPr id="8" name="CuadroTexto 7">
+            <a:extLst>
+              <a:ext uri="{FF2B5EF4-FFF2-40B4-BE49-F238E27FC236}">
+                <a16:creationId xmlns:a16="http://schemas.microsoft.com/office/drawing/2014/main" id="{A57AD493-BE1E-4039-9A30-23EC6F7E8088}"/>
+              </a:ext>
+            </a:extLst>
+          </p:cNvPr>
+          <p:cNvSpPr txBox="1"/>
+          <p:nvPr/>
+        </p:nvSpPr>
+        <p:spPr>
+          <a:xfrm>
+            <a:off x="1043410" y="5509040"/>
+            <a:ext cx="1806166" cy="923330"/>
+          </a:xfrm>
+          <a:prstGeom prst="rect">
+            <a:avLst/>
+          </a:prstGeom>
+          <a:noFill/>
+        </p:spPr>
+        <p:txBody>
+          <a:bodyPr wrap="square" rtlCol="0">
+            <a:spAutoFit/>
+          </a:bodyPr>
+          <a:lstStyle/>
+          <a:p>
+            <a:r>
+              <a:rPr lang="es-ES" sz="3600" b="1" i="0" u="none" strike="noStrike" dirty="0" err="1">
+                <a:solidFill>
+                  <a:schemeClr val="tx1">
+                    <a:lumMod val="95000"/>
+                  </a:schemeClr>
+                </a:solidFill>
+                <a:effectLst/>
+                <a:latin typeface="Arial Rounded MT Bold" panose="020F0704030504030204" pitchFamily="34" charset="0"/>
+              </a:rPr>
+              <a:t>Morbid</a:t>
+            </a:r>
+            <a:endParaRPr lang="es-ES" sz="3600" b="1" i="0" u="none" strike="noStrike" dirty="0">
+              <a:solidFill>
+                <a:schemeClr val="tx1">
+                  <a:lumMod val="95000"/>
+                </a:schemeClr>
+              </a:solidFill>
+              <a:effectLst/>
+              <a:latin typeface="Arial Rounded MT Bold" panose="020F0704030504030204" pitchFamily="34" charset="0"/>
+            </a:endParaRPr>
+          </a:p>
+          <a:p>
+            <a:endParaRPr lang="es-ES" dirty="0"/>
+          </a:p>
+        </p:txBody>
+      </p:sp>
+      <p:sp>
+        <p:nvSpPr>
+          <p:cNvPr id="9" name="CuadroTexto 8">
+            <a:extLst>
+              <a:ext uri="{FF2B5EF4-FFF2-40B4-BE49-F238E27FC236}">
+                <a16:creationId xmlns:a16="http://schemas.microsoft.com/office/drawing/2014/main" id="{A3A0EA13-6CDD-4AA4-A978-AF6676115AAC}"/>
+              </a:ext>
+            </a:extLst>
+          </p:cNvPr>
+          <p:cNvSpPr txBox="1"/>
+          <p:nvPr/>
+        </p:nvSpPr>
+        <p:spPr>
+          <a:xfrm>
+            <a:off x="8897290" y="5371949"/>
+            <a:ext cx="2616453" cy="923330"/>
+          </a:xfrm>
+          <a:prstGeom prst="rect">
+            <a:avLst/>
+          </a:prstGeom>
+          <a:noFill/>
+        </p:spPr>
+        <p:txBody>
+          <a:bodyPr wrap="square" rtlCol="0">
+            <a:spAutoFit/>
+          </a:bodyPr>
+          <a:lstStyle/>
+          <a:p>
+            <a:r>
+              <a:rPr lang="es-ES" sz="3600" b="1" dirty="0" err="1">
+                <a:solidFill>
+                  <a:schemeClr val="tx1">
+                    <a:lumMod val="95000"/>
+                  </a:schemeClr>
+                </a:solidFill>
+                <a:latin typeface="Arial Rounded MT Bold" panose="020F0704030504030204" pitchFamily="34" charset="0"/>
+              </a:rPr>
+              <a:t>Cuphead</a:t>
+            </a:r>
+            <a:endParaRPr lang="es-ES" sz="3600" b="1" dirty="0">
+              <a:solidFill>
+                <a:schemeClr val="tx1">
+                  <a:lumMod val="95000"/>
+                </a:schemeClr>
+              </a:solidFill>
+              <a:latin typeface="Arial Rounded MT Bold" panose="020F0704030504030204" pitchFamily="34" charset="0"/>
+            </a:endParaRPr>
+          </a:p>
+          <a:p>
+            <a:endParaRPr lang="es-ES" dirty="0"/>
+          </a:p>
+        </p:txBody>
+      </p:sp>
+      <p:sp>
+        <p:nvSpPr>
+          <p:cNvPr id="10" name="CuadroTexto 9">
+            <a:extLst>
+              <a:ext uri="{FF2B5EF4-FFF2-40B4-BE49-F238E27FC236}">
+                <a16:creationId xmlns:a16="http://schemas.microsoft.com/office/drawing/2014/main" id="{F54A951A-2A55-4F6C-8BD9-D2DE3C37A76B}"/>
+              </a:ext>
+            </a:extLst>
+          </p:cNvPr>
+          <p:cNvSpPr txBox="1"/>
+          <p:nvPr/>
+        </p:nvSpPr>
+        <p:spPr>
+          <a:xfrm>
+            <a:off x="2936341" y="326263"/>
+            <a:ext cx="2821663" cy="923330"/>
+          </a:xfrm>
+          <a:prstGeom prst="rect">
+            <a:avLst/>
+          </a:prstGeom>
+          <a:noFill/>
+        </p:spPr>
+        <p:txBody>
+          <a:bodyPr wrap="square" rtlCol="0">
+            <a:spAutoFit/>
+          </a:bodyPr>
+          <a:lstStyle/>
+          <a:p>
+            <a:r>
+              <a:rPr lang="es-ES" sz="3600" b="1" dirty="0">
+                <a:solidFill>
+                  <a:schemeClr val="tx1">
+                    <a:lumMod val="95000"/>
+                  </a:schemeClr>
+                </a:solidFill>
+                <a:latin typeface="Arial Rounded MT Bold" panose="020F0704030504030204" pitchFamily="34" charset="0"/>
+              </a:rPr>
+              <a:t>Titan</a:t>
+            </a:r>
+            <a:r>
+              <a:rPr lang="es-ES" b="1" i="0" u="none" strike="noStrike" dirty="0">
+                <a:solidFill>
+                  <a:schemeClr val="tx1">
+                    <a:lumMod val="95000"/>
+                  </a:schemeClr>
+                </a:solidFill>
+                <a:effectLst/>
+                <a:latin typeface="Arial" panose="020B0604020202020204" pitchFamily="34" charset="0"/>
+              </a:rPr>
+              <a:t> </a:t>
+            </a:r>
+            <a:r>
+              <a:rPr lang="es-ES" sz="3600" b="1" dirty="0" err="1">
+                <a:solidFill>
+                  <a:schemeClr val="tx1">
+                    <a:lumMod val="95000"/>
+                  </a:schemeClr>
+                </a:solidFill>
+                <a:latin typeface="Arial Rounded MT Bold" panose="020F0704030504030204" pitchFamily="34" charset="0"/>
+              </a:rPr>
+              <a:t>Souls</a:t>
+            </a:r>
+            <a:endParaRPr lang="es-ES" sz="3600" b="1" dirty="0">
+              <a:solidFill>
+                <a:schemeClr val="tx1">
+                  <a:lumMod val="95000"/>
+                </a:schemeClr>
+              </a:solidFill>
+              <a:latin typeface="Arial Rounded MT Bold" panose="020F0704030504030204" pitchFamily="34" charset="0"/>
+            </a:endParaRPr>
+          </a:p>
+          <a:p>
+            <a:endParaRPr lang="es-ES" dirty="0"/>
+          </a:p>
+        </p:txBody>
+      </p:sp>
+      <p:sp>
+        <p:nvSpPr>
+          <p:cNvPr id="11" name="CuadroTexto 10">
+            <a:extLst>
+              <a:ext uri="{FF2B5EF4-FFF2-40B4-BE49-F238E27FC236}">
+                <a16:creationId xmlns:a16="http://schemas.microsoft.com/office/drawing/2014/main" id="{275EAEAA-E294-4DE8-8419-7E5FF927AEF6}"/>
+              </a:ext>
+            </a:extLst>
+          </p:cNvPr>
+          <p:cNvSpPr txBox="1"/>
+          <p:nvPr/>
+        </p:nvSpPr>
+        <p:spPr>
+          <a:xfrm>
+            <a:off x="3580644" y="4991648"/>
+            <a:ext cx="2616454" cy="923330"/>
+          </a:xfrm>
+          <a:prstGeom prst="rect">
+            <a:avLst/>
+          </a:prstGeom>
+          <a:noFill/>
+        </p:spPr>
+        <p:txBody>
+          <a:bodyPr wrap="square" rtlCol="0">
+            <a:spAutoFit/>
+          </a:bodyPr>
+          <a:lstStyle/>
+          <a:p>
+            <a:r>
+              <a:rPr lang="es-ES" sz="3600" b="1" dirty="0" err="1">
+                <a:solidFill>
+                  <a:schemeClr val="tx1">
+                    <a:lumMod val="95000"/>
+                  </a:schemeClr>
+                </a:solidFill>
+                <a:latin typeface="Arial Rounded MT Bold" panose="020F0704030504030204" pitchFamily="34" charset="0"/>
+              </a:rPr>
+              <a:t>Dead</a:t>
+            </a:r>
+            <a:r>
+              <a:rPr lang="es-ES" b="1" i="0" u="none" strike="noStrike" dirty="0">
+                <a:solidFill>
+                  <a:schemeClr val="tx1">
+                    <a:lumMod val="95000"/>
+                  </a:schemeClr>
+                </a:solidFill>
+                <a:effectLst/>
+                <a:latin typeface="Arial" panose="020B0604020202020204" pitchFamily="34" charset="0"/>
+              </a:rPr>
+              <a:t> </a:t>
+            </a:r>
+            <a:r>
+              <a:rPr lang="es-ES" sz="3600" b="1" dirty="0" err="1">
+                <a:solidFill>
+                  <a:schemeClr val="tx1">
+                    <a:lumMod val="95000"/>
+                  </a:schemeClr>
+                </a:solidFill>
+                <a:latin typeface="Arial Rounded MT Bold" panose="020F0704030504030204" pitchFamily="34" charset="0"/>
+              </a:rPr>
+              <a:t>cells</a:t>
+            </a:r>
+            <a:endParaRPr lang="es-ES" sz="3600" b="1" dirty="0">
+              <a:solidFill>
+                <a:schemeClr val="tx1">
+                  <a:lumMod val="95000"/>
+                </a:schemeClr>
+              </a:solidFill>
+              <a:latin typeface="Arial Rounded MT Bold" panose="020F0704030504030204" pitchFamily="34" charset="0"/>
+            </a:endParaRPr>
+          </a:p>
+          <a:p>
+            <a:endParaRPr lang="es-ES" dirty="0"/>
+          </a:p>
+        </p:txBody>
+      </p:sp>
+      <p:sp>
+        <p:nvSpPr>
+          <p:cNvPr id="12" name="CuadroTexto 11">
+            <a:extLst>
+              <a:ext uri="{FF2B5EF4-FFF2-40B4-BE49-F238E27FC236}">
+                <a16:creationId xmlns:a16="http://schemas.microsoft.com/office/drawing/2014/main" id="{AACFB1B5-2C4B-4DD5-B9C6-D417CC978FCE}"/>
+              </a:ext>
+            </a:extLst>
+          </p:cNvPr>
+          <p:cNvSpPr txBox="1"/>
+          <p:nvPr/>
+        </p:nvSpPr>
+        <p:spPr>
+          <a:xfrm>
+            <a:off x="8455935" y="2522008"/>
+            <a:ext cx="3286410" cy="923330"/>
+          </a:xfrm>
+          <a:prstGeom prst="rect">
+            <a:avLst/>
+          </a:prstGeom>
+          <a:noFill/>
+        </p:spPr>
+        <p:txBody>
+          <a:bodyPr wrap="square" rtlCol="0">
+            <a:spAutoFit/>
+          </a:bodyPr>
+          <a:lstStyle/>
+          <a:p>
+            <a:r>
+              <a:rPr lang="es-ES" sz="3600" b="1" dirty="0" err="1">
+                <a:solidFill>
+                  <a:schemeClr val="tx1">
+                    <a:lumMod val="95000"/>
+                  </a:schemeClr>
+                </a:solidFill>
+                <a:latin typeface="Arial Rounded MT Bold" panose="020F0704030504030204" pitchFamily="34" charset="0"/>
+              </a:rPr>
+              <a:t>Blasphemous</a:t>
+            </a:r>
+            <a:endParaRPr lang="es-ES" sz="3600" b="1" dirty="0">
+              <a:solidFill>
+                <a:schemeClr val="tx1">
+                  <a:lumMod val="95000"/>
+                </a:schemeClr>
+              </a:solidFill>
+              <a:latin typeface="Arial Rounded MT Bold" panose="020F0704030504030204" pitchFamily="34" charset="0"/>
+            </a:endParaRPr>
+          </a:p>
+          <a:p>
+            <a:endParaRPr lang="es-ES" dirty="0"/>
+          </a:p>
+        </p:txBody>
+      </p:sp>
+      <p:sp>
+        <p:nvSpPr>
+          <p:cNvPr id="13" name="CuadroTexto 12">
+            <a:extLst>
+              <a:ext uri="{FF2B5EF4-FFF2-40B4-BE49-F238E27FC236}">
+                <a16:creationId xmlns:a16="http://schemas.microsoft.com/office/drawing/2014/main" id="{97538DDC-2156-4912-A4D8-CF91E552BECF}"/>
+              </a:ext>
+            </a:extLst>
+          </p:cNvPr>
+          <p:cNvSpPr txBox="1"/>
+          <p:nvPr/>
+        </p:nvSpPr>
+        <p:spPr>
+          <a:xfrm>
+            <a:off x="787652" y="3787335"/>
+            <a:ext cx="2697932" cy="923330"/>
+          </a:xfrm>
+          <a:prstGeom prst="rect">
+            <a:avLst/>
+          </a:prstGeom>
+          <a:noFill/>
+        </p:spPr>
+        <p:txBody>
+          <a:bodyPr wrap="square" rtlCol="0">
+            <a:spAutoFit/>
+          </a:bodyPr>
+          <a:lstStyle/>
+          <a:p>
+            <a:r>
+              <a:rPr lang="es-ES" sz="3600" b="1" dirty="0" err="1">
+                <a:solidFill>
+                  <a:schemeClr val="tx1">
+                    <a:lumMod val="95000"/>
+                  </a:schemeClr>
+                </a:solidFill>
+                <a:latin typeface="Arial Rounded MT Bold" panose="020F0704030504030204" pitchFamily="34" charset="0"/>
+              </a:rPr>
+              <a:t>Death</a:t>
+            </a:r>
+            <a:r>
+              <a:rPr lang="es-ES" b="1" i="0" u="none" strike="noStrike" dirty="0">
+                <a:solidFill>
+                  <a:schemeClr val="tx1">
+                    <a:lumMod val="95000"/>
+                  </a:schemeClr>
+                </a:solidFill>
+                <a:effectLst/>
+                <a:latin typeface="Arial" panose="020B0604020202020204" pitchFamily="34" charset="0"/>
+              </a:rPr>
+              <a:t> </a:t>
+            </a:r>
+            <a:r>
+              <a:rPr lang="es-ES" sz="3600" b="1" dirty="0" err="1">
+                <a:solidFill>
+                  <a:schemeClr val="tx1">
+                    <a:lumMod val="95000"/>
+                  </a:schemeClr>
+                </a:solidFill>
+                <a:latin typeface="Arial Rounded MT Bold" panose="020F0704030504030204" pitchFamily="34" charset="0"/>
+              </a:rPr>
+              <a:t>Door</a:t>
+            </a:r>
+            <a:endParaRPr lang="es-ES" sz="3600" b="1" dirty="0">
+              <a:solidFill>
+                <a:schemeClr val="tx1">
+                  <a:lumMod val="95000"/>
+                </a:schemeClr>
+              </a:solidFill>
+              <a:latin typeface="Arial Rounded MT Bold" panose="020F0704030504030204" pitchFamily="34" charset="0"/>
+            </a:endParaRPr>
+          </a:p>
+          <a:p>
+            <a:endParaRPr lang="es-ES" dirty="0"/>
+          </a:p>
+        </p:txBody>
+      </p:sp>
+      <p:sp>
+        <p:nvSpPr>
+          <p:cNvPr id="14" name="CuadroTexto 13">
+            <a:extLst>
+              <a:ext uri="{FF2B5EF4-FFF2-40B4-BE49-F238E27FC236}">
+                <a16:creationId xmlns:a16="http://schemas.microsoft.com/office/drawing/2014/main" id="{688CC214-4FB3-44D1-9FD2-8709BAF8D752}"/>
+              </a:ext>
+            </a:extLst>
+          </p:cNvPr>
+          <p:cNvSpPr txBox="1"/>
+          <p:nvPr/>
+        </p:nvSpPr>
+        <p:spPr>
+          <a:xfrm>
+            <a:off x="280657" y="2060343"/>
+            <a:ext cx="4390931" cy="923330"/>
+          </a:xfrm>
+          <a:prstGeom prst="rect">
+            <a:avLst/>
+          </a:prstGeom>
+          <a:noFill/>
+        </p:spPr>
+        <p:txBody>
+          <a:bodyPr wrap="square" rtlCol="0">
+            <a:spAutoFit/>
+          </a:bodyPr>
+          <a:lstStyle/>
+          <a:p>
+            <a:r>
+              <a:rPr lang="es-ES" sz="3600" b="1" dirty="0">
+                <a:solidFill>
+                  <a:schemeClr val="tx1">
+                    <a:lumMod val="95000"/>
+                  </a:schemeClr>
+                </a:solidFill>
+                <a:latin typeface="Arial Rounded MT Bold" panose="020F0704030504030204" pitchFamily="34" charset="0"/>
+              </a:rPr>
+              <a:t>Salt</a:t>
+            </a:r>
+            <a:r>
+              <a:rPr lang="es-ES" b="1" i="0" u="none" strike="noStrike" dirty="0">
+                <a:solidFill>
+                  <a:schemeClr val="tx1">
+                    <a:lumMod val="95000"/>
+                  </a:schemeClr>
+                </a:solidFill>
+                <a:effectLst/>
+                <a:latin typeface="Arial" panose="020B0604020202020204" pitchFamily="34" charset="0"/>
+              </a:rPr>
+              <a:t> </a:t>
+            </a:r>
+            <a:r>
+              <a:rPr lang="es-ES" sz="3600" b="1" dirty="0">
+                <a:solidFill>
+                  <a:schemeClr val="tx1">
+                    <a:lumMod val="95000"/>
+                  </a:schemeClr>
+                </a:solidFill>
+                <a:latin typeface="Arial Rounded MT Bold" panose="020F0704030504030204" pitchFamily="34" charset="0"/>
+              </a:rPr>
+              <a:t>and</a:t>
+            </a:r>
+            <a:r>
+              <a:rPr lang="es-ES" b="1" i="0" u="none" strike="noStrike" dirty="0">
+                <a:solidFill>
+                  <a:schemeClr val="tx1">
+                    <a:lumMod val="95000"/>
+                  </a:schemeClr>
+                </a:solidFill>
+                <a:effectLst/>
+                <a:latin typeface="Arial" panose="020B0604020202020204" pitchFamily="34" charset="0"/>
+              </a:rPr>
+              <a:t>  </a:t>
+            </a:r>
+            <a:r>
+              <a:rPr lang="es-ES" sz="3600" b="1" dirty="0" err="1">
+                <a:solidFill>
+                  <a:schemeClr val="tx1">
+                    <a:lumMod val="95000"/>
+                  </a:schemeClr>
+                </a:solidFill>
+                <a:latin typeface="Arial Rounded MT Bold" panose="020F0704030504030204" pitchFamily="34" charset="0"/>
+              </a:rPr>
+              <a:t>Sanctuary</a:t>
+            </a:r>
+            <a:endParaRPr lang="es-ES" sz="3600" b="1" dirty="0">
+              <a:solidFill>
+                <a:schemeClr val="tx1">
+                  <a:lumMod val="95000"/>
+                </a:schemeClr>
+              </a:solidFill>
+              <a:latin typeface="Arial Rounded MT Bold" panose="020F0704030504030204" pitchFamily="34" charset="0"/>
+            </a:endParaRPr>
+          </a:p>
+          <a:p>
+            <a:endParaRPr lang="es-ES" dirty="0"/>
           </a:p>
         </p:txBody>
       </p:sp>
     </p:spTree>
     <p:extLst>
       <p:ext uri="{BB962C8B-B14F-4D97-AF65-F5344CB8AC3E}">
-        <p14:creationId xmlns:p14="http://schemas.microsoft.com/office/powerpoint/2010/main" val="1534480125"/>
-      </p:ext>
-    </p:extLst>
-  </p:cSld>
-  <p:clrMapOvr>
-    <a:masterClrMapping/>
-  </p:clrMapOvr>
-</p:sld>
-</file>
-
-<file path=ppt/slides/slide7.xml><?xml version="1.0" encoding="utf-8"?>
-<p:sld xmlns:a="http://schemas.openxmlformats.org/drawingml/2006/main" xmlns:r="http://schemas.openxmlformats.org/officeDocument/2006/relationships" xmlns:p="http://schemas.openxmlformats.org/presentationml/2006/main">
-  <p:cSld>
-    <p:spTree>
-      <p:nvGrpSpPr>
-        <p:cNvPr id="1" name=""/>
-        <p:cNvGrpSpPr/>
-        <p:nvPr/>
-      </p:nvGrpSpPr>
-      <p:grpSpPr>
-        <a:xfrm>
-          <a:off x="0" y="0"/>
-          <a:ext cx="0" cy="0"/>
-          <a:chOff x="0" y="0"/>
-          <a:chExt cx="0" cy="0"/>
-        </a:xfrm>
-      </p:grpSpPr>
-      <p:sp>
-        <p:nvSpPr>
-          <p:cNvPr id="2" name="Título 1">
-            <a:extLst>
-              <a:ext uri="{FF2B5EF4-FFF2-40B4-BE49-F238E27FC236}">
-                <a16:creationId xmlns:a16="http://schemas.microsoft.com/office/drawing/2014/main" id="{53E5E615-C2ED-40D1-9118-39F26F19E626}"/>
-              </a:ext>
-            </a:extLst>
-          </p:cNvPr>
-          <p:cNvSpPr>
-            <a:spLocks noGrp="1"/>
-          </p:cNvSpPr>
-          <p:nvPr>
-            <p:ph type="title"/>
-          </p:nvPr>
-        </p:nvSpPr>
-        <p:spPr/>
-        <p:txBody>
-          <a:bodyPr/>
-          <a:lstStyle/>
-          <a:p>
-            <a:r>
-              <a:rPr lang="es-ES" dirty="0" err="1"/>
-              <a:t>mecanicas</a:t>
-            </a:r>
-            <a:endParaRPr lang="es-ES" dirty="0"/>
-          </a:p>
-        </p:txBody>
-      </p:sp>
-      <p:sp>
-        <p:nvSpPr>
-          <p:cNvPr id="3" name="Marcador de contenido 2">
-            <a:extLst>
-              <a:ext uri="{FF2B5EF4-FFF2-40B4-BE49-F238E27FC236}">
-                <a16:creationId xmlns:a16="http://schemas.microsoft.com/office/drawing/2014/main" id="{732E29D7-9D43-4924-BB87-201551037338}"/>
-              </a:ext>
-            </a:extLst>
-          </p:cNvPr>
-          <p:cNvSpPr>
-            <a:spLocks noGrp="1"/>
-          </p:cNvSpPr>
-          <p:nvPr>
-            <p:ph idx="1"/>
-          </p:nvPr>
-        </p:nvSpPr>
-        <p:spPr/>
-        <p:txBody>
-          <a:bodyPr/>
-          <a:lstStyle/>
-          <a:p>
-            <a:r>
-              <a:rPr lang="es-ES" dirty="0"/>
-              <a:t>Ataque</a:t>
-            </a:r>
-          </a:p>
-          <a:p>
-            <a:r>
-              <a:rPr lang="es-ES" dirty="0"/>
-              <a:t>esquivo</a:t>
-            </a:r>
-          </a:p>
-        </p:txBody>
-      </p:sp>
-    </p:spTree>
-    <p:extLst>
-      <p:ext uri="{BB962C8B-B14F-4D97-AF65-F5344CB8AC3E}">
-        <p14:creationId xmlns:p14="http://schemas.microsoft.com/office/powerpoint/2010/main" val="2794590581"/>
-      </p:ext>
-    </p:extLst>
-  </p:cSld>
-  <p:clrMapOvr>
-    <a:masterClrMapping/>
-  </p:clrMapOvr>
-</p:sld>
-</file>
-
-<file path=ppt/slides/slide8.xml><?xml version="1.0" encoding="utf-8"?>
-<p:sld xmlns:a="http://schemas.openxmlformats.org/drawingml/2006/main" xmlns:r="http://schemas.openxmlformats.org/officeDocument/2006/relationships" xmlns:p="http://schemas.openxmlformats.org/presentationml/2006/main">
-  <p:cSld>
-    <p:spTree>
-      <p:nvGrpSpPr>
-        <p:cNvPr id="1" name=""/>
-        <p:cNvGrpSpPr/>
-        <p:nvPr/>
-      </p:nvGrpSpPr>
-      <p:grpSpPr>
-        <a:xfrm>
-          <a:off x="0" y="0"/>
-          <a:ext cx="0" cy="0"/>
-          <a:chOff x="0" y="0"/>
-          <a:chExt cx="0" cy="0"/>
-        </a:xfrm>
-      </p:grpSpPr>
-      <p:sp>
-        <p:nvSpPr>
-          <p:cNvPr id="2" name="Título 1">
-            <a:extLst>
-              <a:ext uri="{FF2B5EF4-FFF2-40B4-BE49-F238E27FC236}">
-                <a16:creationId xmlns:a16="http://schemas.microsoft.com/office/drawing/2014/main" id="{0E41D4FB-4E03-4844-B019-A624F496F6CE}"/>
-              </a:ext>
-            </a:extLst>
-          </p:cNvPr>
-          <p:cNvSpPr>
-            <a:spLocks noGrp="1"/>
-          </p:cNvSpPr>
-          <p:nvPr>
-            <p:ph type="title"/>
-          </p:nvPr>
-        </p:nvSpPr>
-        <p:spPr/>
-        <p:txBody>
-          <a:bodyPr/>
-          <a:lstStyle/>
-          <a:p>
-            <a:r>
-              <a:rPr lang="es-ES" dirty="0"/>
-              <a:t>BOSSES</a:t>
-            </a:r>
-          </a:p>
-        </p:txBody>
-      </p:sp>
-      <p:pic>
-        <p:nvPicPr>
-          <p:cNvPr id="5" name="Marcador de contenido 4">
-            <a:extLst>
-              <a:ext uri="{FF2B5EF4-FFF2-40B4-BE49-F238E27FC236}">
-                <a16:creationId xmlns:a16="http://schemas.microsoft.com/office/drawing/2014/main" id="{B5AFEEA3-BE91-48D8-B8C5-DB7A75331BCD}"/>
-              </a:ext>
-            </a:extLst>
-          </p:cNvPr>
-          <p:cNvPicPr>
-            <a:picLocks noGrp="1" noChangeAspect="1"/>
-          </p:cNvPicPr>
-          <p:nvPr>
-            <p:ph idx="1"/>
-          </p:nvPr>
-        </p:nvPicPr>
-        <p:blipFill>
-          <a:blip r:embed="rId2"/>
-          <a:stretch>
-            <a:fillRect/>
-          </a:stretch>
-        </p:blipFill>
-        <p:spPr>
-          <a:xfrm>
-            <a:off x="696008" y="1516562"/>
-            <a:ext cx="3528071" cy="2086564"/>
-          </a:xfrm>
-        </p:spPr>
-      </p:pic>
-      <p:pic>
-        <p:nvPicPr>
-          <p:cNvPr id="8" name="Imagen 7">
-            <a:extLst>
-              <a:ext uri="{FF2B5EF4-FFF2-40B4-BE49-F238E27FC236}">
-                <a16:creationId xmlns:a16="http://schemas.microsoft.com/office/drawing/2014/main" id="{EED28F61-A6C2-48A9-A565-DD293A8B08D0}"/>
-              </a:ext>
-            </a:extLst>
-          </p:cNvPr>
-          <p:cNvPicPr>
-            <a:picLocks noChangeAspect="1"/>
-          </p:cNvPicPr>
-          <p:nvPr/>
-        </p:nvPicPr>
-        <p:blipFill>
-          <a:blip r:embed="rId3"/>
-          <a:stretch>
-            <a:fillRect/>
-          </a:stretch>
-        </p:blipFill>
-        <p:spPr>
-          <a:xfrm>
-            <a:off x="4900354" y="2899449"/>
-            <a:ext cx="3465120" cy="2962017"/>
-          </a:xfrm>
-          <a:prstGeom prst="rect">
-            <a:avLst/>
-          </a:prstGeom>
-        </p:spPr>
-      </p:pic>
-      <p:pic>
-        <p:nvPicPr>
-          <p:cNvPr id="10" name="Imagen 9">
-            <a:extLst>
-              <a:ext uri="{FF2B5EF4-FFF2-40B4-BE49-F238E27FC236}">
-                <a16:creationId xmlns:a16="http://schemas.microsoft.com/office/drawing/2014/main" id="{68AC9F35-CDC3-48A2-9BF5-8999E8E4914E}"/>
-              </a:ext>
-            </a:extLst>
-          </p:cNvPr>
-          <p:cNvPicPr>
-            <a:picLocks noChangeAspect="1"/>
-          </p:cNvPicPr>
-          <p:nvPr/>
-        </p:nvPicPr>
-        <p:blipFill>
-          <a:blip r:embed="rId4"/>
-          <a:stretch>
-            <a:fillRect/>
-          </a:stretch>
-        </p:blipFill>
-        <p:spPr>
-          <a:xfrm>
-            <a:off x="8715374" y="298315"/>
-            <a:ext cx="2943225" cy="2784745"/>
-          </a:xfrm>
-          <a:prstGeom prst="rect">
-            <a:avLst/>
-          </a:prstGeom>
-        </p:spPr>
-      </p:pic>
-    </p:spTree>
-    <p:extLst>
-      <p:ext uri="{BB962C8B-B14F-4D97-AF65-F5344CB8AC3E}">
-        <p14:creationId xmlns:p14="http://schemas.microsoft.com/office/powerpoint/2010/main" val="2205556734"/>
+        <p14:creationId xmlns:p14="http://schemas.microsoft.com/office/powerpoint/2010/main" val="2828232204"/>
       </p:ext>
     </p:extLst>
   </p:cSld>

</xml_diff>

<commit_message>
diria que con esto vale
</commit_message>
<xml_diff>
--- a/Hitos/Presentacion hito 0.pptx
+++ b/Hitos/Presentacion hito 0.pptx
@@ -3984,8 +3984,8 @@
         </p:nvSpPr>
         <p:spPr>
           <a:xfrm>
-            <a:off x="279243" y="6424345"/>
-            <a:ext cx="6771049" cy="369332"/>
+            <a:off x="422118" y="5887888"/>
+            <a:ext cx="6771049" cy="338554"/>
           </a:xfrm>
           <a:prstGeom prst="rect">
             <a:avLst/>
@@ -3999,7 +3999,7 @@
           <a:lstStyle/>
           <a:p>
             <a:r>
-              <a:rPr lang="es-ES" dirty="0">
+              <a:rPr lang="es-ES" sz="1600" dirty="0">
                 <a:latin typeface="Arial Rounded MT Bold" panose="020F0704030504030204" pitchFamily="34" charset="0"/>
               </a:rPr>
               <a:t>También conocidos como los guapos del fondo de la clase</a:t>
@@ -4688,7 +4688,7 @@
               <a:rPr lang="es-ES" dirty="0">
                 <a:latin typeface="Arial Rounded MT Bold" panose="020F0704030504030204" pitchFamily="34" charset="0"/>
               </a:rPr>
-              <a:t>La magia se ha perturbado y el caos asola el mundo</a:t>
+              <a:t>La magia se ha perturbado y el caos asola el mundo.</a:t>
             </a:r>
           </a:p>
           <a:p>
@@ -4699,81 +4699,111 @@
               <a:rPr lang="es-ES" dirty="0">
                 <a:latin typeface="Arial Rounded MT Bold" panose="020F0704030504030204" pitchFamily="34" charset="0"/>
               </a:rPr>
-              <a:t>Las tres esencias primordiales se refugiaron en un bosque ancestral, </a:t>
+              <a:t>Las </a:t>
+            </a:r>
+            <a:r>
+              <a:rPr lang="es-ES" u="sng" dirty="0">
+                <a:latin typeface="Arial Rounded MT Bold" panose="020F0704030504030204" pitchFamily="34" charset="0"/>
+              </a:rPr>
+              <a:t>tres esencias</a:t>
+            </a:r>
+            <a:r>
+              <a:rPr lang="es-ES" dirty="0">
+                <a:latin typeface="Arial Rounded MT Bold" panose="020F0704030504030204" pitchFamily="34" charset="0"/>
+              </a:rPr>
+              <a:t> primordiales se refugiaron en el bosque ancestral:</a:t>
             </a:r>
           </a:p>
           <a:p>
             <a:pPr marL="0" indent="0">
               <a:buNone/>
             </a:pPr>
+            <a:r>
+              <a:rPr lang="es-ES" dirty="0" err="1">
+                <a:solidFill>
+                  <a:srgbClr val="00B050"/>
+                </a:solidFill>
+                <a:latin typeface="Arial Rounded MT Bold" panose="020F0704030504030204" pitchFamily="34" charset="0"/>
+              </a:rPr>
+              <a:t>Terria</a:t>
+            </a:r>
+            <a:r>
+              <a:rPr lang="es-ES" dirty="0">
+                <a:solidFill>
+                  <a:srgbClr val="00B050"/>
+                </a:solidFill>
+                <a:latin typeface="Arial Rounded MT Bold" panose="020F0704030504030204" pitchFamily="34" charset="0"/>
+              </a:rPr>
+              <a:t> -&gt;materia</a:t>
+            </a:r>
+          </a:p>
+          <a:p>
+            <a:pPr marL="0" indent="0">
+              <a:buNone/>
+            </a:pPr>
+            <a:r>
+              <a:rPr lang="es-ES" dirty="0" err="1">
+                <a:solidFill>
+                  <a:srgbClr val="FFFF00"/>
+                </a:solidFill>
+                <a:latin typeface="Arial Rounded MT Bold" panose="020F0704030504030204" pitchFamily="34" charset="0"/>
+              </a:rPr>
+              <a:t>Lumine</a:t>
+            </a:r>
+            <a:r>
+              <a:rPr lang="es-ES" dirty="0">
+                <a:solidFill>
+                  <a:srgbClr val="FFFF00"/>
+                </a:solidFill>
+                <a:latin typeface="Arial Rounded MT Bold" panose="020F0704030504030204" pitchFamily="34" charset="0"/>
+              </a:rPr>
+              <a:t> -&gt;luz y la vida</a:t>
+            </a:r>
+          </a:p>
+          <a:p>
+            <a:pPr marL="0" indent="0">
+              <a:buNone/>
+            </a:pPr>
+            <a:r>
+              <a:rPr lang="es-ES" dirty="0" err="1">
+                <a:solidFill>
+                  <a:srgbClr val="00B0F0"/>
+                </a:solidFill>
+                <a:latin typeface="Arial Rounded MT Bold" panose="020F0704030504030204" pitchFamily="34" charset="0"/>
+              </a:rPr>
+              <a:t>Etheria</a:t>
+            </a:r>
+            <a:r>
+              <a:rPr lang="es-ES" dirty="0">
+                <a:solidFill>
+                  <a:srgbClr val="00B0F0"/>
+                </a:solidFill>
+                <a:latin typeface="Arial Rounded MT Bold" panose="020F0704030504030204" pitchFamily="34" charset="0"/>
+              </a:rPr>
+              <a:t> -&gt;voluntad y la mente</a:t>
+            </a:r>
+          </a:p>
+          <a:p>
+            <a:pPr marL="0" indent="0">
+              <a:buNone/>
+            </a:pPr>
+            <a:r>
+              <a:rPr lang="es-ES" dirty="0">
+                <a:latin typeface="Arial Rounded MT Bold" panose="020F0704030504030204" pitchFamily="34" charset="0"/>
+              </a:rPr>
+              <a:t>Para traer de vuelta el equilibrio se ha dado vida a </a:t>
+            </a:r>
             <a:r>
               <a:rPr lang="es-ES" dirty="0" err="1">
                 <a:latin typeface="Arial Rounded MT Bold" panose="020F0704030504030204" pitchFamily="34" charset="0"/>
               </a:rPr>
-              <a:t>Terria</a:t>
+              <a:t>Kyna</a:t>
             </a:r>
             <a:r>
               <a:rPr lang="es-ES" dirty="0">
                 <a:latin typeface="Arial Rounded MT Bold" panose="020F0704030504030204" pitchFamily="34" charset="0"/>
               </a:rPr>
-              <a:t>, -&gt;materia.</a:t>
-            </a:r>
-          </a:p>
-          <a:p>
-            <a:pPr marL="0" indent="0">
-              <a:buNone/>
-            </a:pPr>
-            <a:r>
-              <a:rPr lang="es-ES" dirty="0" err="1">
-                <a:latin typeface="Arial Rounded MT Bold" panose="020F0704030504030204" pitchFamily="34" charset="0"/>
-              </a:rPr>
-              <a:t>Lumine</a:t>
-            </a:r>
-            <a:r>
-              <a:rPr lang="es-ES" dirty="0">
-                <a:latin typeface="Arial Rounded MT Bold" panose="020F0704030504030204" pitchFamily="34" charset="0"/>
-              </a:rPr>
-              <a:t>, -&gt;luz y la vida.</a:t>
-            </a:r>
-          </a:p>
-          <a:p>
-            <a:pPr marL="0" indent="0">
-              <a:buNone/>
-            </a:pPr>
-            <a:r>
-              <a:rPr lang="es-ES" dirty="0" err="1">
-                <a:latin typeface="Arial Rounded MT Bold" panose="020F0704030504030204" pitchFamily="34" charset="0"/>
-              </a:rPr>
-              <a:t>Etheria</a:t>
-            </a:r>
-            <a:r>
-              <a:rPr lang="es-ES" dirty="0">
-                <a:latin typeface="Arial Rounded MT Bold" panose="020F0704030504030204" pitchFamily="34" charset="0"/>
-              </a:rPr>
-              <a:t>, -&gt;voluntad y la mente.</a:t>
-            </a:r>
-          </a:p>
-          <a:p>
-            <a:pPr marL="0" indent="0">
-              <a:buNone/>
-            </a:pPr>
-            <a:r>
-              <a:rPr lang="es-ES" dirty="0">
-                <a:latin typeface="Arial Rounded MT Bold" panose="020F0704030504030204" pitchFamily="34" charset="0"/>
-              </a:rPr>
-              <a:t>Para traer de vuelta el equilibrio se ha dado vida a </a:t>
-            </a:r>
-            <a:r>
-              <a:rPr lang="es-ES" dirty="0" err="1">
-                <a:latin typeface="Arial Rounded MT Bold" panose="020F0704030504030204" pitchFamily="34" charset="0"/>
-              </a:rPr>
-              <a:t>Kyna</a:t>
-            </a:r>
-            <a:r>
-              <a:rPr lang="es-ES" dirty="0">
-                <a:latin typeface="Arial Rounded MT Bold" panose="020F0704030504030204" pitchFamily="34" charset="0"/>
-              </a:rPr>
-              <a:t> con la esperanza de que este reúna las 3 esencias primordiales y devuelva la paz al mundo</a:t>
+              <a:t>, con la esperanza de que las reúna devolviendo la paz al mundo</a:t>
             </a:r>
           </a:p>
           <a:p>
@@ -4874,7 +4904,7 @@
         </p:nvSpPr>
         <p:spPr>
           <a:xfrm>
-            <a:off x="3772527" y="403585"/>
+            <a:off x="4033837" y="421028"/>
             <a:ext cx="4124325" cy="1325563"/>
           </a:xfrm>
         </p:spPr>
@@ -4923,7 +4953,7 @@
         </p:blipFill>
         <p:spPr bwMode="auto">
           <a:xfrm>
-            <a:off x="7222572" y="2715361"/>
+            <a:off x="7213047" y="2876553"/>
             <a:ext cx="3927947" cy="2885732"/>
           </a:xfrm>
           <a:prstGeom prst="rect">
@@ -4955,8 +4985,8 @@
         </p:nvSpPr>
         <p:spPr>
           <a:xfrm>
-            <a:off x="8204559" y="1746591"/>
-            <a:ext cx="1963974" cy="646331"/>
+            <a:off x="7928333" y="1746591"/>
+            <a:ext cx="2177691" cy="646331"/>
           </a:xfrm>
           <a:prstGeom prst="rect">
             <a:avLst/>
@@ -4978,7 +5008,7 @@
                 </a:solidFill>
                 <a:latin typeface="Arial Rounded MT Bold" panose="020F0704030504030204" pitchFamily="34" charset="0"/>
               </a:rPr>
-              <a:t>Esquivo</a:t>
+              <a:t>Esquivar</a:t>
             </a:r>
           </a:p>
         </p:txBody>
@@ -5010,7 +5040,7 @@
         </p:blipFill>
         <p:spPr bwMode="auto">
           <a:xfrm>
-            <a:off x="600866" y="2715361"/>
+            <a:off x="600866" y="3037746"/>
             <a:ext cx="4973116" cy="2563347"/>
           </a:xfrm>
           <a:prstGeom prst="rect">
@@ -5042,7 +5072,7 @@
         </p:nvSpPr>
         <p:spPr>
           <a:xfrm>
-            <a:off x="2187406" y="1728323"/>
+            <a:off x="2187406" y="1746591"/>
             <a:ext cx="1800036" cy="646331"/>
           </a:xfrm>
           <a:prstGeom prst="rect">
@@ -5065,7 +5095,7 @@
                 </a:solidFill>
                 <a:latin typeface="Arial Rounded MT Bold" panose="020F0704030504030204" pitchFamily="34" charset="0"/>
               </a:rPr>
-              <a:t>Ataque</a:t>
+              <a:t>Atacar</a:t>
             </a:r>
           </a:p>
         </p:txBody>
@@ -5118,7 +5148,7 @@
         </p:nvSpPr>
         <p:spPr>
           <a:xfrm>
-            <a:off x="4624387" y="288925"/>
+            <a:off x="4624387" y="279400"/>
             <a:ext cx="2943225" cy="1325563"/>
           </a:xfrm>
         </p:spPr>
@@ -5126,6 +5156,7 @@
           <a:bodyPr/>
           <a:lstStyle/>
           <a:p>
+            <a:pPr algn="ctr"/>
             <a:r>
               <a:rPr lang="es-ES" sz="5400" dirty="0">
                 <a:solidFill>
@@ -5258,9 +5289,7 @@
             <a:r>
               <a:rPr lang="es-ES" sz="3600" b="1" dirty="0">
                 <a:solidFill>
-                  <a:schemeClr val="tx1">
-                    <a:lumMod val="95000"/>
-                  </a:schemeClr>
+                  <a:srgbClr val="00B050"/>
                 </a:solidFill>
                 <a:latin typeface="Arial Rounded MT Bold" panose="020F0704030504030204" pitchFamily="34" charset="0"/>
               </a:rPr>
@@ -5300,9 +5329,7 @@
             <a:r>
               <a:rPr lang="es-ES" sz="3600" b="1" dirty="0">
                 <a:solidFill>
-                  <a:schemeClr val="tx1">
-                    <a:lumMod val="95000"/>
-                  </a:schemeClr>
+                  <a:srgbClr val="FFFF00"/>
                 </a:solidFill>
                 <a:latin typeface="Arial Rounded MT Bold" panose="020F0704030504030204" pitchFamily="34" charset="0"/>
               </a:rPr>
@@ -5343,9 +5370,7 @@
             <a:r>
               <a:rPr lang="es-ES" sz="2400" b="1" dirty="0">
                 <a:solidFill>
-                  <a:schemeClr val="tx1">
-                    <a:lumMod val="95000"/>
-                  </a:schemeClr>
+                  <a:srgbClr val="00B0F0"/>
                 </a:solidFill>
                 <a:latin typeface="Arial Rounded MT Bold" panose="020F0704030504030204" pitchFamily="34" charset="0"/>
               </a:rPr>
@@ -5991,15 +6016,27 @@
               <a:t> </a:t>
             </a:r>
             <a:r>
-              <a:rPr lang="es-ES" sz="3600" b="1" dirty="0" err="1">
+              <a:rPr lang="es-ES" sz="3600" b="1" i="0" u="none" strike="noStrike" dirty="0" err="1">
                 <a:solidFill>
                   <a:schemeClr val="tx1">
                     <a:lumMod val="95000"/>
                   </a:schemeClr>
                 </a:solidFill>
+                <a:effectLst/>
                 <a:latin typeface="Arial Rounded MT Bold" panose="020F0704030504030204" pitchFamily="34" charset="0"/>
               </a:rPr>
-              <a:t>lilies</a:t>
+              <a:t>L</a:t>
+            </a:r>
+            <a:r>
+              <a:rPr lang="es-ES" sz="3600" b="1" dirty="0" err="1">
+                <a:solidFill>
+                  <a:schemeClr val="tx1">
+                    <a:lumMod val="95000"/>
+                  </a:schemeClr>
+                </a:solidFill>
+                <a:latin typeface="Arial Rounded MT Bold" panose="020F0704030504030204" pitchFamily="34" charset="0"/>
+              </a:rPr>
+              <a:t>ilies</a:t>
             </a:r>
             <a:endParaRPr lang="es-ES" sz="3600" b="1" dirty="0">
               <a:solidFill>
@@ -6335,7 +6372,7 @@
                 </a:solidFill>
                 <a:latin typeface="Arial Rounded MT Bold" panose="020F0704030504030204" pitchFamily="34" charset="0"/>
               </a:rPr>
-              <a:t>cells</a:t>
+              <a:t>Cells</a:t>
             </a:r>
             <a:endParaRPr lang="es-ES" sz="3600" b="1" dirty="0">
               <a:solidFill>

</xml_diff>